<commit_message>
updated images and reorder of dashboard
</commit_message>
<xml_diff>
--- a/assets/resources/graph for web_page.pptx
+++ b/assets/resources/graph for web_page.pptx
@@ -5,16 +5,17 @@
     <p:sldMasterId id="2147483660" r:id="rId1"/>
   </p:sldMasterIdLst>
   <p:notesMasterIdLst>
-    <p:notesMasterId r:id="rId9"/>
+    <p:notesMasterId r:id="rId10"/>
   </p:notesMasterIdLst>
   <p:sldIdLst>
     <p:sldId id="369" r:id="rId2"/>
     <p:sldId id="373" r:id="rId3"/>
-    <p:sldId id="371" r:id="rId4"/>
-    <p:sldId id="361" r:id="rId5"/>
-    <p:sldId id="364" r:id="rId6"/>
-    <p:sldId id="367" r:id="rId7"/>
-    <p:sldId id="366" r:id="rId8"/>
+    <p:sldId id="374" r:id="rId4"/>
+    <p:sldId id="371" r:id="rId5"/>
+    <p:sldId id="361" r:id="rId6"/>
+    <p:sldId id="364" r:id="rId7"/>
+    <p:sldId id="367" r:id="rId8"/>
+    <p:sldId id="366" r:id="rId9"/>
   </p:sldIdLst>
   <p:sldSz cx="12192000" cy="6858000"/>
   <p:notesSz cx="6858000" cy="9144000"/>
@@ -124,7 +125,7 @@
 <file path=ppt/revisionInfo.xml><?xml version="1.0" encoding="utf-8"?>
 <p1510:revInfo xmlns:a="http://schemas.openxmlformats.org/drawingml/2006/main" xmlns:r="http://schemas.openxmlformats.org/officeDocument/2006/relationships" xmlns:p1510="http://schemas.microsoft.com/office/powerpoint/2015/10/main">
   <p1510:revLst>
-    <p1510:client id="{07AE1321-E1B5-44BC-BC54-8923ADAC392F}" v="31" dt="2022-03-25T17:35:56.146"/>
+    <p1510:client id="{07AE1321-E1B5-44BC-BC54-8923ADAC392F}" v="32" dt="2022-03-25T22:15:41.771"/>
   </p1510:revLst>
 </p1510:revInfo>
 </file>
@@ -134,7 +135,7 @@
   <pc:docChgLst>
     <pc:chgData name="Jackie N" userId="8b14f1697149b7ae" providerId="LiveId" clId="{07AE1321-E1B5-44BC-BC54-8923ADAC392F}"/>
     <pc:docChg chg="undo custSel addSld delSld modSld sldOrd">
-      <pc:chgData name="Jackie N" userId="8b14f1697149b7ae" providerId="LiveId" clId="{07AE1321-E1B5-44BC-BC54-8923ADAC392F}" dt="2022-03-25T17:39:27.319" v="953"/>
+      <pc:chgData name="Jackie N" userId="8b14f1697149b7ae" providerId="LiveId" clId="{07AE1321-E1B5-44BC-BC54-8923ADAC392F}" dt="2022-03-25T22:16:05.046" v="960" actId="20577"/>
       <pc:docMkLst>
         <pc:docMk/>
       </pc:docMkLst>
@@ -1457,6 +1458,21 @@
           </ac:cxnSpMkLst>
         </pc:cxnChg>
       </pc:sldChg>
+      <pc:sldChg chg="modSp add mod">
+        <pc:chgData name="Jackie N" userId="8b14f1697149b7ae" providerId="LiveId" clId="{07AE1321-E1B5-44BC-BC54-8923ADAC392F}" dt="2022-03-25T22:16:05.046" v="960" actId="20577"/>
+        <pc:sldMkLst>
+          <pc:docMk/>
+          <pc:sldMk cId="1285128099" sldId="374"/>
+        </pc:sldMkLst>
+        <pc:spChg chg="mod">
+          <ac:chgData name="Jackie N" userId="8b14f1697149b7ae" providerId="LiveId" clId="{07AE1321-E1B5-44BC-BC54-8923ADAC392F}" dt="2022-03-25T22:16:05.046" v="960" actId="20577"/>
+          <ac:spMkLst>
+            <pc:docMk/>
+            <pc:sldMk cId="1285128099" sldId="374"/>
+            <ac:spMk id="31" creationId="{83303F25-04CE-4148-AE22-552B5BF809ED}"/>
+          </ac:spMkLst>
+        </pc:spChg>
+      </pc:sldChg>
     </pc:docChg>
   </pc:docChgLst>
 </pc:chgInfo>
@@ -2322,11 +2338,11 @@
 </file>
 
 <file path=ppt/notesSlides/notesSlide4.xml><?xml version="1.0" encoding="utf-8"?>
-<p:notes xmlns:a="http://schemas.openxmlformats.org/drawingml/2006/main" xmlns:r="http://schemas.openxmlformats.org/officeDocument/2006/relationships" xmlns:p="http://schemas.openxmlformats.org/presentationml/2006/main" showMasterSp="0" showMasterPhAnim="0">
+<p:notes xmlns:a="http://schemas.openxmlformats.org/drawingml/2006/main" xmlns:r="http://schemas.openxmlformats.org/officeDocument/2006/relationships" xmlns:p="http://schemas.openxmlformats.org/presentationml/2006/main">
   <p:cSld>
     <p:spTree>
       <p:nvGrpSpPr>
-        <p:cNvPr id="1" name="Shape 648"/>
+        <p:cNvPr id="1" name=""/>
         <p:cNvGrpSpPr/>
         <p:nvPr/>
       </p:nvGrpSpPr>
@@ -2340,12 +2356,12 @@
       </p:grpSpPr>
       <p:sp>
         <p:nvSpPr>
-          <p:cNvPr id="649" name="Google Shape;649;g75f465780c_0_1803:notes"/>
+          <p:cNvPr id="2" name="Slide Image Placeholder 1"/>
           <p:cNvSpPr>
             <a:spLocks noGrp="1" noRot="1" noChangeAspect="1"/>
           </p:cNvSpPr>
           <p:nvPr>
-            <p:ph type="sldImg" idx="2"/>
+            <p:ph type="sldImg"/>
           </p:nvPr>
         </p:nvSpPr>
         <p:spPr>
@@ -2353,367 +2369,64 @@
             <a:off x="381000" y="685800"/>
             <a:ext cx="6096000" cy="3429000"/>
           </a:xfrm>
-          <a:custGeom>
-            <a:avLst/>
-            <a:gdLst/>
-            <a:ahLst/>
-            <a:cxnLst/>
-            <a:rect l="l" t="t" r="r" b="b"/>
-            <a:pathLst>
-              <a:path w="120000" h="120000" extrusionOk="0">
-                <a:moveTo>
-                  <a:pt x="0" y="0"/>
-                </a:moveTo>
-                <a:lnTo>
-                  <a:pt x="120000" y="0"/>
-                </a:lnTo>
-                <a:lnTo>
-                  <a:pt x="120000" y="120000"/>
-                </a:lnTo>
-                <a:lnTo>
-                  <a:pt x="0" y="120000"/>
-                </a:lnTo>
-                <a:close/>
-              </a:path>
-            </a:pathLst>
-          </a:custGeom>
         </p:spPr>
       </p:sp>
       <p:sp>
         <p:nvSpPr>
-          <p:cNvPr id="650" name="Google Shape;650;g75f465780c_0_1803:notes"/>
-          <p:cNvSpPr txBox="1">
+          <p:cNvPr id="3" name="Notes Placeholder 2"/>
+          <p:cNvSpPr>
             <a:spLocks noGrp="1"/>
           </p:cNvSpPr>
           <p:nvPr>
             <p:ph type="body" idx="1"/>
           </p:nvPr>
         </p:nvSpPr>
-        <p:spPr>
-          <a:xfrm>
-            <a:off x="685800" y="4343400"/>
-            <a:ext cx="5486400" cy="4114800"/>
-          </a:xfrm>
-          <a:prstGeom prst="rect">
-            <a:avLst/>
-          </a:prstGeom>
-        </p:spPr>
+        <p:spPr/>
         <p:txBody>
-          <a:bodyPr spcFirstLastPara="1" wrap="square" lIns="91425" tIns="91425" rIns="91425" bIns="91425" anchor="t" anchorCtr="0">
-            <a:noAutofit/>
-          </a:bodyPr>
+          <a:bodyPr/>
           <a:lstStyle/>
           <a:p>
-            <a:pPr marL="158750" indent="0" rtl="0">
-              <a:spcBef>
-                <a:spcPts val="1800"/>
-              </a:spcBef>
-              <a:spcAft>
-                <a:spcPts val="600"/>
-              </a:spcAft>
+            <a:pPr marL="158750" indent="0">
+              <a:buNone/>
+            </a:pPr>
+            <a:endParaRPr lang="en-AU"/>
+          </a:p>
+          <a:p>
+            <a:pPr marL="158750" indent="0">
               <a:buNone/>
             </a:pPr>
             <a:r>
-              <a:rPr lang="en-US" sz="1100" b="0" i="0" u="none" strike="noStrike" cap="none">
-                <a:solidFill>
-                  <a:srgbClr val="000000"/>
-                </a:solidFill>
-                <a:effectLst/>
-                <a:latin typeface="Arial"/>
-                <a:ea typeface="Arial"/>
-                <a:cs typeface="Arial"/>
-                <a:sym typeface="Arial"/>
-              </a:rPr>
-              <a:t> This is our architecture for predictive &amp; causal modelling . We start with standard preprocessing, feature selection and feature engineering. The processed data is then stored on Azure and ingested by the modeling. </a:t>
+              <a:rPr lang="en-AU"/>
+              <a:t>Jackie created for website use because of the blue. </a:t>
             </a:r>
           </a:p>
           <a:p>
-            <a:pPr marL="158750" indent="0" rtl="0">
-              <a:spcBef>
-                <a:spcPts val="1800"/>
-              </a:spcBef>
-              <a:spcAft>
-                <a:spcPts val="600"/>
-              </a:spcAft>
-              <a:buNone/>
-            </a:pPr>
-            <a:r>
-              <a:rPr lang="en-US" sz="1100" b="0" i="0" u="none" strike="noStrike" cap="none">
-                <a:solidFill>
-                  <a:srgbClr val="000000"/>
-                </a:solidFill>
-                <a:effectLst/>
-                <a:latin typeface="Arial"/>
-                <a:ea typeface="Arial"/>
-                <a:cs typeface="Arial"/>
-                <a:sym typeface="Arial"/>
-              </a:rPr>
-              <a:t>You’ll notice that we’re running 2 models yielding both prediction &amp; causal results. This is to offer a robust product applying maximal </a:t>
-            </a:r>
-            <a:r>
-              <a:rPr lang="en-US" sz="1100" b="0" i="0" u="none" strike="noStrike" cap="none" err="1">
-                <a:solidFill>
-                  <a:srgbClr val="000000"/>
-                </a:solidFill>
-                <a:effectLst/>
-                <a:latin typeface="Arial"/>
-                <a:ea typeface="Arial"/>
-                <a:cs typeface="Arial"/>
-                <a:sym typeface="Arial"/>
-              </a:rPr>
-              <a:t>datascience</a:t>
-            </a:r>
-            <a:r>
-              <a:rPr lang="en-US" sz="1100" b="0" i="0" u="none" strike="noStrike" cap="none">
-                <a:solidFill>
-                  <a:srgbClr val="000000"/>
-                </a:solidFill>
-                <a:effectLst/>
-                <a:latin typeface="Arial"/>
-                <a:ea typeface="Arial"/>
-                <a:cs typeface="Arial"/>
-                <a:sym typeface="Arial"/>
-              </a:rPr>
-              <a:t> so as to provide both a statistical basis for assessment and as well offer a useful prediction based on prior sentencing patterns.</a:t>
-            </a:r>
+            <a:endParaRPr lang="en-AU"/>
           </a:p>
           <a:p>
-            <a:pPr marL="158750" indent="0" rtl="0">
-              <a:spcBef>
-                <a:spcPts val="1800"/>
-              </a:spcBef>
-              <a:spcAft>
-                <a:spcPts val="600"/>
-              </a:spcAft>
-              <a:buNone/>
-            </a:pPr>
-            <a:endParaRPr lang="en-US" sz="1800" b="0" i="0" u="none" strike="noStrike">
-              <a:solidFill>
-                <a:srgbClr val="000000"/>
-              </a:solidFill>
-              <a:effectLst/>
-              <a:latin typeface="Arial" panose="020B0604020202020204" pitchFamily="34" charset="0"/>
-            </a:endParaRPr>
+            <a:endParaRPr lang="en-AU"/>
           </a:p>
           <a:p>
-            <a:pPr marL="158750" indent="0" rtl="0">
-              <a:spcBef>
-                <a:spcPts val="1800"/>
-              </a:spcBef>
-              <a:spcAft>
-                <a:spcPts val="600"/>
-              </a:spcAft>
-              <a:buNone/>
-            </a:pPr>
-            <a:r>
-              <a:rPr lang="en-US" sz="1800" b="0" i="0" u="none" strike="noStrike">
-                <a:solidFill>
-                  <a:srgbClr val="000000"/>
-                </a:solidFill>
-                <a:effectLst/>
-                <a:latin typeface="Arial" panose="020B0604020202020204" pitchFamily="34" charset="0"/>
-              </a:rPr>
-              <a:t>Requirements:</a:t>
-            </a:r>
+            <a:endParaRPr lang="en-US"/>
           </a:p>
+        </p:txBody>
+      </p:sp>
+      <p:sp>
+        <p:nvSpPr>
+          <p:cNvPr id="4" name="Slide Number Placeholder 3"/>
+          <p:cNvSpPr>
+            <a:spLocks noGrp="1"/>
+          </p:cNvSpPr>
+          <p:nvPr>
+            <p:ph type="sldNum" sz="quarter" idx="10"/>
+          </p:nvPr>
+        </p:nvSpPr>
+        <p:spPr/>
+        <p:txBody>
+          <a:bodyPr/>
+          <a:lstStyle/>
           <a:p>
-            <a:pPr rtl="0">
-              <a:spcBef>
-                <a:spcPts val="1800"/>
-              </a:spcBef>
-              <a:spcAft>
-                <a:spcPts val="600"/>
-              </a:spcAft>
-            </a:pPr>
-            <a:r>
-              <a:rPr lang="en-US" sz="1800" b="0" i="0" u="none" strike="noStrike">
-                <a:solidFill>
-                  <a:srgbClr val="000000"/>
-                </a:solidFill>
-                <a:effectLst/>
-                <a:latin typeface="Arial" panose="020B0604020202020204" pitchFamily="34" charset="0"/>
-              </a:rPr>
-              <a:t>Technical discussion. </a:t>
-            </a:r>
-            <a:endParaRPr lang="en-US" b="1">
-              <a:effectLst/>
-            </a:endParaRPr>
-          </a:p>
-          <a:p>
-            <a:pPr rtl="0" fontAlgn="base">
-              <a:spcBef>
-                <a:spcPts val="0"/>
-              </a:spcBef>
-              <a:spcAft>
-                <a:spcPts val="0"/>
-              </a:spcAft>
-              <a:buFont typeface="Arial" panose="020B0604020202020204" pitchFamily="34" charset="0"/>
-              <a:buChar char="•"/>
-            </a:pPr>
-            <a:r>
-              <a:rPr lang="en-US" sz="1800" b="0" i="0" u="none" strike="noStrike">
-                <a:solidFill>
-                  <a:srgbClr val="000000"/>
-                </a:solidFill>
-                <a:effectLst/>
-                <a:latin typeface="Arial" panose="020B0604020202020204" pitchFamily="34" charset="0"/>
-              </a:rPr>
-              <a:t>Team presents the current overall architecture of the product</a:t>
-            </a:r>
-          </a:p>
-          <a:p>
-            <a:pPr rtl="0" fontAlgn="base">
-              <a:spcBef>
-                <a:spcPts val="0"/>
-              </a:spcBef>
-              <a:spcAft>
-                <a:spcPts val="0"/>
-              </a:spcAft>
-              <a:buFont typeface="Arial" panose="020B0604020202020204" pitchFamily="34" charset="0"/>
-              <a:buChar char="•"/>
-            </a:pPr>
-            <a:r>
-              <a:rPr lang="en-US" sz="1800" b="0" i="0" u="none" strike="noStrike">
-                <a:solidFill>
-                  <a:srgbClr val="000000"/>
-                </a:solidFill>
-                <a:effectLst/>
-                <a:latin typeface="Arial" panose="020B0604020202020204" pitchFamily="34" charset="0"/>
-              </a:rPr>
-              <a:t>Team presents  the data pipeline.</a:t>
-            </a:r>
-          </a:p>
-          <a:p>
-            <a:pPr rtl="0" fontAlgn="base">
-              <a:spcBef>
-                <a:spcPts val="0"/>
-              </a:spcBef>
-              <a:spcAft>
-                <a:spcPts val="0"/>
-              </a:spcAft>
-              <a:buFont typeface="Arial" panose="020B0604020202020204" pitchFamily="34" charset="0"/>
-              <a:buChar char="•"/>
-            </a:pPr>
-            <a:r>
-              <a:rPr lang="en-US" sz="1800" b="0" i="0" u="none" strike="noStrike">
-                <a:solidFill>
-                  <a:srgbClr val="000000"/>
-                </a:solidFill>
-                <a:effectLst/>
-                <a:latin typeface="Arial" panose="020B0604020202020204" pitchFamily="34" charset="0"/>
-              </a:rPr>
-              <a:t>The modeling techniques  being used or considered are presented</a:t>
-            </a:r>
-          </a:p>
-          <a:p>
-            <a:pPr rtl="0" fontAlgn="base">
-              <a:spcBef>
-                <a:spcPts val="0"/>
-              </a:spcBef>
-              <a:spcAft>
-                <a:spcPts val="0"/>
-              </a:spcAft>
-              <a:buFont typeface="Arial" panose="020B0604020202020204" pitchFamily="34" charset="0"/>
-              <a:buChar char="•"/>
-            </a:pPr>
-            <a:r>
-              <a:rPr lang="en-US" sz="1800" b="0" i="0" u="none" strike="noStrike">
-                <a:solidFill>
-                  <a:srgbClr val="000000"/>
-                </a:solidFill>
-                <a:effectLst/>
-                <a:latin typeface="Arial" panose="020B0604020202020204" pitchFamily="34" charset="0"/>
-              </a:rPr>
-              <a:t>The current modeling results are presented</a:t>
-            </a:r>
-          </a:p>
-          <a:p>
-            <a:pPr rtl="0" fontAlgn="base">
-              <a:spcBef>
-                <a:spcPts val="0"/>
-              </a:spcBef>
-              <a:spcAft>
-                <a:spcPts val="0"/>
-              </a:spcAft>
-              <a:buFont typeface="Arial" panose="020B0604020202020204" pitchFamily="34" charset="0"/>
-              <a:buChar char="•"/>
-            </a:pPr>
-            <a:r>
-              <a:rPr lang="en-US" sz="1800" b="0" i="0" u="none" strike="noStrike">
-                <a:solidFill>
-                  <a:srgbClr val="000000"/>
-                </a:solidFill>
-                <a:effectLst/>
-                <a:latin typeface="Arial" panose="020B0604020202020204" pitchFamily="34" charset="0"/>
-              </a:rPr>
-              <a:t>Team described the tradeoffs in different modeling techniques</a:t>
-            </a:r>
-          </a:p>
-          <a:p>
-            <a:pPr rtl="0" fontAlgn="base">
-              <a:spcBef>
-                <a:spcPts val="0"/>
-              </a:spcBef>
-              <a:spcAft>
-                <a:spcPts val="0"/>
-              </a:spcAft>
-              <a:buFont typeface="Arial" panose="020B0604020202020204" pitchFamily="34" charset="0"/>
-              <a:buChar char="•"/>
-            </a:pPr>
-            <a:r>
-              <a:rPr lang="en-US" sz="1800" b="0" i="0" u="none" strike="noStrike">
-                <a:solidFill>
-                  <a:srgbClr val="000000"/>
-                </a:solidFill>
-                <a:effectLst/>
-                <a:latin typeface="Arial" panose="020B0604020202020204" pitchFamily="34" charset="0"/>
-              </a:rPr>
-              <a:t>Team described how they will evaluate the model results.</a:t>
-            </a:r>
-          </a:p>
-          <a:p>
-            <a:pPr rtl="0" fontAlgn="base">
-              <a:spcBef>
-                <a:spcPts val="0"/>
-              </a:spcBef>
-              <a:spcAft>
-                <a:spcPts val="0"/>
-              </a:spcAft>
-              <a:buFont typeface="Arial" panose="020B0604020202020204" pitchFamily="34" charset="0"/>
-              <a:buChar char="•"/>
-            </a:pPr>
-            <a:r>
-              <a:rPr lang="en-US" sz="1800" b="0" i="0" u="none" strike="noStrike">
-                <a:solidFill>
-                  <a:srgbClr val="000000"/>
-                </a:solidFill>
-                <a:effectLst/>
-                <a:latin typeface="Arial" panose="020B0604020202020204" pitchFamily="34" charset="0"/>
-              </a:rPr>
-              <a:t>Team lists the challenges identified based on the results so far.</a:t>
-            </a:r>
-          </a:p>
-          <a:p>
-            <a:pPr rtl="0" fontAlgn="base">
-              <a:spcBef>
-                <a:spcPts val="0"/>
-              </a:spcBef>
-              <a:spcAft>
-                <a:spcPts val="0"/>
-              </a:spcAft>
-              <a:buFont typeface="Arial" panose="020B0604020202020204" pitchFamily="34" charset="0"/>
-              <a:buChar char="•"/>
-            </a:pPr>
-            <a:endParaRPr lang="en-US" sz="1800" b="0" i="0" u="none" strike="noStrike">
-              <a:solidFill>
-                <a:srgbClr val="000000"/>
-              </a:solidFill>
-              <a:effectLst/>
-              <a:latin typeface="Arial" panose="020B0604020202020204" pitchFamily="34" charset="0"/>
-            </a:endParaRPr>
-          </a:p>
-          <a:p>
-            <a:pPr marL="457200" marR="0" lvl="0" indent="-298450" algn="l" defTabSz="914400" rtl="0" eaLnBrk="1" fontAlgn="base" latinLnBrk="0" hangingPunct="1">
+            <a:pPr marL="0" marR="0" lvl="0" indent="0" algn="r" defTabSz="1015313" rtl="0" eaLnBrk="1" fontAlgn="auto" latinLnBrk="0" hangingPunct="1">
               <a:lnSpc>
                 <a:spcPct val="100000"/>
               </a:lnSpc>
@@ -2723,53 +2436,60 @@
               <a:spcAft>
                 <a:spcPts val="0"/>
               </a:spcAft>
-              <a:buClr>
-                <a:srgbClr val="000000"/>
-              </a:buClr>
-              <a:buSzPts val="1100"/>
-              <a:buFont typeface="Arial" panose="020B0604020202020204" pitchFamily="34" charset="0"/>
-              <a:buChar char="•"/>
+              <a:buClrTx/>
+              <a:buSzTx/>
+              <a:buFontTx/>
+              <a:buNone/>
               <a:tabLst/>
               <a:defRPr/>
             </a:pPr>
-            <a:r>
-              <a:rPr lang="en-US" sz="1800" b="0" i="0" u="none" strike="noStrike" cap="none">
-                <a:solidFill>
-                  <a:srgbClr val="000000"/>
+            <a:fld id="{07525D1A-9CA5-4E94-B922-48D4C7E4CB42}" type="slidenum">
+              <a:rPr kumimoji="0" lang="en-US" sz="1300" b="0" i="0" u="none" strike="noStrike" kern="1200" cap="none" spc="0" normalizeH="0" baseline="0" noProof="0">
+                <a:ln>
+                  <a:noFill/>
+                </a:ln>
+                <a:solidFill>
+                  <a:prstClr val="black"/>
                 </a:solidFill>
                 <a:effectLst/>
-                <a:latin typeface="Arial"/>
-                <a:ea typeface="Arial"/>
-                <a:cs typeface="Arial"/>
-                <a:sym typeface="Arial"/>
+                <a:uLnTx/>
+                <a:uFillTx/>
+                <a:latin typeface="Calibri" panose="020F0502020204030204"/>
+                <a:ea typeface="+mn-ea"/>
+                <a:cs typeface="+mn-cs"/>
               </a:rPr>
-              <a:t>We are currently using unsupervised clustering followed by a matching and sampling procedure to simulate a randomization process to create a treatment and control group. After that is done, we use statistical tests such as the T-test to generate causal insight. As a standard test of the null hypothesis, every time a test is run, we assume the sentencing for the treatment group ( black population), is the same as that of the control group (the white population) and based on the statistical significance and sample distribution, we decide whether we should reject the null and claim there is evidence of bias. We then quantify that bias with the treatment effect mean and confidence interval and store the results for UX visualizations to engage with our users.</a:t>
-            </a:r>
-            <a:endParaRPr lang="en-US" sz="3200" b="0" i="0" u="none" strike="noStrike">
+              <a:pPr marL="0" marR="0" lvl="0" indent="0" algn="r" defTabSz="1015313" rtl="0" eaLnBrk="1" fontAlgn="auto" latinLnBrk="0" hangingPunct="1">
+                <a:lnSpc>
+                  <a:spcPct val="100000"/>
+                </a:lnSpc>
+                <a:spcBef>
+                  <a:spcPts val="0"/>
+                </a:spcBef>
+                <a:spcAft>
+                  <a:spcPts val="0"/>
+                </a:spcAft>
+                <a:buClrTx/>
+                <a:buSzTx/>
+                <a:buFontTx/>
+                <a:buNone/>
+                <a:tabLst/>
+                <a:defRPr/>
+              </a:pPr>
+              <a:t>4</a:t>
+            </a:fld>
+            <a:endParaRPr kumimoji="0" lang="en-US" sz="1300" b="0" i="0" u="none" strike="noStrike" kern="1200" cap="none" spc="0" normalizeH="0" baseline="0" noProof="0">
+              <a:ln>
+                <a:noFill/>
+              </a:ln>
               <a:solidFill>
-                <a:srgbClr val="000000"/>
+                <a:prstClr val="black"/>
               </a:solidFill>
               <a:effectLst/>
-              <a:latin typeface="Arial" panose="020B0604020202020204" pitchFamily="34" charset="0"/>
-            </a:endParaRPr>
-          </a:p>
-          <a:p>
-            <a:pPr rtl="0" fontAlgn="base">
-              <a:spcBef>
-                <a:spcPts val="0"/>
-              </a:spcBef>
-              <a:spcAft>
-                <a:spcPts val="0"/>
-              </a:spcAft>
-              <a:buFont typeface="Arial" panose="020B0604020202020204" pitchFamily="34" charset="0"/>
-              <a:buChar char="•"/>
-            </a:pPr>
-            <a:endParaRPr lang="en-US" sz="1800" b="0" i="0" u="none" strike="noStrike">
-              <a:solidFill>
-                <a:srgbClr val="000000"/>
-              </a:solidFill>
-              <a:effectLst/>
-              <a:latin typeface="Arial" panose="020B0604020202020204" pitchFamily="34" charset="0"/>
+              <a:uLnTx/>
+              <a:uFillTx/>
+              <a:latin typeface="Calibri" panose="020F0502020204030204"/>
+              <a:ea typeface="+mn-ea"/>
+              <a:cs typeface="+mn-cs"/>
             </a:endParaRPr>
           </a:p>
         </p:txBody>
@@ -2777,7 +2497,7 @@
     </p:spTree>
     <p:extLst>
       <p:ext uri="{BB962C8B-B14F-4D97-AF65-F5344CB8AC3E}">
-        <p14:creationId xmlns:p14="http://schemas.microsoft.com/office/powerpoint/2010/main" val="2542702029"/>
+        <p14:creationId xmlns:p14="http://schemas.microsoft.com/office/powerpoint/2010/main" val="2586918697"/>
       </p:ext>
     </p:extLst>
   </p:cSld>
@@ -3243,7 +2963,7 @@
     </p:spTree>
     <p:extLst>
       <p:ext uri="{BB962C8B-B14F-4D97-AF65-F5344CB8AC3E}">
-        <p14:creationId xmlns:p14="http://schemas.microsoft.com/office/powerpoint/2010/main" val="622348654"/>
+        <p14:creationId xmlns:p14="http://schemas.microsoft.com/office/powerpoint/2010/main" val="2542702029"/>
       </p:ext>
     </p:extLst>
   </p:cSld>
@@ -3346,6 +3066,472 @@
               <a:buNone/>
             </a:pPr>
             <a:r>
+              <a:rPr lang="en-US" sz="1100" b="0" i="0" u="none" strike="noStrike" cap="none">
+                <a:solidFill>
+                  <a:srgbClr val="000000"/>
+                </a:solidFill>
+                <a:effectLst/>
+                <a:latin typeface="Arial"/>
+                <a:ea typeface="Arial"/>
+                <a:cs typeface="Arial"/>
+                <a:sym typeface="Arial"/>
+              </a:rPr>
+              <a:t> This is our architecture for predictive &amp; causal modelling . We start with standard preprocessing, feature selection and feature engineering. The processed data is then stored on Azure and ingested by the modeling. </a:t>
+            </a:r>
+          </a:p>
+          <a:p>
+            <a:pPr marL="158750" indent="0" rtl="0">
+              <a:spcBef>
+                <a:spcPts val="1800"/>
+              </a:spcBef>
+              <a:spcAft>
+                <a:spcPts val="600"/>
+              </a:spcAft>
+              <a:buNone/>
+            </a:pPr>
+            <a:r>
+              <a:rPr lang="en-US" sz="1100" b="0" i="0" u="none" strike="noStrike" cap="none">
+                <a:solidFill>
+                  <a:srgbClr val="000000"/>
+                </a:solidFill>
+                <a:effectLst/>
+                <a:latin typeface="Arial"/>
+                <a:ea typeface="Arial"/>
+                <a:cs typeface="Arial"/>
+                <a:sym typeface="Arial"/>
+              </a:rPr>
+              <a:t>You’ll notice that we’re running 2 models yielding both prediction &amp; causal results. This is to offer a robust product applying maximal </a:t>
+            </a:r>
+            <a:r>
+              <a:rPr lang="en-US" sz="1100" b="0" i="0" u="none" strike="noStrike" cap="none" err="1">
+                <a:solidFill>
+                  <a:srgbClr val="000000"/>
+                </a:solidFill>
+                <a:effectLst/>
+                <a:latin typeface="Arial"/>
+                <a:ea typeface="Arial"/>
+                <a:cs typeface="Arial"/>
+                <a:sym typeface="Arial"/>
+              </a:rPr>
+              <a:t>datascience</a:t>
+            </a:r>
+            <a:r>
+              <a:rPr lang="en-US" sz="1100" b="0" i="0" u="none" strike="noStrike" cap="none">
+                <a:solidFill>
+                  <a:srgbClr val="000000"/>
+                </a:solidFill>
+                <a:effectLst/>
+                <a:latin typeface="Arial"/>
+                <a:ea typeface="Arial"/>
+                <a:cs typeface="Arial"/>
+                <a:sym typeface="Arial"/>
+              </a:rPr>
+              <a:t> so as to provide both a statistical basis for assessment and as well offer a useful prediction based on prior sentencing patterns.</a:t>
+            </a:r>
+          </a:p>
+          <a:p>
+            <a:pPr marL="158750" indent="0" rtl="0">
+              <a:spcBef>
+                <a:spcPts val="1800"/>
+              </a:spcBef>
+              <a:spcAft>
+                <a:spcPts val="600"/>
+              </a:spcAft>
+              <a:buNone/>
+            </a:pPr>
+            <a:endParaRPr lang="en-US" sz="1800" b="0" i="0" u="none" strike="noStrike">
+              <a:solidFill>
+                <a:srgbClr val="000000"/>
+              </a:solidFill>
+              <a:effectLst/>
+              <a:latin typeface="Arial" panose="020B0604020202020204" pitchFamily="34" charset="0"/>
+            </a:endParaRPr>
+          </a:p>
+          <a:p>
+            <a:pPr marL="158750" indent="0" rtl="0">
+              <a:spcBef>
+                <a:spcPts val="1800"/>
+              </a:spcBef>
+              <a:spcAft>
+                <a:spcPts val="600"/>
+              </a:spcAft>
+              <a:buNone/>
+            </a:pPr>
+            <a:r>
+              <a:rPr lang="en-US" sz="1800" b="0" i="0" u="none" strike="noStrike">
+                <a:solidFill>
+                  <a:srgbClr val="000000"/>
+                </a:solidFill>
+                <a:effectLst/>
+                <a:latin typeface="Arial" panose="020B0604020202020204" pitchFamily="34" charset="0"/>
+              </a:rPr>
+              <a:t>Requirements:</a:t>
+            </a:r>
+          </a:p>
+          <a:p>
+            <a:pPr rtl="0">
+              <a:spcBef>
+                <a:spcPts val="1800"/>
+              </a:spcBef>
+              <a:spcAft>
+                <a:spcPts val="600"/>
+              </a:spcAft>
+            </a:pPr>
+            <a:r>
+              <a:rPr lang="en-US" sz="1800" b="0" i="0" u="none" strike="noStrike">
+                <a:solidFill>
+                  <a:srgbClr val="000000"/>
+                </a:solidFill>
+                <a:effectLst/>
+                <a:latin typeface="Arial" panose="020B0604020202020204" pitchFamily="34" charset="0"/>
+              </a:rPr>
+              <a:t>Technical discussion. </a:t>
+            </a:r>
+            <a:endParaRPr lang="en-US" b="1">
+              <a:effectLst/>
+            </a:endParaRPr>
+          </a:p>
+          <a:p>
+            <a:pPr rtl="0" fontAlgn="base">
+              <a:spcBef>
+                <a:spcPts val="0"/>
+              </a:spcBef>
+              <a:spcAft>
+                <a:spcPts val="0"/>
+              </a:spcAft>
+              <a:buFont typeface="Arial" panose="020B0604020202020204" pitchFamily="34" charset="0"/>
+              <a:buChar char="•"/>
+            </a:pPr>
+            <a:r>
+              <a:rPr lang="en-US" sz="1800" b="0" i="0" u="none" strike="noStrike">
+                <a:solidFill>
+                  <a:srgbClr val="000000"/>
+                </a:solidFill>
+                <a:effectLst/>
+                <a:latin typeface="Arial" panose="020B0604020202020204" pitchFamily="34" charset="0"/>
+              </a:rPr>
+              <a:t>Team presents the current overall architecture of the product</a:t>
+            </a:r>
+          </a:p>
+          <a:p>
+            <a:pPr rtl="0" fontAlgn="base">
+              <a:spcBef>
+                <a:spcPts val="0"/>
+              </a:spcBef>
+              <a:spcAft>
+                <a:spcPts val="0"/>
+              </a:spcAft>
+              <a:buFont typeface="Arial" panose="020B0604020202020204" pitchFamily="34" charset="0"/>
+              <a:buChar char="•"/>
+            </a:pPr>
+            <a:r>
+              <a:rPr lang="en-US" sz="1800" b="0" i="0" u="none" strike="noStrike">
+                <a:solidFill>
+                  <a:srgbClr val="000000"/>
+                </a:solidFill>
+                <a:effectLst/>
+                <a:latin typeface="Arial" panose="020B0604020202020204" pitchFamily="34" charset="0"/>
+              </a:rPr>
+              <a:t>Team presents  the data pipeline.</a:t>
+            </a:r>
+          </a:p>
+          <a:p>
+            <a:pPr rtl="0" fontAlgn="base">
+              <a:spcBef>
+                <a:spcPts val="0"/>
+              </a:spcBef>
+              <a:spcAft>
+                <a:spcPts val="0"/>
+              </a:spcAft>
+              <a:buFont typeface="Arial" panose="020B0604020202020204" pitchFamily="34" charset="0"/>
+              <a:buChar char="•"/>
+            </a:pPr>
+            <a:r>
+              <a:rPr lang="en-US" sz="1800" b="0" i="0" u="none" strike="noStrike">
+                <a:solidFill>
+                  <a:srgbClr val="000000"/>
+                </a:solidFill>
+                <a:effectLst/>
+                <a:latin typeface="Arial" panose="020B0604020202020204" pitchFamily="34" charset="0"/>
+              </a:rPr>
+              <a:t>The modeling techniques  being used or considered are presented</a:t>
+            </a:r>
+          </a:p>
+          <a:p>
+            <a:pPr rtl="0" fontAlgn="base">
+              <a:spcBef>
+                <a:spcPts val="0"/>
+              </a:spcBef>
+              <a:spcAft>
+                <a:spcPts val="0"/>
+              </a:spcAft>
+              <a:buFont typeface="Arial" panose="020B0604020202020204" pitchFamily="34" charset="0"/>
+              <a:buChar char="•"/>
+            </a:pPr>
+            <a:r>
+              <a:rPr lang="en-US" sz="1800" b="0" i="0" u="none" strike="noStrike">
+                <a:solidFill>
+                  <a:srgbClr val="000000"/>
+                </a:solidFill>
+                <a:effectLst/>
+                <a:latin typeface="Arial" panose="020B0604020202020204" pitchFamily="34" charset="0"/>
+              </a:rPr>
+              <a:t>The current modeling results are presented</a:t>
+            </a:r>
+          </a:p>
+          <a:p>
+            <a:pPr rtl="0" fontAlgn="base">
+              <a:spcBef>
+                <a:spcPts val="0"/>
+              </a:spcBef>
+              <a:spcAft>
+                <a:spcPts val="0"/>
+              </a:spcAft>
+              <a:buFont typeface="Arial" panose="020B0604020202020204" pitchFamily="34" charset="0"/>
+              <a:buChar char="•"/>
+            </a:pPr>
+            <a:r>
+              <a:rPr lang="en-US" sz="1800" b="0" i="0" u="none" strike="noStrike">
+                <a:solidFill>
+                  <a:srgbClr val="000000"/>
+                </a:solidFill>
+                <a:effectLst/>
+                <a:latin typeface="Arial" panose="020B0604020202020204" pitchFamily="34" charset="0"/>
+              </a:rPr>
+              <a:t>Team described the tradeoffs in different modeling techniques</a:t>
+            </a:r>
+          </a:p>
+          <a:p>
+            <a:pPr rtl="0" fontAlgn="base">
+              <a:spcBef>
+                <a:spcPts val="0"/>
+              </a:spcBef>
+              <a:spcAft>
+                <a:spcPts val="0"/>
+              </a:spcAft>
+              <a:buFont typeface="Arial" panose="020B0604020202020204" pitchFamily="34" charset="0"/>
+              <a:buChar char="•"/>
+            </a:pPr>
+            <a:r>
+              <a:rPr lang="en-US" sz="1800" b="0" i="0" u="none" strike="noStrike">
+                <a:solidFill>
+                  <a:srgbClr val="000000"/>
+                </a:solidFill>
+                <a:effectLst/>
+                <a:latin typeface="Arial" panose="020B0604020202020204" pitchFamily="34" charset="0"/>
+              </a:rPr>
+              <a:t>Team described how they will evaluate the model results.</a:t>
+            </a:r>
+          </a:p>
+          <a:p>
+            <a:pPr rtl="0" fontAlgn="base">
+              <a:spcBef>
+                <a:spcPts val="0"/>
+              </a:spcBef>
+              <a:spcAft>
+                <a:spcPts val="0"/>
+              </a:spcAft>
+              <a:buFont typeface="Arial" panose="020B0604020202020204" pitchFamily="34" charset="0"/>
+              <a:buChar char="•"/>
+            </a:pPr>
+            <a:r>
+              <a:rPr lang="en-US" sz="1800" b="0" i="0" u="none" strike="noStrike">
+                <a:solidFill>
+                  <a:srgbClr val="000000"/>
+                </a:solidFill>
+                <a:effectLst/>
+                <a:latin typeface="Arial" panose="020B0604020202020204" pitchFamily="34" charset="0"/>
+              </a:rPr>
+              <a:t>Team lists the challenges identified based on the results so far.</a:t>
+            </a:r>
+          </a:p>
+          <a:p>
+            <a:pPr rtl="0" fontAlgn="base">
+              <a:spcBef>
+                <a:spcPts val="0"/>
+              </a:spcBef>
+              <a:spcAft>
+                <a:spcPts val="0"/>
+              </a:spcAft>
+              <a:buFont typeface="Arial" panose="020B0604020202020204" pitchFamily="34" charset="0"/>
+              <a:buChar char="•"/>
+            </a:pPr>
+            <a:endParaRPr lang="en-US" sz="1800" b="0" i="0" u="none" strike="noStrike">
+              <a:solidFill>
+                <a:srgbClr val="000000"/>
+              </a:solidFill>
+              <a:effectLst/>
+              <a:latin typeface="Arial" panose="020B0604020202020204" pitchFamily="34" charset="0"/>
+            </a:endParaRPr>
+          </a:p>
+          <a:p>
+            <a:pPr marL="457200" marR="0" lvl="0" indent="-298450" algn="l" defTabSz="914400" rtl="0" eaLnBrk="1" fontAlgn="base" latinLnBrk="0" hangingPunct="1">
+              <a:lnSpc>
+                <a:spcPct val="100000"/>
+              </a:lnSpc>
+              <a:spcBef>
+                <a:spcPts val="0"/>
+              </a:spcBef>
+              <a:spcAft>
+                <a:spcPts val="0"/>
+              </a:spcAft>
+              <a:buClr>
+                <a:srgbClr val="000000"/>
+              </a:buClr>
+              <a:buSzPts val="1100"/>
+              <a:buFont typeface="Arial" panose="020B0604020202020204" pitchFamily="34" charset="0"/>
+              <a:buChar char="•"/>
+              <a:tabLst/>
+              <a:defRPr/>
+            </a:pPr>
+            <a:r>
+              <a:rPr lang="en-US" sz="1800" b="0" i="0" u="none" strike="noStrike" cap="none">
+                <a:solidFill>
+                  <a:srgbClr val="000000"/>
+                </a:solidFill>
+                <a:effectLst/>
+                <a:latin typeface="Arial"/>
+                <a:ea typeface="Arial"/>
+                <a:cs typeface="Arial"/>
+                <a:sym typeface="Arial"/>
+              </a:rPr>
+              <a:t>We are currently using unsupervised clustering followed by a matching and sampling procedure to simulate a randomization process to create a treatment and control group. After that is done, we use statistical tests such as the T-test to generate causal insight. As a standard test of the null hypothesis, every time a test is run, we assume the sentencing for the treatment group ( black population), is the same as that of the control group (the white population) and based on the statistical significance and sample distribution, we decide whether we should reject the null and claim there is evidence of bias. We then quantify that bias with the treatment effect mean and confidence interval and store the results for UX visualizations to engage with our users.</a:t>
+            </a:r>
+            <a:endParaRPr lang="en-US" sz="3200" b="0" i="0" u="none" strike="noStrike">
+              <a:solidFill>
+                <a:srgbClr val="000000"/>
+              </a:solidFill>
+              <a:effectLst/>
+              <a:latin typeface="Arial" panose="020B0604020202020204" pitchFamily="34" charset="0"/>
+            </a:endParaRPr>
+          </a:p>
+          <a:p>
+            <a:pPr rtl="0" fontAlgn="base">
+              <a:spcBef>
+                <a:spcPts val="0"/>
+              </a:spcBef>
+              <a:spcAft>
+                <a:spcPts val="0"/>
+              </a:spcAft>
+              <a:buFont typeface="Arial" panose="020B0604020202020204" pitchFamily="34" charset="0"/>
+              <a:buChar char="•"/>
+            </a:pPr>
+            <a:endParaRPr lang="en-US" sz="1800" b="0" i="0" u="none" strike="noStrike">
+              <a:solidFill>
+                <a:srgbClr val="000000"/>
+              </a:solidFill>
+              <a:effectLst/>
+              <a:latin typeface="Arial" panose="020B0604020202020204" pitchFamily="34" charset="0"/>
+            </a:endParaRPr>
+          </a:p>
+        </p:txBody>
+      </p:sp>
+    </p:spTree>
+    <p:extLst>
+      <p:ext uri="{BB962C8B-B14F-4D97-AF65-F5344CB8AC3E}">
+        <p14:creationId xmlns:p14="http://schemas.microsoft.com/office/powerpoint/2010/main" val="622348654"/>
+      </p:ext>
+    </p:extLst>
+  </p:cSld>
+  <p:clrMapOvr>
+    <a:masterClrMapping/>
+  </p:clrMapOvr>
+</p:notes>
+</file>
+
+<file path=ppt/notesSlides/notesSlide7.xml><?xml version="1.0" encoding="utf-8"?>
+<p:notes xmlns:a="http://schemas.openxmlformats.org/drawingml/2006/main" xmlns:r="http://schemas.openxmlformats.org/officeDocument/2006/relationships" xmlns:p="http://schemas.openxmlformats.org/presentationml/2006/main" showMasterSp="0" showMasterPhAnim="0">
+  <p:cSld>
+    <p:spTree>
+      <p:nvGrpSpPr>
+        <p:cNvPr id="1" name="Shape 648"/>
+        <p:cNvGrpSpPr/>
+        <p:nvPr/>
+      </p:nvGrpSpPr>
+      <p:grpSpPr>
+        <a:xfrm>
+          <a:off x="0" y="0"/>
+          <a:ext cx="0" cy="0"/>
+          <a:chOff x="0" y="0"/>
+          <a:chExt cx="0" cy="0"/>
+        </a:xfrm>
+      </p:grpSpPr>
+      <p:sp>
+        <p:nvSpPr>
+          <p:cNvPr id="649" name="Google Shape;649;g75f465780c_0_1803:notes"/>
+          <p:cNvSpPr>
+            <a:spLocks noGrp="1" noRot="1" noChangeAspect="1"/>
+          </p:cNvSpPr>
+          <p:nvPr>
+            <p:ph type="sldImg" idx="2"/>
+          </p:nvPr>
+        </p:nvSpPr>
+        <p:spPr>
+          <a:xfrm>
+            <a:off x="381000" y="685800"/>
+            <a:ext cx="6096000" cy="3429000"/>
+          </a:xfrm>
+          <a:custGeom>
+            <a:avLst/>
+            <a:gdLst/>
+            <a:ahLst/>
+            <a:cxnLst/>
+            <a:rect l="l" t="t" r="r" b="b"/>
+            <a:pathLst>
+              <a:path w="120000" h="120000" extrusionOk="0">
+                <a:moveTo>
+                  <a:pt x="0" y="0"/>
+                </a:moveTo>
+                <a:lnTo>
+                  <a:pt x="120000" y="0"/>
+                </a:lnTo>
+                <a:lnTo>
+                  <a:pt x="120000" y="120000"/>
+                </a:lnTo>
+                <a:lnTo>
+                  <a:pt x="0" y="120000"/>
+                </a:lnTo>
+                <a:close/>
+              </a:path>
+            </a:pathLst>
+          </a:custGeom>
+        </p:spPr>
+      </p:sp>
+      <p:sp>
+        <p:nvSpPr>
+          <p:cNvPr id="650" name="Google Shape;650;g75f465780c_0_1803:notes"/>
+          <p:cNvSpPr txBox="1">
+            <a:spLocks noGrp="1"/>
+          </p:cNvSpPr>
+          <p:nvPr>
+            <p:ph type="body" idx="1"/>
+          </p:nvPr>
+        </p:nvSpPr>
+        <p:spPr>
+          <a:xfrm>
+            <a:off x="685800" y="4343400"/>
+            <a:ext cx="5486400" cy="4114800"/>
+          </a:xfrm>
+          <a:prstGeom prst="rect">
+            <a:avLst/>
+          </a:prstGeom>
+        </p:spPr>
+        <p:txBody>
+          <a:bodyPr spcFirstLastPara="1" wrap="square" lIns="91425" tIns="91425" rIns="91425" bIns="91425" anchor="t" anchorCtr="0">
+            <a:noAutofit/>
+          </a:bodyPr>
+          <a:lstStyle/>
+          <a:p>
+            <a:pPr marL="158750" indent="0" rtl="0">
+              <a:spcBef>
+                <a:spcPts val="1800"/>
+              </a:spcBef>
+              <a:spcAft>
+                <a:spcPts val="600"/>
+              </a:spcAft>
+              <a:buNone/>
+            </a:pPr>
+            <a:r>
               <a:rPr lang="en-US" sz="1100" b="0" i="0" u="none" strike="noStrike" cap="none" dirty="0">
                 <a:solidFill>
                   <a:srgbClr val="000000"/>
@@ -3719,7 +3905,7 @@
 </p:notes>
 </file>
 
-<file path=ppt/notesSlides/notesSlide7.xml><?xml version="1.0" encoding="utf-8"?>
+<file path=ppt/notesSlides/notesSlide8.xml><?xml version="1.0" encoding="utf-8"?>
 <p:notes xmlns:a="http://schemas.openxmlformats.org/drawingml/2006/main" xmlns:r="http://schemas.openxmlformats.org/officeDocument/2006/relationships" xmlns:p="http://schemas.openxmlformats.org/presentationml/2006/main" showMasterSp="0" showMasterPhAnim="0">
   <p:cSld>
     <p:spTree>
@@ -25134,13 +25320,13 @@
   <p:clrMapOvr>
     <a:masterClrMapping/>
   </p:clrMapOvr>
-  <mc:AlternateContent xmlns:mc="http://schemas.openxmlformats.org/markup-compatibility/2006">
-    <mc:Choice xmlns:p14="http://schemas.microsoft.com/office/powerpoint/2010/main" Requires="p14">
+  <mc:AlternateContent xmlns:mc="http://schemas.openxmlformats.org/markup-compatibility/2006" xmlns:p14="http://schemas.microsoft.com/office/powerpoint/2010/main">
+    <mc:Choice Requires="p14">
       <p:transition spd="slow" p14:dur="3400">
         <p14:reveal/>
       </p:transition>
     </mc:Choice>
-    <mc:Fallback>
+    <mc:Fallback xmlns="">
       <p:transition spd="slow">
         <p:fade/>
       </p:transition>
@@ -27052,6 +27238,2094 @@
           <p:cNvPr id="31" name="TextBox 30">
             <a:extLst>
               <a:ext uri="{FF2B5EF4-FFF2-40B4-BE49-F238E27FC236}">
+                <a16:creationId xmlns:a16="http://schemas.microsoft.com/office/drawing/2014/main" id="{83303F25-04CE-4148-AE22-552B5BF809ED}"/>
+              </a:ext>
+            </a:extLst>
+          </p:cNvPr>
+          <p:cNvSpPr txBox="1"/>
+          <p:nvPr/>
+        </p:nvSpPr>
+        <p:spPr>
+          <a:xfrm>
+            <a:off x="9024126" y="3837412"/>
+            <a:ext cx="2404742" cy="769441"/>
+          </a:xfrm>
+          <a:prstGeom prst="rect">
+            <a:avLst/>
+          </a:prstGeom>
+          <a:noFill/>
+        </p:spPr>
+        <p:txBody>
+          <a:bodyPr wrap="square" rtlCol="0">
+            <a:spAutoFit/>
+          </a:bodyPr>
+          <a:lstStyle/>
+          <a:p>
+            <a:r>
+              <a:rPr lang="en-US" sz="1100" b="1" dirty="0">
+                <a:solidFill>
+                  <a:schemeClr val="accent5"/>
+                </a:solidFill>
+              </a:rPr>
+              <a:t>Model Inputs</a:t>
+            </a:r>
+            <a:r>
+              <a:rPr lang="en-US" sz="1100" dirty="0">
+                <a:solidFill>
+                  <a:schemeClr val="accent5"/>
+                </a:solidFill>
+              </a:rPr>
+              <a:t>: Age, Gender, </a:t>
+            </a:r>
+            <a:r>
+              <a:rPr lang="en-US" sz="1100" dirty="0" err="1">
+                <a:solidFill>
+                  <a:schemeClr val="accent5"/>
+                </a:solidFill>
+              </a:rPr>
+              <a:t>Totpts</a:t>
+            </a:r>
+            <a:r>
+              <a:rPr lang="en-US" sz="1100" dirty="0">
+                <a:solidFill>
+                  <a:schemeClr val="accent5"/>
+                </a:solidFill>
+              </a:rPr>
+              <a:t>. </a:t>
+            </a:r>
+          </a:p>
+          <a:p>
+            <a:r>
+              <a:rPr lang="en-US" sz="1100" b="1">
+                <a:solidFill>
+                  <a:schemeClr val="accent5"/>
+                </a:solidFill>
+              </a:rPr>
+              <a:t>Segmented by</a:t>
+            </a:r>
+            <a:r>
+              <a:rPr lang="en-US" sz="1100">
+                <a:solidFill>
+                  <a:schemeClr val="accent5"/>
+                </a:solidFill>
+              </a:rPr>
+              <a:t> </a:t>
+            </a:r>
+            <a:r>
+              <a:rPr lang="en-US" sz="1100" dirty="0">
+                <a:solidFill>
+                  <a:schemeClr val="accent5"/>
+                </a:solidFill>
+              </a:rPr>
+              <a:t>Crime Type</a:t>
+            </a:r>
+            <a:r>
+              <a:rPr lang="en-US" sz="1100">
+                <a:solidFill>
+                  <a:schemeClr val="accent5"/>
+                </a:solidFill>
+              </a:rPr>
+              <a:t>, geo-locations,</a:t>
+            </a:r>
+            <a:r>
+              <a:rPr lang="en-US" sz="1100" b="1">
+                <a:solidFill>
+                  <a:schemeClr val="accent5"/>
+                </a:solidFill>
+              </a:rPr>
+              <a:t> </a:t>
+            </a:r>
+            <a:r>
+              <a:rPr lang="en-US" sz="1100">
+                <a:solidFill>
+                  <a:schemeClr val="accent5"/>
+                </a:solidFill>
+              </a:rPr>
+              <a:t>*Judge</a:t>
+            </a:r>
+            <a:endParaRPr lang="en-US" sz="1100" dirty="0">
+              <a:solidFill>
+                <a:schemeClr val="accent5"/>
+              </a:solidFill>
+            </a:endParaRPr>
+          </a:p>
+        </p:txBody>
+      </p:sp>
+      <p:sp>
+        <p:nvSpPr>
+          <p:cNvPr id="32" name="TextBox 31">
+            <a:extLst>
+              <a:ext uri="{FF2B5EF4-FFF2-40B4-BE49-F238E27FC236}">
+                <a16:creationId xmlns:a16="http://schemas.microsoft.com/office/drawing/2014/main" id="{A9408A4D-7598-5E4A-A2FD-3375A50ACE5F}"/>
+              </a:ext>
+            </a:extLst>
+          </p:cNvPr>
+          <p:cNvSpPr txBox="1"/>
+          <p:nvPr/>
+        </p:nvSpPr>
+        <p:spPr>
+          <a:xfrm>
+            <a:off x="9081746" y="6026239"/>
+            <a:ext cx="2404742" cy="769441"/>
+          </a:xfrm>
+          <a:prstGeom prst="rect">
+            <a:avLst/>
+          </a:prstGeom>
+          <a:noFill/>
+        </p:spPr>
+        <p:txBody>
+          <a:bodyPr wrap="square" rtlCol="0">
+            <a:spAutoFit/>
+          </a:bodyPr>
+          <a:lstStyle/>
+          <a:p>
+            <a:r>
+              <a:rPr lang="en-US" sz="1100" b="1" dirty="0">
+                <a:solidFill>
+                  <a:schemeClr val="accent5"/>
+                </a:solidFill>
+              </a:rPr>
+              <a:t>Model Output</a:t>
+            </a:r>
+            <a:r>
+              <a:rPr lang="en-US" sz="1100" dirty="0">
+                <a:solidFill>
+                  <a:schemeClr val="accent5"/>
+                </a:solidFill>
+              </a:rPr>
+              <a:t>: Sentence Difference in Days, confidence interval and p-value for the Difference</a:t>
+            </a:r>
+          </a:p>
+        </p:txBody>
+      </p:sp>
+    </p:spTree>
+    <p:extLst>
+      <p:ext uri="{BB962C8B-B14F-4D97-AF65-F5344CB8AC3E}">
+        <p14:creationId xmlns:p14="http://schemas.microsoft.com/office/powerpoint/2010/main" val="1285128099"/>
+      </p:ext>
+    </p:extLst>
+  </p:cSld>
+  <p:clrMapOvr>
+    <a:masterClrMapping/>
+  </p:clrMapOvr>
+  <mc:AlternateContent xmlns:mc="http://schemas.openxmlformats.org/markup-compatibility/2006" xmlns:p14="http://schemas.microsoft.com/office/powerpoint/2010/main">
+    <mc:Choice Requires="p14">
+      <p:transition spd="slow" p14:dur="3400">
+        <p14:reveal/>
+      </p:transition>
+    </mc:Choice>
+    <mc:Fallback xmlns="">
+      <p:transition spd="slow">
+        <p:fade/>
+      </p:transition>
+    </mc:Fallback>
+  </mc:AlternateContent>
+</p:sld>
+</file>
+
+<file path=ppt/slides/slide4.xml><?xml version="1.0" encoding="utf-8"?>
+<p:sld xmlns:a="http://schemas.openxmlformats.org/drawingml/2006/main" xmlns:r="http://schemas.openxmlformats.org/officeDocument/2006/relationships" xmlns:p="http://schemas.openxmlformats.org/presentationml/2006/main">
+  <p:cSld>
+    <p:spTree>
+      <p:nvGrpSpPr>
+        <p:cNvPr id="1" name=""/>
+        <p:cNvGrpSpPr/>
+        <p:nvPr/>
+      </p:nvGrpSpPr>
+      <p:grpSpPr>
+        <a:xfrm>
+          <a:off x="0" y="0"/>
+          <a:ext cx="0" cy="0"/>
+          <a:chOff x="0" y="0"/>
+          <a:chExt cx="0" cy="0"/>
+        </a:xfrm>
+      </p:grpSpPr>
+      <p:sp>
+        <p:nvSpPr>
+          <p:cNvPr id="119" name="Rectangle 118">
+            <a:extLst>
+              <a:ext uri="{FF2B5EF4-FFF2-40B4-BE49-F238E27FC236}">
+                <a16:creationId xmlns:a16="http://schemas.microsoft.com/office/drawing/2014/main" id="{021114F5-194D-46DB-A300-4B8B395064F2}"/>
+              </a:ext>
+            </a:extLst>
+          </p:cNvPr>
+          <p:cNvSpPr/>
+          <p:nvPr/>
+        </p:nvSpPr>
+        <p:spPr>
+          <a:xfrm>
+            <a:off x="9064917" y="1213630"/>
+            <a:ext cx="2438400" cy="5564463"/>
+          </a:xfrm>
+          <a:prstGeom prst="rect">
+            <a:avLst/>
+          </a:prstGeom>
+          <a:solidFill>
+            <a:schemeClr val="tx1"/>
+          </a:solidFill>
+          <a:ln>
+            <a:solidFill>
+              <a:schemeClr val="tx1"/>
+            </a:solidFill>
+          </a:ln>
+        </p:spPr>
+        <p:style>
+          <a:lnRef idx="2">
+            <a:schemeClr val="accent1">
+              <a:shade val="50000"/>
+            </a:schemeClr>
+          </a:lnRef>
+          <a:fillRef idx="1">
+            <a:schemeClr val="accent1"/>
+          </a:fillRef>
+          <a:effectRef idx="0">
+            <a:schemeClr val="accent1"/>
+          </a:effectRef>
+          <a:fontRef idx="minor">
+            <a:schemeClr val="lt1"/>
+          </a:fontRef>
+        </p:style>
+        <p:txBody>
+          <a:bodyPr rtlCol="0" anchor="ctr"/>
+          <a:lstStyle/>
+          <a:p>
+            <a:pPr algn="ctr"/>
+            <a:endParaRPr lang="en-US" sz="2400"/>
+          </a:p>
+        </p:txBody>
+      </p:sp>
+      <p:sp>
+        <p:nvSpPr>
+          <p:cNvPr id="11" name="Title 10">
+            <a:extLst>
+              <a:ext uri="{FF2B5EF4-FFF2-40B4-BE49-F238E27FC236}">
+                <a16:creationId xmlns:a16="http://schemas.microsoft.com/office/drawing/2014/main" id="{37E23F2F-855D-4E5D-AFB5-36CDAD70EC34}"/>
+              </a:ext>
+            </a:extLst>
+          </p:cNvPr>
+          <p:cNvSpPr>
+            <a:spLocks noGrp="1"/>
+          </p:cNvSpPr>
+          <p:nvPr>
+            <p:ph type="title"/>
+          </p:nvPr>
+        </p:nvSpPr>
+        <p:spPr>
+          <a:xfrm>
+            <a:off x="413359" y="50875"/>
+            <a:ext cx="10972800" cy="772728"/>
+          </a:xfrm>
+        </p:spPr>
+        <p:txBody>
+          <a:bodyPr>
+            <a:normAutofit fontScale="90000"/>
+          </a:bodyPr>
+          <a:lstStyle/>
+          <a:p>
+            <a:pPr algn="ctr"/>
+            <a:r>
+              <a:rPr lang="en-US" sz="4000" dirty="0">
+                <a:latin typeface="Segoe UI" panose="020B0502040204020203" pitchFamily="34" charset="0"/>
+                <a:cs typeface="Segoe UI" panose="020B0502040204020203" pitchFamily="34" charset="0"/>
+              </a:rPr>
+              <a:t>DAATE MVP Causal Model Architecture</a:t>
+            </a:r>
+          </a:p>
+        </p:txBody>
+      </p:sp>
+      <p:sp>
+        <p:nvSpPr>
+          <p:cNvPr id="115" name="Rectangle 114">
+            <a:extLst>
+              <a:ext uri="{FF2B5EF4-FFF2-40B4-BE49-F238E27FC236}">
+                <a16:creationId xmlns:a16="http://schemas.microsoft.com/office/drawing/2014/main" id="{685F49E4-53E7-41BA-ABAA-9153A7ED27D0}"/>
+              </a:ext>
+            </a:extLst>
+          </p:cNvPr>
+          <p:cNvSpPr/>
+          <p:nvPr/>
+        </p:nvSpPr>
+        <p:spPr>
+          <a:xfrm>
+            <a:off x="61968" y="2949385"/>
+            <a:ext cx="1543120" cy="415498"/>
+          </a:xfrm>
+          <a:prstGeom prst="rect">
+            <a:avLst/>
+          </a:prstGeom>
+        </p:spPr>
+        <p:txBody>
+          <a:bodyPr wrap="square" lIns="121920" tIns="60960" rIns="121920" bIns="60960" anchor="t">
+            <a:spAutoFit/>
+          </a:bodyPr>
+          <a:lstStyle/>
+          <a:p>
+            <a:pPr defTabSz="913881">
+              <a:lnSpc>
+                <a:spcPct val="95000"/>
+              </a:lnSpc>
+              <a:spcBef>
+                <a:spcPct val="0"/>
+              </a:spcBef>
+              <a:spcAft>
+                <a:spcPct val="0"/>
+              </a:spcAft>
+              <a:defRPr/>
+            </a:pPr>
+            <a:r>
+              <a:rPr lang="en-US" sz="1000" b="1" spc="49" dirty="0">
+                <a:solidFill>
+                  <a:srgbClr val="F7F2E2"/>
+                </a:solidFill>
+                <a:latin typeface="Segoe UI Semibold"/>
+                <a:cs typeface="Segoe UI Semibold"/>
+              </a:rPr>
+              <a:t>Florida Department Of Corrections</a:t>
+            </a:r>
+            <a:endParaRPr lang="en-US" sz="2400" dirty="0">
+              <a:solidFill>
+                <a:srgbClr val="F7F2E2"/>
+              </a:solidFill>
+            </a:endParaRPr>
+          </a:p>
+        </p:txBody>
+      </p:sp>
+      <p:pic>
+        <p:nvPicPr>
+          <p:cNvPr id="46" name="Picture 45" descr="Logo&#10;&#10;Description automatically generated">
+            <a:extLst>
+              <a:ext uri="{FF2B5EF4-FFF2-40B4-BE49-F238E27FC236}">
+                <a16:creationId xmlns:a16="http://schemas.microsoft.com/office/drawing/2014/main" id="{AE548326-FB5F-4D36-B2A5-7BFF42ED2E7C}"/>
+              </a:ext>
+            </a:extLst>
+          </p:cNvPr>
+          <p:cNvPicPr>
+            <a:picLocks noChangeAspect="1"/>
+          </p:cNvPicPr>
+          <p:nvPr/>
+        </p:nvPicPr>
+        <p:blipFill>
+          <a:blip r:embed="rId3"/>
+          <a:stretch>
+            <a:fillRect/>
+          </a:stretch>
+        </p:blipFill>
+        <p:spPr>
+          <a:xfrm>
+            <a:off x="228470" y="1862288"/>
+            <a:ext cx="1014849" cy="1014849"/>
+          </a:xfrm>
+          <a:prstGeom prst="rect">
+            <a:avLst/>
+          </a:prstGeom>
+        </p:spPr>
+      </p:pic>
+      <p:sp>
+        <p:nvSpPr>
+          <p:cNvPr id="92" name="Rectangle 91">
+            <a:extLst>
+              <a:ext uri="{FF2B5EF4-FFF2-40B4-BE49-F238E27FC236}">
+                <a16:creationId xmlns:a16="http://schemas.microsoft.com/office/drawing/2014/main" id="{62E0DA5E-720F-479C-AF3A-9E634D5BBCB0}"/>
+              </a:ext>
+            </a:extLst>
+          </p:cNvPr>
+          <p:cNvSpPr/>
+          <p:nvPr/>
+        </p:nvSpPr>
+        <p:spPr bwMode="auto">
+          <a:xfrm>
+            <a:off x="1895583" y="1198521"/>
+            <a:ext cx="6789404" cy="5579572"/>
+          </a:xfrm>
+          <a:prstGeom prst="rect">
+            <a:avLst/>
+          </a:prstGeom>
+          <a:solidFill>
+            <a:srgbClr val="FFFFFF"/>
+          </a:solidFill>
+          <a:ln w="9525" cap="flat" cmpd="sng" algn="ctr">
+            <a:solidFill>
+              <a:srgbClr val="000000"/>
+            </a:solidFill>
+            <a:prstDash val="solid"/>
+            <a:headEnd type="none" w="med" len="med"/>
+            <a:tailEnd type="none" w="med" len="med"/>
+          </a:ln>
+          <a:effectLst>
+            <a:outerShdw blurRad="65500" dist="38100" dir="5400000" rotWithShape="0">
+              <a:srgbClr val="000000">
+                <a:alpha val="40000"/>
+              </a:srgbClr>
+            </a:outerShdw>
+          </a:effectLst>
+        </p:spPr>
+        <p:txBody>
+          <a:bodyPr vert="horz" wrap="square" lIns="121915" tIns="60957" rIns="121915" bIns="60957" numCol="1" rtlCol="0" anchor="t" anchorCtr="0" compatLnSpc="1">
+            <a:prstTxWarp prst="textNoShape">
+              <a:avLst/>
+            </a:prstTxWarp>
+          </a:bodyPr>
+          <a:lstStyle/>
+          <a:p>
+            <a:pPr algn="ctr" defTabSz="1218768" fontAlgn="base">
+              <a:spcBef>
+                <a:spcPct val="0"/>
+              </a:spcBef>
+              <a:spcAft>
+                <a:spcPct val="0"/>
+              </a:spcAft>
+              <a:defRPr/>
+            </a:pPr>
+            <a:endParaRPr lang="en-US" sz="2400" dirty="0">
+              <a:solidFill>
+                <a:srgbClr val="000000"/>
+              </a:solidFill>
+              <a:latin typeface="Segoe UI"/>
+              <a:cs typeface="Arial"/>
+              <a:sym typeface="Arial"/>
+            </a:endParaRPr>
+          </a:p>
+        </p:txBody>
+      </p:sp>
+      <p:sp>
+        <p:nvSpPr>
+          <p:cNvPr id="93" name="Rounded Rectangle 11">
+            <a:extLst>
+              <a:ext uri="{FF2B5EF4-FFF2-40B4-BE49-F238E27FC236}">
+                <a16:creationId xmlns:a16="http://schemas.microsoft.com/office/drawing/2014/main" id="{7999C9E9-E149-4E5F-907E-57BA989539A3}"/>
+              </a:ext>
+            </a:extLst>
+          </p:cNvPr>
+          <p:cNvSpPr/>
+          <p:nvPr/>
+        </p:nvSpPr>
+        <p:spPr bwMode="auto">
+          <a:xfrm>
+            <a:off x="4651222" y="1913650"/>
+            <a:ext cx="2497073" cy="912123"/>
+          </a:xfrm>
+          <a:prstGeom prst="roundRect">
+            <a:avLst/>
+          </a:prstGeom>
+          <a:gradFill rotWithShape="1">
+            <a:gsLst>
+              <a:gs pos="0">
+                <a:srgbClr val="3A94D2">
+                  <a:tint val="65000"/>
+                  <a:satMod val="270000"/>
+                </a:srgbClr>
+              </a:gs>
+              <a:gs pos="25000">
+                <a:srgbClr val="3A94D2">
+                  <a:tint val="60000"/>
+                  <a:satMod val="300000"/>
+                </a:srgbClr>
+              </a:gs>
+              <a:gs pos="100000">
+                <a:srgbClr val="3A94D2">
+                  <a:tint val="29000"/>
+                  <a:satMod val="400000"/>
+                </a:srgbClr>
+              </a:gs>
+            </a:gsLst>
+            <a:lin ang="16200000" scaled="1"/>
+          </a:gradFill>
+          <a:ln w="9525" cap="flat" cmpd="sng" algn="ctr">
+            <a:solidFill>
+              <a:srgbClr val="3A94D2">
+                <a:satMod val="150000"/>
+              </a:srgbClr>
+            </a:solidFill>
+            <a:prstDash val="solid"/>
+            <a:headEnd type="none" w="med" len="med"/>
+            <a:tailEnd type="none" w="med" len="med"/>
+          </a:ln>
+          <a:effectLst>
+            <a:outerShdw blurRad="65500" dist="38100" dir="5400000" rotWithShape="0">
+              <a:srgbClr val="000000">
+                <a:alpha val="40000"/>
+              </a:srgbClr>
+            </a:outerShdw>
+          </a:effectLst>
+        </p:spPr>
+        <p:txBody>
+          <a:bodyPr vert="horz" wrap="square" lIns="121915" tIns="60957" rIns="121915" bIns="60957" numCol="1" rtlCol="0" anchor="ctr" anchorCtr="0" compatLnSpc="1">
+            <a:prstTxWarp prst="textNoShape">
+              <a:avLst/>
+            </a:prstTxWarp>
+          </a:bodyPr>
+          <a:lstStyle/>
+          <a:p>
+            <a:pPr algn="ctr" defTabSz="1218768" fontAlgn="base">
+              <a:spcBef>
+                <a:spcPct val="0"/>
+              </a:spcBef>
+              <a:spcAft>
+                <a:spcPct val="0"/>
+              </a:spcAft>
+              <a:defRPr/>
+            </a:pPr>
+            <a:r>
+              <a:rPr lang="en-US" sz="1867" dirty="0">
+                <a:gradFill>
+                  <a:gsLst>
+                    <a:gs pos="0">
+                      <a:srgbClr val="FFFFFF"/>
+                    </a:gs>
+                    <a:gs pos="100000">
+                      <a:srgbClr val="FFFFFF"/>
+                    </a:gs>
+                  </a:gsLst>
+                  <a:lin ang="5400000" scaled="0"/>
+                </a:gradFill>
+                <a:latin typeface="Segoe UI"/>
+                <a:cs typeface="Arial"/>
+                <a:sym typeface="Arial"/>
+              </a:rPr>
+              <a:t>EDA, Cleansing etc.</a:t>
+            </a:r>
+          </a:p>
+        </p:txBody>
+      </p:sp>
+      <p:grpSp>
+        <p:nvGrpSpPr>
+          <p:cNvPr id="94" name="Group 116">
+            <a:extLst>
+              <a:ext uri="{FF2B5EF4-FFF2-40B4-BE49-F238E27FC236}">
+                <a16:creationId xmlns:a16="http://schemas.microsoft.com/office/drawing/2014/main" id="{01C0FB8C-2F2B-4170-8394-77AC09698548}"/>
+              </a:ext>
+            </a:extLst>
+          </p:cNvPr>
+          <p:cNvGrpSpPr/>
+          <p:nvPr/>
+        </p:nvGrpSpPr>
+        <p:grpSpPr>
+          <a:xfrm>
+            <a:off x="9554657" y="2758884"/>
+            <a:ext cx="986755" cy="1016000"/>
+            <a:chOff x="555334" y="4191000"/>
+            <a:chExt cx="587666" cy="609600"/>
+          </a:xfrm>
+        </p:grpSpPr>
+        <p:pic>
+          <p:nvPicPr>
+            <p:cNvPr id="95" name="Picture 3" descr="C:\Documents and Settings\antonk\Local Settings\Temporary Internet Files\Content.IE5\AV78XKCM\MCj04348450000[1].png">
+              <a:extLst>
+                <a:ext uri="{FF2B5EF4-FFF2-40B4-BE49-F238E27FC236}">
+                  <a16:creationId xmlns:a16="http://schemas.microsoft.com/office/drawing/2014/main" id="{720CBC3A-E74E-4FC7-B8E4-D26AE90673E2}"/>
+                </a:ext>
+              </a:extLst>
+            </p:cNvPr>
+            <p:cNvPicPr>
+              <a:picLocks noChangeAspect="1" noChangeArrowheads="1"/>
+            </p:cNvPicPr>
+            <p:nvPr/>
+          </p:nvPicPr>
+          <p:blipFill>
+            <a:blip r:embed="rId4" cstate="print"/>
+            <a:srcRect/>
+            <a:stretch>
+              <a:fillRect/>
+            </a:stretch>
+          </p:blipFill>
+          <p:spPr bwMode="auto">
+            <a:xfrm>
+              <a:off x="555334" y="4191000"/>
+              <a:ext cx="587666" cy="527538"/>
+            </a:xfrm>
+            <a:prstGeom prst="rect">
+              <a:avLst/>
+            </a:prstGeom>
+            <a:noFill/>
+          </p:spPr>
+        </p:pic>
+        <p:sp>
+          <p:nvSpPr>
+            <p:cNvPr id="96" name="Can 21">
+              <a:extLst>
+                <a:ext uri="{FF2B5EF4-FFF2-40B4-BE49-F238E27FC236}">
+                  <a16:creationId xmlns:a16="http://schemas.microsoft.com/office/drawing/2014/main" id="{34A24359-6A92-4311-B53B-0BE9DAB6053B}"/>
+                </a:ext>
+              </a:extLst>
+            </p:cNvPr>
+            <p:cNvSpPr/>
+            <p:nvPr/>
+          </p:nvSpPr>
+          <p:spPr>
+            <a:xfrm>
+              <a:off x="860133" y="4419600"/>
+              <a:ext cx="228600" cy="381000"/>
+            </a:xfrm>
+            <a:prstGeom prst="can">
+              <a:avLst/>
+            </a:prstGeom>
+            <a:gradFill rotWithShape="1">
+              <a:gsLst>
+                <a:gs pos="0">
+                  <a:srgbClr val="3A94D2">
+                    <a:shade val="45000"/>
+                    <a:satMod val="155000"/>
+                  </a:srgbClr>
+                </a:gs>
+                <a:gs pos="60000">
+                  <a:srgbClr val="3A94D2">
+                    <a:shade val="95000"/>
+                    <a:satMod val="150000"/>
+                  </a:srgbClr>
+                </a:gs>
+                <a:gs pos="100000">
+                  <a:srgbClr val="3A94D2">
+                    <a:tint val="87000"/>
+                    <a:satMod val="250000"/>
+                  </a:srgbClr>
+                </a:gs>
+              </a:gsLst>
+              <a:lin ang="16200000" scaled="0"/>
+            </a:gradFill>
+            <a:ln>
+              <a:noFill/>
+            </a:ln>
+            <a:effectLst>
+              <a:outerShdw blurRad="65500" dist="38100" dir="5400000" rotWithShape="0">
+                <a:srgbClr val="000000">
+                  <a:alpha val="40000"/>
+                </a:srgbClr>
+              </a:outerShdw>
+            </a:effectLst>
+            <a:scene3d>
+              <a:camera prst="orthographicFront" fov="0">
+                <a:rot lat="0" lon="0" rev="0"/>
+              </a:camera>
+              <a:lightRig rig="contrasting" dir="t">
+                <a:rot lat="0" lon="0" rev="12000000"/>
+              </a:lightRig>
+            </a:scene3d>
+            <a:sp3d prstMaterial="powder">
+              <a:bevelT h="50800"/>
+            </a:sp3d>
+          </p:spPr>
+          <p:txBody>
+            <a:bodyPr rtlCol="0" anchor="ctr"/>
+            <a:lstStyle/>
+            <a:p>
+              <a:pPr algn="ctr" defTabSz="1219120">
+                <a:defRPr/>
+              </a:pPr>
+              <a:endParaRPr lang="en-US" sz="1600">
+                <a:solidFill>
+                  <a:srgbClr val="8557C9">
+                    <a:lumMod val="25000"/>
+                  </a:srgbClr>
+                </a:solidFill>
+                <a:latin typeface="Segoe UI"/>
+                <a:cs typeface="Arial" pitchFamily="34" charset="0"/>
+                <a:sym typeface="Arial"/>
+              </a:endParaRPr>
+            </a:p>
+          </p:txBody>
+        </p:sp>
+      </p:grpSp>
+      <p:pic>
+        <p:nvPicPr>
+          <p:cNvPr id="97" name="Picture 2" descr="Bloomberg Professional Service">
+            <a:extLst>
+              <a:ext uri="{FF2B5EF4-FFF2-40B4-BE49-F238E27FC236}">
+                <a16:creationId xmlns:a16="http://schemas.microsoft.com/office/drawing/2014/main" id="{CFD5134D-7AE3-4851-984E-FC7483353F51}"/>
+              </a:ext>
+            </a:extLst>
+          </p:cNvPr>
+          <p:cNvPicPr>
+            <a:picLocks noChangeAspect="1" noChangeArrowheads="1"/>
+          </p:cNvPicPr>
+          <p:nvPr/>
+        </p:nvPicPr>
+        <p:blipFill>
+          <a:blip r:embed="rId5" cstate="print"/>
+          <a:srcRect l="2614" t="12749" r="3268" b="39442"/>
+          <a:stretch>
+            <a:fillRect/>
+          </a:stretch>
+        </p:blipFill>
+        <p:spPr bwMode="auto">
+          <a:xfrm>
+            <a:off x="9413369" y="1887939"/>
+            <a:ext cx="1930400" cy="804333"/>
+          </a:xfrm>
+          <a:prstGeom prst="rect">
+            <a:avLst/>
+          </a:prstGeom>
+          <a:noFill/>
+        </p:spPr>
+      </p:pic>
+      <p:cxnSp>
+        <p:nvCxnSpPr>
+          <p:cNvPr id="98" name="Curved Connector 24">
+            <a:extLst>
+              <a:ext uri="{FF2B5EF4-FFF2-40B4-BE49-F238E27FC236}">
+                <a16:creationId xmlns:a16="http://schemas.microsoft.com/office/drawing/2014/main" id="{9E1C9126-2517-4093-93EC-EEE17533B104}"/>
+              </a:ext>
+            </a:extLst>
+          </p:cNvPr>
+          <p:cNvCxnSpPr>
+            <a:cxnSpLocks/>
+            <a:stCxn id="93" idx="3"/>
+            <a:endCxn id="95" idx="1"/>
+          </p:cNvCxnSpPr>
+          <p:nvPr/>
+        </p:nvCxnSpPr>
+        <p:spPr>
+          <a:xfrm>
+            <a:off x="7148295" y="2369712"/>
+            <a:ext cx="2406362" cy="828787"/>
+          </a:xfrm>
+          <a:prstGeom prst="curvedConnector3">
+            <a:avLst>
+              <a:gd name="adj1" fmla="val 50000"/>
+            </a:avLst>
+          </a:prstGeom>
+          <a:noFill/>
+          <a:ln w="38100" cap="flat" cmpd="sng" algn="ctr">
+            <a:solidFill>
+              <a:srgbClr val="F38C37"/>
+            </a:solidFill>
+            <a:prstDash val="solid"/>
+            <a:tailEnd type="arrow"/>
+          </a:ln>
+          <a:effectLst>
+            <a:outerShdw blurRad="65500" dist="38100" dir="5400000" rotWithShape="0">
+              <a:srgbClr val="000000">
+                <a:alpha val="40000"/>
+              </a:srgbClr>
+            </a:outerShdw>
+          </a:effectLst>
+        </p:spPr>
+      </p:cxnSp>
+      <p:sp>
+        <p:nvSpPr>
+          <p:cNvPr id="99" name="Right Arrow 4">
+            <a:extLst>
+              <a:ext uri="{FF2B5EF4-FFF2-40B4-BE49-F238E27FC236}">
+                <a16:creationId xmlns:a16="http://schemas.microsoft.com/office/drawing/2014/main" id="{301F5C07-7FF1-4C90-8198-FC9C51216C7E}"/>
+              </a:ext>
+            </a:extLst>
+          </p:cNvPr>
+          <p:cNvSpPr/>
+          <p:nvPr/>
+        </p:nvSpPr>
+        <p:spPr bwMode="auto">
+          <a:xfrm>
+            <a:off x="1408238" y="1718424"/>
+            <a:ext cx="2837804" cy="1302579"/>
+          </a:xfrm>
+          <a:prstGeom prst="rightArrow">
+            <a:avLst/>
+          </a:prstGeom>
+          <a:gradFill rotWithShape="1">
+            <a:gsLst>
+              <a:gs pos="0">
+                <a:srgbClr val="F38C37">
+                  <a:shade val="45000"/>
+                  <a:satMod val="155000"/>
+                </a:srgbClr>
+              </a:gs>
+              <a:gs pos="60000">
+                <a:srgbClr val="F38C37">
+                  <a:shade val="95000"/>
+                  <a:satMod val="150000"/>
+                </a:srgbClr>
+              </a:gs>
+              <a:gs pos="100000">
+                <a:srgbClr val="F38C37">
+                  <a:tint val="87000"/>
+                  <a:satMod val="250000"/>
+                </a:srgbClr>
+              </a:gs>
+            </a:gsLst>
+            <a:lin ang="16200000" scaled="0"/>
+          </a:gradFill>
+          <a:ln w="9525" cap="flat" cmpd="sng" algn="ctr">
+            <a:solidFill>
+              <a:srgbClr val="F38C37">
+                <a:satMod val="150000"/>
+              </a:srgbClr>
+            </a:solidFill>
+            <a:prstDash val="solid"/>
+            <a:headEnd type="none" w="med" len="med"/>
+            <a:tailEnd type="none" w="med" len="med"/>
+          </a:ln>
+          <a:effectLst>
+            <a:outerShdw blurRad="65500" dist="38100" dir="5400000" rotWithShape="0">
+              <a:srgbClr val="000000">
+                <a:alpha val="40000"/>
+              </a:srgbClr>
+            </a:outerShdw>
+          </a:effectLst>
+        </p:spPr>
+        <p:txBody>
+          <a:bodyPr vert="horz" wrap="square" lIns="121915" tIns="60957" rIns="121915" bIns="60957" numCol="1" rtlCol="0" anchor="ctr" anchorCtr="0" compatLnSpc="1">
+            <a:prstTxWarp prst="textNoShape">
+              <a:avLst/>
+            </a:prstTxWarp>
+          </a:bodyPr>
+          <a:lstStyle/>
+          <a:p>
+            <a:pPr algn="ctr" defTabSz="1218768" fontAlgn="base">
+              <a:spcBef>
+                <a:spcPct val="0"/>
+              </a:spcBef>
+              <a:spcAft>
+                <a:spcPct val="0"/>
+              </a:spcAft>
+              <a:defRPr/>
+            </a:pPr>
+            <a:r>
+              <a:rPr lang="en-US" sz="2667" dirty="0">
+                <a:gradFill>
+                  <a:gsLst>
+                    <a:gs pos="0">
+                      <a:srgbClr val="FFFFFF"/>
+                    </a:gs>
+                    <a:gs pos="100000">
+                      <a:srgbClr val="FFFFFF"/>
+                    </a:gs>
+                  </a:gsLst>
+                  <a:lin ang="5400000" scaled="0"/>
+                </a:gradFill>
+                <a:latin typeface="Segoe UI"/>
+                <a:cs typeface="Arial"/>
+                <a:sym typeface="Arial"/>
+              </a:rPr>
+              <a:t>Data</a:t>
+            </a:r>
+          </a:p>
+        </p:txBody>
+      </p:sp>
+      <p:grpSp>
+        <p:nvGrpSpPr>
+          <p:cNvPr id="100" name="Group 99">
+            <a:extLst>
+              <a:ext uri="{FF2B5EF4-FFF2-40B4-BE49-F238E27FC236}">
+                <a16:creationId xmlns:a16="http://schemas.microsoft.com/office/drawing/2014/main" id="{CF4BF398-DC29-4145-A44F-5929ABA01800}"/>
+              </a:ext>
+            </a:extLst>
+          </p:cNvPr>
+          <p:cNvGrpSpPr/>
+          <p:nvPr/>
+        </p:nvGrpSpPr>
+        <p:grpSpPr>
+          <a:xfrm>
+            <a:off x="10682655" y="3102941"/>
+            <a:ext cx="712054" cy="626116"/>
+            <a:chOff x="3434328" y="3336433"/>
+            <a:chExt cx="1059543" cy="925108"/>
+          </a:xfrm>
+        </p:grpSpPr>
+        <p:pic>
+          <p:nvPicPr>
+            <p:cNvPr id="101" name="Picture 100">
+              <a:extLst>
+                <a:ext uri="{FF2B5EF4-FFF2-40B4-BE49-F238E27FC236}">
+                  <a16:creationId xmlns:a16="http://schemas.microsoft.com/office/drawing/2014/main" id="{7B733F0F-7616-470F-946A-7DDBCB30A8D2}"/>
+                </a:ext>
+              </a:extLst>
+            </p:cNvPr>
+            <p:cNvPicPr>
+              <a:picLocks noChangeAspect="1"/>
+            </p:cNvPicPr>
+            <p:nvPr/>
+          </p:nvPicPr>
+          <p:blipFill>
+            <a:blip r:embed="rId6" cstate="print">
+              <a:extLst>
+                <a:ext uri="{28A0092B-C50C-407E-A947-70E740481C1C}">
+                  <a14:useLocalDpi xmlns:a14="http://schemas.microsoft.com/office/drawing/2010/main"/>
+                </a:ext>
+              </a:extLst>
+            </a:blip>
+            <a:stretch>
+              <a:fillRect/>
+            </a:stretch>
+          </p:blipFill>
+          <p:spPr>
+            <a:xfrm>
+              <a:off x="3714959" y="3336433"/>
+              <a:ext cx="635521" cy="635521"/>
+            </a:xfrm>
+            <a:prstGeom prst="rect">
+              <a:avLst/>
+            </a:prstGeom>
+          </p:spPr>
+        </p:pic>
+        <p:sp>
+          <p:nvSpPr>
+            <p:cNvPr id="102" name="Rectangle 101">
+              <a:extLst>
+                <a:ext uri="{FF2B5EF4-FFF2-40B4-BE49-F238E27FC236}">
+                  <a16:creationId xmlns:a16="http://schemas.microsoft.com/office/drawing/2014/main" id="{1FD507AA-6950-4863-B20C-4A9044787D8B}"/>
+                </a:ext>
+              </a:extLst>
+            </p:cNvPr>
+            <p:cNvSpPr/>
+            <p:nvPr/>
+          </p:nvSpPr>
+          <p:spPr>
+            <a:xfrm>
+              <a:off x="3434328" y="3965953"/>
+              <a:ext cx="1059543" cy="295588"/>
+            </a:xfrm>
+            <a:prstGeom prst="rect">
+              <a:avLst/>
+            </a:prstGeom>
+          </p:spPr>
+          <p:txBody>
+            <a:bodyPr wrap="none">
+              <a:spAutoFit/>
+            </a:bodyPr>
+            <a:lstStyle/>
+            <a:p>
+              <a:pPr algn="ctr" defTabSz="932215"/>
+              <a:r>
+                <a:rPr lang="en-US" sz="700" kern="0">
+                  <a:solidFill>
+                    <a:prstClr val="white">
+                      <a:lumMod val="50000"/>
+                    </a:prstClr>
+                  </a:solidFill>
+                  <a:latin typeface="Segoe UI Semibold" panose="020B0702040204020203" pitchFamily="34" charset="0"/>
+                  <a:ea typeface="MS PGothic" panose="020B0600070205080204" pitchFamily="34" charset="-128"/>
+                  <a:cs typeface="Segoe UI Semibold" panose="020B0702040204020203" pitchFamily="34" charset="0"/>
+                  <a:sym typeface="Arial"/>
+                </a:rPr>
+                <a:t>AZURE SQL DB</a:t>
+              </a:r>
+            </a:p>
+          </p:txBody>
+        </p:sp>
+      </p:grpSp>
+      <p:sp>
+        <p:nvSpPr>
+          <p:cNvPr id="103" name="Rounded Rectangle 9">
+            <a:extLst>
+              <a:ext uri="{FF2B5EF4-FFF2-40B4-BE49-F238E27FC236}">
+                <a16:creationId xmlns:a16="http://schemas.microsoft.com/office/drawing/2014/main" id="{81413883-6C1C-4C1A-B1BB-B42D007C8525}"/>
+              </a:ext>
+            </a:extLst>
+          </p:cNvPr>
+          <p:cNvSpPr/>
+          <p:nvPr/>
+        </p:nvSpPr>
+        <p:spPr bwMode="auto">
+          <a:xfrm>
+            <a:off x="2234722" y="3130115"/>
+            <a:ext cx="3532798" cy="3380809"/>
+          </a:xfrm>
+          <a:prstGeom prst="roundRect">
+            <a:avLst/>
+          </a:prstGeom>
+          <a:solidFill>
+            <a:srgbClr val="0070C0"/>
+          </a:solidFill>
+          <a:ln w="9525" cap="flat" cmpd="sng" algn="ctr">
+            <a:solidFill>
+              <a:srgbClr val="3A94D2">
+                <a:satMod val="150000"/>
+              </a:srgbClr>
+            </a:solidFill>
+            <a:prstDash val="solid"/>
+            <a:headEnd type="none" w="med" len="med"/>
+            <a:tailEnd type="none" w="med" len="med"/>
+          </a:ln>
+          <a:effectLst>
+            <a:outerShdw blurRad="65500" dist="38100" dir="5400000" rotWithShape="0">
+              <a:srgbClr val="000000">
+                <a:alpha val="40000"/>
+              </a:srgbClr>
+            </a:outerShdw>
+          </a:effectLst>
+        </p:spPr>
+        <p:txBody>
+          <a:bodyPr vert="horz" wrap="square" lIns="121915" tIns="60957" rIns="121915" bIns="60957" numCol="1" rtlCol="0" anchor="ctr" anchorCtr="0" compatLnSpc="1">
+            <a:prstTxWarp prst="textNoShape">
+              <a:avLst/>
+            </a:prstTxWarp>
+          </a:bodyPr>
+          <a:lstStyle/>
+          <a:p>
+            <a:pPr algn="ctr" defTabSz="1218768" fontAlgn="base">
+              <a:spcBef>
+                <a:spcPct val="0"/>
+              </a:spcBef>
+              <a:spcAft>
+                <a:spcPct val="0"/>
+              </a:spcAft>
+              <a:defRPr/>
+            </a:pPr>
+            <a:endParaRPr lang="en-US" sz="2667">
+              <a:gradFill>
+                <a:gsLst>
+                  <a:gs pos="0">
+                    <a:srgbClr val="FFFFFF"/>
+                  </a:gs>
+                  <a:gs pos="100000">
+                    <a:srgbClr val="FFFFFF"/>
+                  </a:gs>
+                </a:gsLst>
+                <a:lin ang="5400000" scaled="0"/>
+              </a:gradFill>
+              <a:latin typeface="Segoe UI"/>
+              <a:cs typeface="Arial"/>
+              <a:sym typeface="Arial"/>
+            </a:endParaRPr>
+          </a:p>
+        </p:txBody>
+      </p:sp>
+      <p:sp>
+        <p:nvSpPr>
+          <p:cNvPr id="104" name="Rounded Rectangle 9">
+            <a:extLst>
+              <a:ext uri="{FF2B5EF4-FFF2-40B4-BE49-F238E27FC236}">
+                <a16:creationId xmlns:a16="http://schemas.microsoft.com/office/drawing/2014/main" id="{8F7524AC-68A6-453C-8749-2435CC547C76}"/>
+              </a:ext>
+            </a:extLst>
+          </p:cNvPr>
+          <p:cNvSpPr/>
+          <p:nvPr/>
+        </p:nvSpPr>
+        <p:spPr bwMode="auto">
+          <a:xfrm>
+            <a:off x="6465823" y="3436331"/>
+            <a:ext cx="1993345" cy="899236"/>
+          </a:xfrm>
+          <a:prstGeom prst="roundRect">
+            <a:avLst/>
+          </a:prstGeom>
+          <a:gradFill rotWithShape="1">
+            <a:gsLst>
+              <a:gs pos="0">
+                <a:srgbClr val="3A94D2">
+                  <a:tint val="65000"/>
+                  <a:satMod val="270000"/>
+                </a:srgbClr>
+              </a:gs>
+              <a:gs pos="25000">
+                <a:srgbClr val="3A94D2">
+                  <a:tint val="60000"/>
+                  <a:satMod val="300000"/>
+                </a:srgbClr>
+              </a:gs>
+              <a:gs pos="100000">
+                <a:srgbClr val="3A94D2">
+                  <a:tint val="29000"/>
+                  <a:satMod val="400000"/>
+                </a:srgbClr>
+              </a:gs>
+            </a:gsLst>
+            <a:lin ang="16200000" scaled="1"/>
+          </a:gradFill>
+          <a:ln w="9525" cap="flat" cmpd="sng" algn="ctr">
+            <a:solidFill>
+              <a:srgbClr val="3A94D2">
+                <a:satMod val="150000"/>
+              </a:srgbClr>
+            </a:solidFill>
+            <a:prstDash val="solid"/>
+            <a:headEnd type="none" w="med" len="med"/>
+            <a:tailEnd type="none" w="med" len="med"/>
+          </a:ln>
+          <a:effectLst>
+            <a:outerShdw blurRad="65500" dist="38100" dir="5400000" rotWithShape="0">
+              <a:srgbClr val="000000">
+                <a:alpha val="40000"/>
+              </a:srgbClr>
+            </a:outerShdw>
+          </a:effectLst>
+        </p:spPr>
+        <p:txBody>
+          <a:bodyPr vert="horz" wrap="square" lIns="121915" tIns="60957" rIns="121915" bIns="60957" numCol="1" rtlCol="0" anchor="ctr" anchorCtr="0" compatLnSpc="1">
+            <a:prstTxWarp prst="textNoShape">
+              <a:avLst/>
+            </a:prstTxWarp>
+          </a:bodyPr>
+          <a:lstStyle/>
+          <a:p>
+            <a:pPr algn="ctr" defTabSz="1218768" fontAlgn="base">
+              <a:spcBef>
+                <a:spcPct val="0"/>
+              </a:spcBef>
+              <a:spcAft>
+                <a:spcPct val="0"/>
+              </a:spcAft>
+              <a:defRPr/>
+            </a:pPr>
+            <a:r>
+              <a:rPr lang="en-US" dirty="0">
+                <a:gradFill>
+                  <a:gsLst>
+                    <a:gs pos="0">
+                      <a:srgbClr val="FFFFFF"/>
+                    </a:gs>
+                    <a:gs pos="100000">
+                      <a:srgbClr val="FFFFFF"/>
+                    </a:gs>
+                  </a:gsLst>
+                  <a:lin ang="5400000" scaled="0"/>
+                </a:gradFill>
+                <a:latin typeface="Segoe UI"/>
+                <a:cs typeface="Arial"/>
+                <a:sym typeface="Arial"/>
+              </a:rPr>
+              <a:t>Feature Space Identification</a:t>
+            </a:r>
+          </a:p>
+        </p:txBody>
+      </p:sp>
+      <p:sp>
+        <p:nvSpPr>
+          <p:cNvPr id="105" name="Rounded Rectangle 9">
+            <a:extLst>
+              <a:ext uri="{FF2B5EF4-FFF2-40B4-BE49-F238E27FC236}">
+                <a16:creationId xmlns:a16="http://schemas.microsoft.com/office/drawing/2014/main" id="{43C8943A-66D6-435A-8904-1BEFF40068DE}"/>
+              </a:ext>
+            </a:extLst>
+          </p:cNvPr>
+          <p:cNvSpPr/>
+          <p:nvPr/>
+        </p:nvSpPr>
+        <p:spPr bwMode="auto">
+          <a:xfrm>
+            <a:off x="2532183" y="4218826"/>
+            <a:ext cx="2932109" cy="949342"/>
+          </a:xfrm>
+          <a:prstGeom prst="roundRect">
+            <a:avLst/>
+          </a:prstGeom>
+          <a:gradFill rotWithShape="1">
+            <a:gsLst>
+              <a:gs pos="0">
+                <a:srgbClr val="3A94D2">
+                  <a:tint val="65000"/>
+                  <a:satMod val="270000"/>
+                </a:srgbClr>
+              </a:gs>
+              <a:gs pos="25000">
+                <a:srgbClr val="3A94D2">
+                  <a:tint val="60000"/>
+                  <a:satMod val="300000"/>
+                </a:srgbClr>
+              </a:gs>
+              <a:gs pos="100000">
+                <a:srgbClr val="3A94D2">
+                  <a:tint val="29000"/>
+                  <a:satMod val="400000"/>
+                </a:srgbClr>
+              </a:gs>
+            </a:gsLst>
+            <a:lin ang="16200000" scaled="1"/>
+          </a:gradFill>
+          <a:ln w="9525" cap="flat" cmpd="sng" algn="ctr">
+            <a:solidFill>
+              <a:srgbClr val="3A94D2">
+                <a:satMod val="150000"/>
+              </a:srgbClr>
+            </a:solidFill>
+            <a:prstDash val="solid"/>
+            <a:headEnd type="none" w="med" len="med"/>
+            <a:tailEnd type="none" w="med" len="med"/>
+          </a:ln>
+          <a:effectLst>
+            <a:outerShdw blurRad="65500" dist="38100" dir="5400000" rotWithShape="0">
+              <a:srgbClr val="000000">
+                <a:alpha val="40000"/>
+              </a:srgbClr>
+            </a:outerShdw>
+          </a:effectLst>
+        </p:spPr>
+        <p:txBody>
+          <a:bodyPr vert="horz" wrap="square" lIns="121915" tIns="60957" rIns="121915" bIns="60957" numCol="1" rtlCol="0" anchor="ctr" anchorCtr="0" compatLnSpc="1">
+            <a:prstTxWarp prst="textNoShape">
+              <a:avLst/>
+            </a:prstTxWarp>
+          </a:bodyPr>
+          <a:lstStyle/>
+          <a:p>
+            <a:pPr algn="ctr" defTabSz="1218768" fontAlgn="base">
+              <a:spcBef>
+                <a:spcPct val="0"/>
+              </a:spcBef>
+              <a:spcAft>
+                <a:spcPct val="0"/>
+              </a:spcAft>
+              <a:defRPr/>
+            </a:pPr>
+            <a:r>
+              <a:rPr lang="en-US" sz="1400" dirty="0">
+                <a:gradFill>
+                  <a:gsLst>
+                    <a:gs pos="0">
+                      <a:srgbClr val="FFFFFF"/>
+                    </a:gs>
+                    <a:gs pos="100000">
+                      <a:srgbClr val="FFFFFF"/>
+                    </a:gs>
+                  </a:gsLst>
+                  <a:lin ang="5400000" scaled="0"/>
+                </a:gradFill>
+                <a:latin typeface="Segoe UI"/>
+                <a:cs typeface="Arial"/>
+                <a:sym typeface="Arial"/>
+              </a:rPr>
+              <a:t>Distance-Based Clustering</a:t>
+            </a:r>
+          </a:p>
+          <a:p>
+            <a:pPr algn="ctr" defTabSz="1218768" fontAlgn="base">
+              <a:spcBef>
+                <a:spcPct val="0"/>
+              </a:spcBef>
+              <a:spcAft>
+                <a:spcPct val="0"/>
+              </a:spcAft>
+              <a:defRPr/>
+            </a:pPr>
+            <a:r>
+              <a:rPr lang="en-US" sz="1400" dirty="0">
+                <a:gradFill>
+                  <a:gsLst>
+                    <a:gs pos="0">
+                      <a:srgbClr val="FFFFFF"/>
+                    </a:gs>
+                    <a:gs pos="100000">
+                      <a:srgbClr val="FFFFFF"/>
+                    </a:gs>
+                  </a:gsLst>
+                  <a:lin ang="5400000" scaled="0"/>
+                </a:gradFill>
+                <a:latin typeface="Segoe UI"/>
+                <a:cs typeface="Arial"/>
+                <a:sym typeface="Arial"/>
+              </a:rPr>
+              <a:t>+</a:t>
+            </a:r>
+          </a:p>
+          <a:p>
+            <a:pPr algn="ctr" defTabSz="1218768" fontAlgn="base">
+              <a:spcBef>
+                <a:spcPct val="0"/>
+              </a:spcBef>
+              <a:spcAft>
+                <a:spcPct val="0"/>
+              </a:spcAft>
+              <a:defRPr/>
+            </a:pPr>
+            <a:r>
+              <a:rPr lang="en-US" sz="1400" dirty="0">
+                <a:gradFill>
+                  <a:gsLst>
+                    <a:gs pos="0">
+                      <a:srgbClr val="FFFFFF"/>
+                    </a:gs>
+                    <a:gs pos="100000">
+                      <a:srgbClr val="FFFFFF"/>
+                    </a:gs>
+                  </a:gsLst>
+                  <a:lin ang="5400000" scaled="0"/>
+                </a:gradFill>
+                <a:latin typeface="Segoe UI"/>
+                <a:cs typeface="Arial"/>
+                <a:sym typeface="Arial"/>
+              </a:rPr>
+              <a:t>Cluster Method Optimization</a:t>
+            </a:r>
+          </a:p>
+        </p:txBody>
+      </p:sp>
+      <p:cxnSp>
+        <p:nvCxnSpPr>
+          <p:cNvPr id="107" name="Curved Connector 24">
+            <a:extLst>
+              <a:ext uri="{FF2B5EF4-FFF2-40B4-BE49-F238E27FC236}">
+                <a16:creationId xmlns:a16="http://schemas.microsoft.com/office/drawing/2014/main" id="{643464BB-3AC0-4A4D-A90E-DE71980EB5CA}"/>
+              </a:ext>
+            </a:extLst>
+          </p:cNvPr>
+          <p:cNvCxnSpPr>
+            <a:cxnSpLocks/>
+            <a:endCxn id="104" idx="3"/>
+          </p:cNvCxnSpPr>
+          <p:nvPr/>
+        </p:nvCxnSpPr>
+        <p:spPr>
+          <a:xfrm rot="10800000" flipV="1">
+            <a:off x="8459169" y="3491653"/>
+            <a:ext cx="1095493" cy="394296"/>
+          </a:xfrm>
+          <a:prstGeom prst="curvedConnector3">
+            <a:avLst>
+              <a:gd name="adj1" fmla="val 50000"/>
+            </a:avLst>
+          </a:prstGeom>
+          <a:noFill/>
+          <a:ln w="38100" cap="flat" cmpd="sng" algn="ctr">
+            <a:solidFill>
+              <a:srgbClr val="F38C37"/>
+            </a:solidFill>
+            <a:prstDash val="solid"/>
+            <a:tailEnd type="arrow"/>
+          </a:ln>
+          <a:effectLst>
+            <a:outerShdw blurRad="65500" dist="38100" dir="5400000" rotWithShape="0">
+              <a:srgbClr val="000000">
+                <a:alpha val="40000"/>
+              </a:srgbClr>
+            </a:outerShdw>
+          </a:effectLst>
+        </p:spPr>
+      </p:cxnSp>
+      <p:cxnSp>
+        <p:nvCxnSpPr>
+          <p:cNvPr id="108" name="Curved Connector 24">
+            <a:extLst>
+              <a:ext uri="{FF2B5EF4-FFF2-40B4-BE49-F238E27FC236}">
+                <a16:creationId xmlns:a16="http://schemas.microsoft.com/office/drawing/2014/main" id="{7F16F149-EA8E-4A08-8FAF-1AF2BFA53F27}"/>
+              </a:ext>
+            </a:extLst>
+          </p:cNvPr>
+          <p:cNvCxnSpPr>
+            <a:cxnSpLocks/>
+            <a:endCxn id="118" idx="1"/>
+          </p:cNvCxnSpPr>
+          <p:nvPr/>
+        </p:nvCxnSpPr>
+        <p:spPr>
+          <a:xfrm flipV="1">
+            <a:off x="5681462" y="5752260"/>
+            <a:ext cx="784362" cy="502115"/>
+          </a:xfrm>
+          <a:prstGeom prst="curvedConnector3">
+            <a:avLst>
+              <a:gd name="adj1" fmla="val 50000"/>
+            </a:avLst>
+          </a:prstGeom>
+          <a:noFill/>
+          <a:ln w="38100" cap="flat" cmpd="sng" algn="ctr">
+            <a:solidFill>
+              <a:srgbClr val="F38C37"/>
+            </a:solidFill>
+            <a:prstDash val="solid"/>
+            <a:tailEnd type="arrow"/>
+          </a:ln>
+          <a:effectLst>
+            <a:outerShdw blurRad="65500" dist="38100" dir="5400000" rotWithShape="0">
+              <a:srgbClr val="000000">
+                <a:alpha val="40000"/>
+              </a:srgbClr>
+            </a:outerShdw>
+          </a:effectLst>
+        </p:spPr>
+      </p:cxnSp>
+      <p:pic>
+        <p:nvPicPr>
+          <p:cNvPr id="109" name="Picture 5" descr="C:\Users\torsteng\AppData\Local\Microsoft\Windows\Temporary Internet Files\Content.IE5\AP5NZ56T\MM900043784[1].gif">
+            <a:extLst>
+              <a:ext uri="{FF2B5EF4-FFF2-40B4-BE49-F238E27FC236}">
+                <a16:creationId xmlns:a16="http://schemas.microsoft.com/office/drawing/2014/main" id="{9A04F7FE-AB8B-47A4-AC5A-3F5BC2131B30}"/>
+              </a:ext>
+            </a:extLst>
+          </p:cNvPr>
+          <p:cNvPicPr>
+            <a:picLocks noChangeAspect="1" noChangeArrowheads="1" noCrop="1"/>
+          </p:cNvPicPr>
+          <p:nvPr/>
+        </p:nvPicPr>
+        <p:blipFill>
+          <a:blip r:embed="rId7" cstate="print"/>
+          <a:srcRect/>
+          <a:stretch>
+            <a:fillRect/>
+          </a:stretch>
+        </p:blipFill>
+        <p:spPr bwMode="auto">
+          <a:xfrm>
+            <a:off x="9908414" y="4661960"/>
+            <a:ext cx="699912" cy="699912"/>
+          </a:xfrm>
+          <a:prstGeom prst="rect">
+            <a:avLst/>
+          </a:prstGeom>
+          <a:noFill/>
+        </p:spPr>
+      </p:pic>
+      <p:cxnSp>
+        <p:nvCxnSpPr>
+          <p:cNvPr id="110" name="Curved Connector 24">
+            <a:extLst>
+              <a:ext uri="{FF2B5EF4-FFF2-40B4-BE49-F238E27FC236}">
+                <a16:creationId xmlns:a16="http://schemas.microsoft.com/office/drawing/2014/main" id="{56003883-F777-4273-94A2-FC485286CB35}"/>
+              </a:ext>
+            </a:extLst>
+          </p:cNvPr>
+          <p:cNvCxnSpPr>
+            <a:cxnSpLocks/>
+            <a:stCxn id="118" idx="3"/>
+          </p:cNvCxnSpPr>
+          <p:nvPr/>
+        </p:nvCxnSpPr>
+        <p:spPr>
+          <a:xfrm flipV="1">
+            <a:off x="8456702" y="5659479"/>
+            <a:ext cx="1455336" cy="92781"/>
+          </a:xfrm>
+          <a:prstGeom prst="curvedConnector3">
+            <a:avLst>
+              <a:gd name="adj1" fmla="val 50000"/>
+            </a:avLst>
+          </a:prstGeom>
+          <a:noFill/>
+          <a:ln w="38100" cap="flat" cmpd="sng" algn="ctr">
+            <a:solidFill>
+              <a:srgbClr val="F38C37"/>
+            </a:solidFill>
+            <a:prstDash val="solid"/>
+            <a:tailEnd type="arrow"/>
+          </a:ln>
+          <a:effectLst>
+            <a:outerShdw blurRad="65500" dist="38100" dir="5400000" rotWithShape="0">
+              <a:srgbClr val="000000">
+                <a:alpha val="40000"/>
+              </a:srgbClr>
+            </a:outerShdw>
+          </a:effectLst>
+        </p:spPr>
+      </p:cxnSp>
+      <p:grpSp>
+        <p:nvGrpSpPr>
+          <p:cNvPr id="111" name="Group 110">
+            <a:extLst>
+              <a:ext uri="{FF2B5EF4-FFF2-40B4-BE49-F238E27FC236}">
+                <a16:creationId xmlns:a16="http://schemas.microsoft.com/office/drawing/2014/main" id="{2C373BCF-F5BC-4039-BA54-B78521D0C3A4}"/>
+              </a:ext>
+            </a:extLst>
+          </p:cNvPr>
+          <p:cNvGrpSpPr/>
+          <p:nvPr/>
+        </p:nvGrpSpPr>
+        <p:grpSpPr>
+          <a:xfrm>
+            <a:off x="9912038" y="5466909"/>
+            <a:ext cx="712054" cy="626116"/>
+            <a:chOff x="3434328" y="3336433"/>
+            <a:chExt cx="1059543" cy="925108"/>
+          </a:xfrm>
+        </p:grpSpPr>
+        <p:pic>
+          <p:nvPicPr>
+            <p:cNvPr id="112" name="Picture 111">
+              <a:extLst>
+                <a:ext uri="{FF2B5EF4-FFF2-40B4-BE49-F238E27FC236}">
+                  <a16:creationId xmlns:a16="http://schemas.microsoft.com/office/drawing/2014/main" id="{BBAB7511-9162-4493-BC4F-EB8CCD37BD06}"/>
+                </a:ext>
+              </a:extLst>
+            </p:cNvPr>
+            <p:cNvPicPr>
+              <a:picLocks noChangeAspect="1"/>
+            </p:cNvPicPr>
+            <p:nvPr/>
+          </p:nvPicPr>
+          <p:blipFill>
+            <a:blip r:embed="rId6" cstate="print">
+              <a:extLst>
+                <a:ext uri="{28A0092B-C50C-407E-A947-70E740481C1C}">
+                  <a14:useLocalDpi xmlns:a14="http://schemas.microsoft.com/office/drawing/2010/main"/>
+                </a:ext>
+              </a:extLst>
+            </a:blip>
+            <a:stretch>
+              <a:fillRect/>
+            </a:stretch>
+          </p:blipFill>
+          <p:spPr>
+            <a:xfrm>
+              <a:off x="3714959" y="3336433"/>
+              <a:ext cx="635521" cy="635521"/>
+            </a:xfrm>
+            <a:prstGeom prst="rect">
+              <a:avLst/>
+            </a:prstGeom>
+          </p:spPr>
+        </p:pic>
+        <p:sp>
+          <p:nvSpPr>
+            <p:cNvPr id="113" name="Rectangle 112">
+              <a:extLst>
+                <a:ext uri="{FF2B5EF4-FFF2-40B4-BE49-F238E27FC236}">
+                  <a16:creationId xmlns:a16="http://schemas.microsoft.com/office/drawing/2014/main" id="{6777CAFB-0518-4E10-8247-A61D9673B8C7}"/>
+                </a:ext>
+              </a:extLst>
+            </p:cNvPr>
+            <p:cNvSpPr/>
+            <p:nvPr/>
+          </p:nvSpPr>
+          <p:spPr>
+            <a:xfrm>
+              <a:off x="3434328" y="3965953"/>
+              <a:ext cx="1059543" cy="295588"/>
+            </a:xfrm>
+            <a:prstGeom prst="rect">
+              <a:avLst/>
+            </a:prstGeom>
+          </p:spPr>
+          <p:txBody>
+            <a:bodyPr wrap="none">
+              <a:spAutoFit/>
+            </a:bodyPr>
+            <a:lstStyle/>
+            <a:p>
+              <a:pPr algn="ctr" defTabSz="932215"/>
+              <a:r>
+                <a:rPr lang="en-US" sz="700" kern="0">
+                  <a:solidFill>
+                    <a:prstClr val="white">
+                      <a:lumMod val="50000"/>
+                    </a:prstClr>
+                  </a:solidFill>
+                  <a:latin typeface="Segoe UI Semibold" panose="020B0702040204020203" pitchFamily="34" charset="0"/>
+                  <a:ea typeface="MS PGothic" panose="020B0600070205080204" pitchFamily="34" charset="-128"/>
+                  <a:cs typeface="Segoe UI Semibold" panose="020B0702040204020203" pitchFamily="34" charset="0"/>
+                  <a:sym typeface="Arial"/>
+                </a:rPr>
+                <a:t>AZURE SQL DB</a:t>
+              </a:r>
+            </a:p>
+          </p:txBody>
+        </p:sp>
+      </p:grpSp>
+      <p:cxnSp>
+        <p:nvCxnSpPr>
+          <p:cNvPr id="114" name="Curved Connector 24">
+            <a:extLst>
+              <a:ext uri="{FF2B5EF4-FFF2-40B4-BE49-F238E27FC236}">
+                <a16:creationId xmlns:a16="http://schemas.microsoft.com/office/drawing/2014/main" id="{363E993A-D929-474B-820B-70FD359C6043}"/>
+              </a:ext>
+            </a:extLst>
+          </p:cNvPr>
+          <p:cNvCxnSpPr>
+            <a:cxnSpLocks/>
+            <a:stCxn id="104" idx="1"/>
+          </p:cNvCxnSpPr>
+          <p:nvPr/>
+        </p:nvCxnSpPr>
+        <p:spPr>
+          <a:xfrm rot="10800000" flipV="1">
+            <a:off x="5674495" y="3885949"/>
+            <a:ext cx="791328" cy="611544"/>
+          </a:xfrm>
+          <a:prstGeom prst="curvedConnector3">
+            <a:avLst>
+              <a:gd name="adj1" fmla="val 50000"/>
+            </a:avLst>
+          </a:prstGeom>
+          <a:noFill/>
+          <a:ln w="38100" cap="flat" cmpd="sng" algn="ctr">
+            <a:solidFill>
+              <a:srgbClr val="F38C37"/>
+            </a:solidFill>
+            <a:prstDash val="solid"/>
+            <a:tailEnd type="arrow"/>
+          </a:ln>
+          <a:effectLst>
+            <a:outerShdw blurRad="65500" dist="38100" dir="5400000" rotWithShape="0">
+              <a:srgbClr val="000000">
+                <a:alpha val="40000"/>
+              </a:srgbClr>
+            </a:outerShdw>
+          </a:effectLst>
+        </p:spPr>
+      </p:cxnSp>
+      <p:sp>
+        <p:nvSpPr>
+          <p:cNvPr id="116" name="Rounded Rectangle 9">
+            <a:extLst>
+              <a:ext uri="{FF2B5EF4-FFF2-40B4-BE49-F238E27FC236}">
+                <a16:creationId xmlns:a16="http://schemas.microsoft.com/office/drawing/2014/main" id="{71DC2356-AF09-4D62-BC8E-66805B0B5F4C}"/>
+              </a:ext>
+            </a:extLst>
+          </p:cNvPr>
+          <p:cNvSpPr/>
+          <p:nvPr/>
+        </p:nvSpPr>
+        <p:spPr bwMode="auto">
+          <a:xfrm>
+            <a:off x="2556887" y="3328781"/>
+            <a:ext cx="2880433" cy="769858"/>
+          </a:xfrm>
+          <a:prstGeom prst="roundRect">
+            <a:avLst/>
+          </a:prstGeom>
+          <a:gradFill rotWithShape="1">
+            <a:gsLst>
+              <a:gs pos="0">
+                <a:srgbClr val="3A94D2">
+                  <a:tint val="65000"/>
+                  <a:satMod val="270000"/>
+                </a:srgbClr>
+              </a:gs>
+              <a:gs pos="25000">
+                <a:srgbClr val="3A94D2">
+                  <a:tint val="60000"/>
+                  <a:satMod val="300000"/>
+                </a:srgbClr>
+              </a:gs>
+              <a:gs pos="100000">
+                <a:srgbClr val="3A94D2">
+                  <a:tint val="29000"/>
+                  <a:satMod val="400000"/>
+                </a:srgbClr>
+              </a:gs>
+            </a:gsLst>
+            <a:lin ang="16200000" scaled="1"/>
+          </a:gradFill>
+          <a:ln w="9525" cap="flat" cmpd="sng" algn="ctr">
+            <a:solidFill>
+              <a:srgbClr val="3A94D2">
+                <a:satMod val="150000"/>
+              </a:srgbClr>
+            </a:solidFill>
+            <a:prstDash val="solid"/>
+            <a:headEnd type="none" w="med" len="med"/>
+            <a:tailEnd type="none" w="med" len="med"/>
+          </a:ln>
+          <a:effectLst>
+            <a:outerShdw blurRad="65500" dist="38100" dir="5400000" rotWithShape="0">
+              <a:srgbClr val="000000">
+                <a:alpha val="40000"/>
+              </a:srgbClr>
+            </a:outerShdw>
+          </a:effectLst>
+        </p:spPr>
+        <p:txBody>
+          <a:bodyPr vert="horz" wrap="square" lIns="121915" tIns="60957" rIns="121915" bIns="60957" numCol="1" rtlCol="0" anchor="ctr" anchorCtr="0" compatLnSpc="1">
+            <a:prstTxWarp prst="textNoShape">
+              <a:avLst/>
+            </a:prstTxWarp>
+          </a:bodyPr>
+          <a:lstStyle/>
+          <a:p>
+            <a:pPr algn="ctr" defTabSz="1218768" fontAlgn="base">
+              <a:spcBef>
+                <a:spcPct val="0"/>
+              </a:spcBef>
+              <a:spcAft>
+                <a:spcPct val="0"/>
+              </a:spcAft>
+              <a:defRPr/>
+            </a:pPr>
+            <a:r>
+              <a:rPr lang="en-US" sz="1400" dirty="0">
+                <a:gradFill>
+                  <a:gsLst>
+                    <a:gs pos="0">
+                      <a:srgbClr val="FFFFFF"/>
+                    </a:gs>
+                    <a:gs pos="100000">
+                      <a:srgbClr val="FFFFFF"/>
+                    </a:gs>
+                  </a:gsLst>
+                  <a:lin ang="5400000" scaled="0"/>
+                </a:gradFill>
+                <a:latin typeface="Segoe UI"/>
+                <a:cs typeface="Arial"/>
+                <a:sym typeface="Arial"/>
+              </a:rPr>
+              <a:t>Data transformation</a:t>
+            </a:r>
+          </a:p>
+          <a:p>
+            <a:pPr algn="ctr" defTabSz="1218768" fontAlgn="base">
+              <a:spcBef>
+                <a:spcPct val="0"/>
+              </a:spcBef>
+              <a:spcAft>
+                <a:spcPct val="0"/>
+              </a:spcAft>
+              <a:defRPr/>
+            </a:pPr>
+            <a:r>
+              <a:rPr lang="en-US" sz="1400" dirty="0">
+                <a:gradFill>
+                  <a:gsLst>
+                    <a:gs pos="0">
+                      <a:srgbClr val="FFFFFF"/>
+                    </a:gs>
+                    <a:gs pos="100000">
+                      <a:srgbClr val="FFFFFF"/>
+                    </a:gs>
+                  </a:gsLst>
+                  <a:lin ang="5400000" scaled="0"/>
+                </a:gradFill>
+                <a:latin typeface="Segoe UI"/>
+                <a:cs typeface="Arial"/>
+                <a:sym typeface="Arial"/>
+              </a:rPr>
+              <a:t>+</a:t>
+            </a:r>
+          </a:p>
+          <a:p>
+            <a:pPr algn="ctr" defTabSz="1218768" fontAlgn="base">
+              <a:spcBef>
+                <a:spcPct val="0"/>
+              </a:spcBef>
+              <a:spcAft>
+                <a:spcPct val="0"/>
+              </a:spcAft>
+              <a:defRPr/>
+            </a:pPr>
+            <a:r>
+              <a:rPr lang="en-US" sz="1400" dirty="0">
+                <a:gradFill>
+                  <a:gsLst>
+                    <a:gs pos="0">
+                      <a:srgbClr val="FFFFFF"/>
+                    </a:gs>
+                    <a:gs pos="100000">
+                      <a:srgbClr val="FFFFFF"/>
+                    </a:gs>
+                  </a:gsLst>
+                  <a:lin ang="5400000" scaled="0"/>
+                </a:gradFill>
+                <a:latin typeface="Segoe UI"/>
+                <a:cs typeface="Arial"/>
+                <a:sym typeface="Arial"/>
+              </a:rPr>
+              <a:t> Normalization</a:t>
+            </a:r>
+          </a:p>
+        </p:txBody>
+      </p:sp>
+      <p:sp>
+        <p:nvSpPr>
+          <p:cNvPr id="117" name="Rounded Rectangle 9">
+            <a:extLst>
+              <a:ext uri="{FF2B5EF4-FFF2-40B4-BE49-F238E27FC236}">
+                <a16:creationId xmlns:a16="http://schemas.microsoft.com/office/drawing/2014/main" id="{35399D29-BBC9-4998-85F2-C7ED90600EF6}"/>
+              </a:ext>
+            </a:extLst>
+          </p:cNvPr>
+          <p:cNvSpPr/>
+          <p:nvPr/>
+        </p:nvSpPr>
+        <p:spPr bwMode="auto">
+          <a:xfrm>
+            <a:off x="2556887" y="5252720"/>
+            <a:ext cx="2907405" cy="1158240"/>
+          </a:xfrm>
+          <a:prstGeom prst="roundRect">
+            <a:avLst/>
+          </a:prstGeom>
+          <a:gradFill rotWithShape="1">
+            <a:gsLst>
+              <a:gs pos="0">
+                <a:srgbClr val="3A94D2">
+                  <a:tint val="65000"/>
+                  <a:satMod val="270000"/>
+                </a:srgbClr>
+              </a:gs>
+              <a:gs pos="25000">
+                <a:srgbClr val="3A94D2">
+                  <a:tint val="60000"/>
+                  <a:satMod val="300000"/>
+                </a:srgbClr>
+              </a:gs>
+              <a:gs pos="100000">
+                <a:srgbClr val="3A94D2">
+                  <a:tint val="29000"/>
+                  <a:satMod val="400000"/>
+                </a:srgbClr>
+              </a:gs>
+            </a:gsLst>
+            <a:lin ang="16200000" scaled="1"/>
+          </a:gradFill>
+          <a:ln w="9525" cap="flat" cmpd="sng" algn="ctr">
+            <a:solidFill>
+              <a:srgbClr val="3A94D2">
+                <a:satMod val="150000"/>
+              </a:srgbClr>
+            </a:solidFill>
+            <a:prstDash val="solid"/>
+            <a:headEnd type="none" w="med" len="med"/>
+            <a:tailEnd type="none" w="med" len="med"/>
+          </a:ln>
+          <a:effectLst>
+            <a:outerShdw blurRad="65500" dist="38100" dir="5400000" rotWithShape="0">
+              <a:srgbClr val="000000">
+                <a:alpha val="40000"/>
+              </a:srgbClr>
+            </a:outerShdw>
+          </a:effectLst>
+        </p:spPr>
+        <p:txBody>
+          <a:bodyPr vert="horz" wrap="square" lIns="121915" tIns="60957" rIns="121915" bIns="60957" numCol="1" rtlCol="0" anchor="ctr" anchorCtr="0" compatLnSpc="1">
+            <a:prstTxWarp prst="textNoShape">
+              <a:avLst/>
+            </a:prstTxWarp>
+          </a:bodyPr>
+          <a:lstStyle/>
+          <a:p>
+            <a:pPr algn="ctr" defTabSz="1218768" fontAlgn="base">
+              <a:spcBef>
+                <a:spcPct val="0"/>
+              </a:spcBef>
+              <a:spcAft>
+                <a:spcPct val="0"/>
+              </a:spcAft>
+              <a:defRPr/>
+            </a:pPr>
+            <a:r>
+              <a:rPr lang="en-US" sz="1400" dirty="0">
+                <a:gradFill>
+                  <a:gsLst>
+                    <a:gs pos="0">
+                      <a:srgbClr val="FFFFFF"/>
+                    </a:gs>
+                    <a:gs pos="100000">
+                      <a:srgbClr val="FFFFFF"/>
+                    </a:gs>
+                  </a:gsLst>
+                  <a:lin ang="5400000" scaled="0"/>
+                </a:gradFill>
+                <a:latin typeface="Segoe UI"/>
+                <a:cs typeface="Arial"/>
+                <a:sym typeface="Arial"/>
+              </a:rPr>
+              <a:t>Subgroup Matching</a:t>
+            </a:r>
+          </a:p>
+          <a:p>
+            <a:pPr algn="ctr" defTabSz="1218768" fontAlgn="base">
+              <a:spcBef>
+                <a:spcPct val="0"/>
+              </a:spcBef>
+              <a:spcAft>
+                <a:spcPct val="0"/>
+              </a:spcAft>
+              <a:defRPr/>
+            </a:pPr>
+            <a:r>
+              <a:rPr lang="en-US" sz="1400" dirty="0">
+                <a:gradFill>
+                  <a:gsLst>
+                    <a:gs pos="0">
+                      <a:srgbClr val="FFFFFF"/>
+                    </a:gs>
+                    <a:gs pos="100000">
+                      <a:srgbClr val="FFFFFF"/>
+                    </a:gs>
+                  </a:gsLst>
+                  <a:lin ang="5400000" scaled="0"/>
+                </a:gradFill>
+                <a:latin typeface="Segoe UI"/>
+                <a:cs typeface="Arial"/>
+                <a:sym typeface="Arial"/>
+              </a:rPr>
+              <a:t>+</a:t>
+            </a:r>
+          </a:p>
+          <a:p>
+            <a:pPr algn="ctr" defTabSz="1218768" fontAlgn="base">
+              <a:spcBef>
+                <a:spcPct val="0"/>
+              </a:spcBef>
+              <a:spcAft>
+                <a:spcPct val="0"/>
+              </a:spcAft>
+              <a:defRPr/>
+            </a:pPr>
+            <a:r>
+              <a:rPr lang="en-US" sz="1400" dirty="0">
+                <a:gradFill>
+                  <a:gsLst>
+                    <a:gs pos="0">
+                      <a:srgbClr val="FFFFFF"/>
+                    </a:gs>
+                    <a:gs pos="100000">
+                      <a:srgbClr val="FFFFFF"/>
+                    </a:gs>
+                  </a:gsLst>
+                  <a:lin ang="5400000" scaled="0"/>
+                </a:gradFill>
+                <a:latin typeface="Segoe UI"/>
+                <a:cs typeface="Arial"/>
+                <a:sym typeface="Arial"/>
+              </a:rPr>
+              <a:t>Stratified Sampling</a:t>
+            </a:r>
+          </a:p>
+          <a:p>
+            <a:pPr algn="ctr" defTabSz="1218768" fontAlgn="base">
+              <a:spcBef>
+                <a:spcPct val="0"/>
+              </a:spcBef>
+              <a:spcAft>
+                <a:spcPct val="0"/>
+              </a:spcAft>
+              <a:defRPr/>
+            </a:pPr>
+            <a:r>
+              <a:rPr lang="en-US" sz="1400" dirty="0">
+                <a:gradFill>
+                  <a:gsLst>
+                    <a:gs pos="0">
+                      <a:srgbClr val="FFFFFF"/>
+                    </a:gs>
+                    <a:gs pos="100000">
+                      <a:srgbClr val="FFFFFF"/>
+                    </a:gs>
+                  </a:gsLst>
+                  <a:lin ang="5400000" scaled="0"/>
+                </a:gradFill>
+                <a:latin typeface="Segoe UI"/>
+                <a:cs typeface="Arial"/>
+                <a:sym typeface="Arial"/>
+              </a:rPr>
+              <a:t>+</a:t>
+            </a:r>
+          </a:p>
+          <a:p>
+            <a:pPr algn="ctr" defTabSz="1218768" fontAlgn="base">
+              <a:spcBef>
+                <a:spcPct val="0"/>
+              </a:spcBef>
+              <a:spcAft>
+                <a:spcPct val="0"/>
+              </a:spcAft>
+              <a:defRPr/>
+            </a:pPr>
+            <a:r>
+              <a:rPr lang="en-US" sz="1400" dirty="0">
+                <a:gradFill>
+                  <a:gsLst>
+                    <a:gs pos="0">
+                      <a:srgbClr val="FFFFFF"/>
+                    </a:gs>
+                    <a:gs pos="100000">
+                      <a:srgbClr val="FFFFFF"/>
+                    </a:gs>
+                  </a:gsLst>
+                  <a:lin ang="5400000" scaled="0"/>
+                </a:gradFill>
+                <a:latin typeface="Segoe UI"/>
+                <a:cs typeface="Arial"/>
+                <a:sym typeface="Arial"/>
+              </a:rPr>
+              <a:t>Contrast Group Creation</a:t>
+            </a:r>
+          </a:p>
+        </p:txBody>
+      </p:sp>
+      <p:sp>
+        <p:nvSpPr>
+          <p:cNvPr id="118" name="Rounded Rectangle 9">
+            <a:extLst>
+              <a:ext uri="{FF2B5EF4-FFF2-40B4-BE49-F238E27FC236}">
+                <a16:creationId xmlns:a16="http://schemas.microsoft.com/office/drawing/2014/main" id="{A86DC910-3D53-4415-B119-9F69C3CD6733}"/>
+              </a:ext>
+            </a:extLst>
+          </p:cNvPr>
+          <p:cNvSpPr/>
+          <p:nvPr/>
+        </p:nvSpPr>
+        <p:spPr bwMode="auto">
+          <a:xfrm>
+            <a:off x="6465824" y="5302642"/>
+            <a:ext cx="1990878" cy="899236"/>
+          </a:xfrm>
+          <a:prstGeom prst="roundRect">
+            <a:avLst/>
+          </a:prstGeom>
+          <a:gradFill rotWithShape="1">
+            <a:gsLst>
+              <a:gs pos="0">
+                <a:srgbClr val="3A94D2">
+                  <a:tint val="65000"/>
+                  <a:satMod val="270000"/>
+                </a:srgbClr>
+              </a:gs>
+              <a:gs pos="25000">
+                <a:srgbClr val="3A94D2">
+                  <a:tint val="60000"/>
+                  <a:satMod val="300000"/>
+                </a:srgbClr>
+              </a:gs>
+              <a:gs pos="100000">
+                <a:srgbClr val="3A94D2">
+                  <a:tint val="29000"/>
+                  <a:satMod val="400000"/>
+                </a:srgbClr>
+              </a:gs>
+            </a:gsLst>
+            <a:lin ang="16200000" scaled="1"/>
+          </a:gradFill>
+          <a:ln w="9525" cap="flat" cmpd="sng" algn="ctr">
+            <a:solidFill>
+              <a:srgbClr val="3A94D2">
+                <a:satMod val="150000"/>
+              </a:srgbClr>
+            </a:solidFill>
+            <a:prstDash val="solid"/>
+            <a:headEnd type="none" w="med" len="med"/>
+            <a:tailEnd type="none" w="med" len="med"/>
+          </a:ln>
+          <a:effectLst>
+            <a:outerShdw blurRad="65500" dist="38100" dir="5400000" rotWithShape="0">
+              <a:srgbClr val="000000">
+                <a:alpha val="40000"/>
+              </a:srgbClr>
+            </a:outerShdw>
+          </a:effectLst>
+        </p:spPr>
+        <p:txBody>
+          <a:bodyPr vert="horz" wrap="square" lIns="121915" tIns="60957" rIns="121915" bIns="60957" numCol="1" rtlCol="0" anchor="ctr" anchorCtr="0" compatLnSpc="1">
+            <a:prstTxWarp prst="textNoShape">
+              <a:avLst/>
+            </a:prstTxWarp>
+          </a:bodyPr>
+          <a:lstStyle/>
+          <a:p>
+            <a:pPr algn="ctr" defTabSz="1218768" fontAlgn="base">
+              <a:spcBef>
+                <a:spcPct val="0"/>
+              </a:spcBef>
+              <a:spcAft>
+                <a:spcPct val="0"/>
+              </a:spcAft>
+              <a:defRPr/>
+            </a:pPr>
+            <a:r>
+              <a:rPr lang="en-US" dirty="0">
+                <a:gradFill>
+                  <a:gsLst>
+                    <a:gs pos="0">
+                      <a:srgbClr val="FFFFFF"/>
+                    </a:gs>
+                    <a:gs pos="100000">
+                      <a:srgbClr val="FFFFFF"/>
+                    </a:gs>
+                  </a:gsLst>
+                  <a:lin ang="5400000" scaled="0"/>
+                </a:gradFill>
+                <a:latin typeface="Segoe UI"/>
+                <a:cs typeface="Arial"/>
+                <a:sym typeface="Arial"/>
+              </a:rPr>
+              <a:t>Significance Testing</a:t>
+            </a:r>
+          </a:p>
+        </p:txBody>
+      </p:sp>
+      <p:sp>
+        <p:nvSpPr>
+          <p:cNvPr id="31" name="TextBox 30">
+            <a:extLst>
+              <a:ext uri="{FF2B5EF4-FFF2-40B4-BE49-F238E27FC236}">
                 <a16:creationId xmlns:a16="http://schemas.microsoft.com/office/drawing/2014/main" id="{90F6F963-9D3C-4DE8-A6B4-F51E435CDDB3}"/>
               </a:ext>
             </a:extLst>
@@ -27166,7 +29440,7 @@
 </p:sld>
 </file>
 
-<file path=ppt/slides/slide4.xml><?xml version="1.0" encoding="utf-8"?>
+<file path=ppt/slides/slide5.xml><?xml version="1.0" encoding="utf-8"?>
 <p:sld xmlns:a="http://schemas.openxmlformats.org/drawingml/2006/main" xmlns:r="http://schemas.openxmlformats.org/officeDocument/2006/relationships" xmlns:p="http://schemas.openxmlformats.org/presentationml/2006/main">
   <p:cSld>
     <p:spTree>
@@ -29332,7 +31606,7 @@
 </p:sld>
 </file>
 
-<file path=ppt/slides/slide5.xml><?xml version="1.0" encoding="utf-8"?>
+<file path=ppt/slides/slide6.xml><?xml version="1.0" encoding="utf-8"?>
 <p:sld xmlns:a="http://schemas.openxmlformats.org/drawingml/2006/main" xmlns:r="http://schemas.openxmlformats.org/officeDocument/2006/relationships" xmlns:p="http://schemas.openxmlformats.org/presentationml/2006/main">
   <p:cSld>
     <p:spTree>
@@ -31170,7 +33444,7 @@
 </p:sld>
 </file>
 
-<file path=ppt/slides/slide6.xml><?xml version="1.0" encoding="utf-8"?>
+<file path=ppt/slides/slide7.xml><?xml version="1.0" encoding="utf-8"?>
 <p:sld xmlns:a="http://schemas.openxmlformats.org/drawingml/2006/main" xmlns:r="http://schemas.openxmlformats.org/officeDocument/2006/relationships" xmlns:p="http://schemas.openxmlformats.org/presentationml/2006/main">
   <p:cSld>
     <p:spTree>
@@ -31980,7 +34254,7 @@
 </p:sld>
 </file>
 
-<file path=ppt/slides/slide7.xml><?xml version="1.0" encoding="utf-8"?>
+<file path=ppt/slides/slide8.xml><?xml version="1.0" encoding="utf-8"?>
 <p:sld xmlns:a="http://schemas.openxmlformats.org/drawingml/2006/main" xmlns:r="http://schemas.openxmlformats.org/officeDocument/2006/relationships" xmlns:p="http://schemas.openxmlformats.org/presentationml/2006/main">
   <p:cSld>
     <p:spTree>

</xml_diff>

<commit_message>
updated images and new images
</commit_message>
<xml_diff>
--- a/assets/resources/graph for web_page.pptx
+++ b/assets/resources/graph for web_page.pptx
@@ -125,7 +125,7 @@
 <file path=ppt/revisionInfo.xml><?xml version="1.0" encoding="utf-8"?>
 <p1510:revInfo xmlns:a="http://schemas.openxmlformats.org/drawingml/2006/main" xmlns:r="http://schemas.openxmlformats.org/officeDocument/2006/relationships" xmlns:p1510="http://schemas.microsoft.com/office/powerpoint/2015/10/main">
   <p1510:revLst>
-    <p1510:client id="{07AE1321-E1B5-44BC-BC54-8923ADAC392F}" v="32" dt="2022-03-25T22:15:41.771"/>
+    <p1510:client id="{07AE1321-E1B5-44BC-BC54-8923ADAC392F}" v="312" dt="2022-03-26T19:32:09.715"/>
   </p1510:revLst>
 </p1510:revInfo>
 </file>
@@ -135,7 +135,7 @@
   <pc:docChgLst>
     <pc:chgData name="Jackie N" userId="8b14f1697149b7ae" providerId="LiveId" clId="{07AE1321-E1B5-44BC-BC54-8923ADAC392F}"/>
     <pc:docChg chg="undo custSel addSld delSld modSld sldOrd">
-      <pc:chgData name="Jackie N" userId="8b14f1697149b7ae" providerId="LiveId" clId="{07AE1321-E1B5-44BC-BC54-8923ADAC392F}" dt="2022-03-25T22:16:05.046" v="960" actId="20577"/>
+      <pc:chgData name="Jackie N" userId="8b14f1697149b7ae" providerId="LiveId" clId="{07AE1321-E1B5-44BC-BC54-8923ADAC392F}" dt="2022-03-26T19:32:09.715" v="1240" actId="166"/>
       <pc:docMkLst>
         <pc:docMk/>
       </pc:docMkLst>
@@ -248,7 +248,7 @@
         </pc:cxnChg>
       </pc:sldChg>
       <pc:sldChg chg="addSp delSp modSp add mod">
-        <pc:chgData name="Jackie N" userId="8b14f1697149b7ae" providerId="LiveId" clId="{07AE1321-E1B5-44BC-BC54-8923ADAC392F}" dt="2022-03-25T17:28:41.253" v="811" actId="20577"/>
+        <pc:chgData name="Jackie N" userId="8b14f1697149b7ae" providerId="LiveId" clId="{07AE1321-E1B5-44BC-BC54-8923ADAC392F}" dt="2022-03-26T19:21:36.289" v="968" actId="20577"/>
         <pc:sldMkLst>
           <pc:docMk/>
           <pc:sldMk cId="3732819603" sldId="369"/>
@@ -270,7 +270,7 @@
           </ac:spMkLst>
         </pc:spChg>
         <pc:spChg chg="add mod">
-          <ac:chgData name="Jackie N" userId="8b14f1697149b7ae" providerId="LiveId" clId="{07AE1321-E1B5-44BC-BC54-8923ADAC392F}" dt="2022-03-25T14:37:13.818" v="778" actId="20577"/>
+          <ac:chgData name="Jackie N" userId="8b14f1697149b7ae" providerId="LiveId" clId="{07AE1321-E1B5-44BC-BC54-8923ADAC392F}" dt="2022-03-26T19:21:36.289" v="968" actId="20577"/>
           <ac:spMkLst>
             <pc:docMk/>
             <pc:sldMk cId="3732819603" sldId="369"/>
@@ -1324,11 +1324,19 @@
         </pc:spChg>
       </pc:sldChg>
       <pc:sldChg chg="addSp delSp modSp add mod">
-        <pc:chgData name="Jackie N" userId="8b14f1697149b7ae" providerId="LiveId" clId="{07AE1321-E1B5-44BC-BC54-8923ADAC392F}" dt="2022-03-25T17:34:57.049" v="942" actId="20577"/>
+        <pc:chgData name="Jackie N" userId="8b14f1697149b7ae" providerId="LiveId" clId="{07AE1321-E1B5-44BC-BC54-8923ADAC392F}" dt="2022-03-26T19:32:09.715" v="1240" actId="166"/>
         <pc:sldMkLst>
           <pc:docMk/>
           <pc:sldMk cId="2833893545" sldId="373"/>
         </pc:sldMkLst>
+        <pc:spChg chg="add del mod">
+          <ac:chgData name="Jackie N" userId="8b14f1697149b7ae" providerId="LiveId" clId="{07AE1321-E1B5-44BC-BC54-8923ADAC392F}" dt="2022-03-26T19:29:00.697" v="1145" actId="478"/>
+          <ac:spMkLst>
+            <pc:docMk/>
+            <pc:sldMk cId="2833893545" sldId="373"/>
+            <ac:spMk id="3" creationId="{7A632013-AA7A-4B60-B9C2-4F5919356FD4}"/>
+          </ac:spMkLst>
+        </pc:spChg>
         <pc:spChg chg="mod">
           <ac:chgData name="Jackie N" userId="8b14f1697149b7ae" providerId="LiveId" clId="{07AE1321-E1B5-44BC-BC54-8923ADAC392F}" dt="2022-03-25T17:28:49.947" v="816" actId="20577"/>
           <ac:spMkLst>
@@ -1338,39 +1346,111 @@
           </ac:spMkLst>
         </pc:spChg>
         <pc:spChg chg="mod">
-          <ac:chgData name="Jackie N" userId="8b14f1697149b7ae" providerId="LiveId" clId="{07AE1321-E1B5-44BC-BC54-8923ADAC392F}" dt="2022-03-25T17:34:57.049" v="942" actId="20577"/>
+          <ac:chgData name="Jackie N" userId="8b14f1697149b7ae" providerId="LiveId" clId="{07AE1321-E1B5-44BC-BC54-8923ADAC392F}" dt="2022-03-26T19:28:46.617" v="1129" actId="1035"/>
           <ac:spMkLst>
             <pc:docMk/>
             <pc:sldMk cId="2833893545" sldId="373"/>
             <ac:spMk id="31" creationId="{D4D8B0C8-B0ED-42BE-A498-BC640A90AE92}"/>
           </ac:spMkLst>
         </pc:spChg>
+        <pc:spChg chg="add del">
+          <ac:chgData name="Jackie N" userId="8b14f1697149b7ae" providerId="LiveId" clId="{07AE1321-E1B5-44BC-BC54-8923ADAC392F}" dt="2022-03-26T19:21:59.995" v="970" actId="22"/>
+          <ac:spMkLst>
+            <pc:docMk/>
+            <pc:sldMk cId="2833893545" sldId="373"/>
+            <ac:spMk id="36" creationId="{0EF7F440-9D01-432E-B3D2-208CFB773BD7}"/>
+          </ac:spMkLst>
+        </pc:spChg>
         <pc:spChg chg="add mod">
-          <ac:chgData name="Jackie N" userId="8b14f1697149b7ae" providerId="LiveId" clId="{07AE1321-E1B5-44BC-BC54-8923ADAC392F}" dt="2022-03-25T17:33:40.405" v="928"/>
+          <ac:chgData name="Jackie N" userId="8b14f1697149b7ae" providerId="LiveId" clId="{07AE1321-E1B5-44BC-BC54-8923ADAC392F}" dt="2022-03-26T19:31:31.824" v="1232" actId="1038"/>
           <ac:spMkLst>
             <pc:docMk/>
             <pc:sldMk cId="2833893545" sldId="373"/>
             <ac:spMk id="44" creationId="{8A9DAE27-EB4E-47C4-8474-1C8111F6545F}"/>
           </ac:spMkLst>
         </pc:spChg>
+        <pc:spChg chg="mod">
+          <ac:chgData name="Jackie N" userId="8b14f1697149b7ae" providerId="LiveId" clId="{07AE1321-E1B5-44BC-BC54-8923ADAC392F}" dt="2022-03-26T19:29:51.415" v="1151"/>
+          <ac:spMkLst>
+            <pc:docMk/>
+            <pc:sldMk cId="2833893545" sldId="373"/>
+            <ac:spMk id="45" creationId="{1D255DA1-DF4F-4986-BE6A-CA60D934E7A9}"/>
+          </ac:spMkLst>
+        </pc:spChg>
         <pc:spChg chg="add mod ord">
-          <ac:chgData name="Jackie N" userId="8b14f1697149b7ae" providerId="LiveId" clId="{07AE1321-E1B5-44BC-BC54-8923ADAC392F}" dt="2022-03-25T17:33:49.016" v="929" actId="207"/>
+          <ac:chgData name="Jackie N" userId="8b14f1697149b7ae" providerId="LiveId" clId="{07AE1321-E1B5-44BC-BC54-8923ADAC392F}" dt="2022-03-26T19:31:31.824" v="1232" actId="1038"/>
           <ac:spMkLst>
             <pc:docMk/>
             <pc:sldMk cId="2833893545" sldId="373"/>
             <ac:spMk id="47" creationId="{4045D4C8-84DF-4CB6-B58A-E58C48BE8536}"/>
           </ac:spMkLst>
         </pc:spChg>
+        <pc:spChg chg="mod">
+          <ac:chgData name="Jackie N" userId="8b14f1697149b7ae" providerId="LiveId" clId="{07AE1321-E1B5-44BC-BC54-8923ADAC392F}" dt="2022-03-26T19:29:51.415" v="1151"/>
+          <ac:spMkLst>
+            <pc:docMk/>
+            <pc:sldMk cId="2833893545" sldId="373"/>
+            <ac:spMk id="51" creationId="{77450C76-7458-473B-9B77-7D057EFD413B}"/>
+          </ac:spMkLst>
+        </pc:spChg>
+        <pc:spChg chg="add del mod">
+          <ac:chgData name="Jackie N" userId="8b14f1697149b7ae" providerId="LiveId" clId="{07AE1321-E1B5-44BC-BC54-8923ADAC392F}" dt="2022-03-26T19:30:21.572" v="1156" actId="478"/>
+          <ac:spMkLst>
+            <pc:docMk/>
+            <pc:sldMk cId="2833893545" sldId="373"/>
+            <ac:spMk id="52" creationId="{331EB54C-27BE-4E98-AC32-9E40306B3BB3}"/>
+          </ac:spMkLst>
+        </pc:spChg>
+        <pc:spChg chg="add del mod">
+          <ac:chgData name="Jackie N" userId="8b14f1697149b7ae" providerId="LiveId" clId="{07AE1321-E1B5-44BC-BC54-8923ADAC392F}" dt="2022-03-26T19:30:33.817" v="1160" actId="478"/>
+          <ac:spMkLst>
+            <pc:docMk/>
+            <pc:sldMk cId="2833893545" sldId="373"/>
+            <ac:spMk id="53" creationId="{4A929795-8D02-43D6-A5B4-3FAA7946F478}"/>
+          </ac:spMkLst>
+        </pc:spChg>
+        <pc:spChg chg="mod">
+          <ac:chgData name="Jackie N" userId="8b14f1697149b7ae" providerId="LiveId" clId="{07AE1321-E1B5-44BC-BC54-8923ADAC392F}" dt="2022-03-26T19:30:49.043" v="1165" actId="1076"/>
+          <ac:spMkLst>
+            <pc:docMk/>
+            <pc:sldMk cId="2833893545" sldId="373"/>
+            <ac:spMk id="55" creationId="{B8107BFB-DD79-4CD4-BDD9-253861459390}"/>
+          </ac:spMkLst>
+        </pc:spChg>
+        <pc:spChg chg="mod">
+          <ac:chgData name="Jackie N" userId="8b14f1697149b7ae" providerId="LiveId" clId="{07AE1321-E1B5-44BC-BC54-8923ADAC392F}" dt="2022-03-26T19:30:49.043" v="1165" actId="1076"/>
+          <ac:spMkLst>
+            <pc:docMk/>
+            <pc:sldMk cId="2833893545" sldId="373"/>
+            <ac:spMk id="56" creationId="{C9FA9BAB-FC8A-43C0-B258-9E3DE15AD596}"/>
+          </ac:spMkLst>
+        </pc:spChg>
         <pc:spChg chg="mod ord">
-          <ac:chgData name="Jackie N" userId="8b14f1697149b7ae" providerId="LiveId" clId="{07AE1321-E1B5-44BC-BC54-8923ADAC392F}" dt="2022-03-25T17:34:04.826" v="933" actId="1076"/>
+          <ac:chgData name="Jackie N" userId="8b14f1697149b7ae" providerId="LiveId" clId="{07AE1321-E1B5-44BC-BC54-8923ADAC392F}" dt="2022-03-26T19:31:56.312" v="1238" actId="14100"/>
           <ac:spMkLst>
             <pc:docMk/>
             <pc:sldMk cId="2833893545" sldId="373"/>
             <ac:spMk id="92" creationId="{62E0DA5E-720F-479C-AF3A-9E634D5BBCB0}"/>
           </ac:spMkLst>
         </pc:spChg>
+        <pc:spChg chg="add del">
+          <ac:chgData name="Jackie N" userId="8b14f1697149b7ae" providerId="LiveId" clId="{07AE1321-E1B5-44BC-BC54-8923ADAC392F}" dt="2022-03-26T19:29:23.493" v="1148" actId="478"/>
+          <ac:spMkLst>
+            <pc:docMk/>
+            <pc:sldMk cId="2833893545" sldId="373"/>
+            <ac:spMk id="93" creationId="{7999C9E9-E149-4E5F-907E-57BA989539A3}"/>
+          </ac:spMkLst>
+        </pc:spChg>
+        <pc:spChg chg="add del mod ord">
+          <ac:chgData name="Jackie N" userId="8b14f1697149b7ae" providerId="LiveId" clId="{07AE1321-E1B5-44BC-BC54-8923ADAC392F}" dt="2022-03-26T19:32:09.715" v="1240" actId="166"/>
+          <ac:spMkLst>
+            <pc:docMk/>
+            <pc:sldMk cId="2833893545" sldId="373"/>
+            <ac:spMk id="99" creationId="{301F5C07-7FF1-4C90-8198-FC9C51216C7E}"/>
+          </ac:spMkLst>
+        </pc:spChg>
         <pc:spChg chg="mod">
-          <ac:chgData name="Jackie N" userId="8b14f1697149b7ae" providerId="LiveId" clId="{07AE1321-E1B5-44BC-BC54-8923ADAC392F}" dt="2022-03-25T17:31:03.267" v="890" actId="14100"/>
+          <ac:chgData name="Jackie N" userId="8b14f1697149b7ae" providerId="LiveId" clId="{07AE1321-E1B5-44BC-BC54-8923ADAC392F}" dt="2022-03-26T19:31:31.824" v="1232" actId="1038"/>
           <ac:spMkLst>
             <pc:docMk/>
             <pc:sldMk cId="2833893545" sldId="373"/>
@@ -1378,7 +1458,7 @@
           </ac:spMkLst>
         </pc:spChg>
         <pc:spChg chg="mod">
-          <ac:chgData name="Jackie N" userId="8b14f1697149b7ae" providerId="LiveId" clId="{07AE1321-E1B5-44BC-BC54-8923ADAC392F}" dt="2022-03-25T17:29:41.973" v="881" actId="14100"/>
+          <ac:chgData name="Jackie N" userId="8b14f1697149b7ae" providerId="LiveId" clId="{07AE1321-E1B5-44BC-BC54-8923ADAC392F}" dt="2022-03-26T19:31:31.824" v="1232" actId="1038"/>
           <ac:spMkLst>
             <pc:docMk/>
             <pc:sldMk cId="2833893545" sldId="373"/>
@@ -1391,6 +1471,14 @@
             <pc:docMk/>
             <pc:sldMk cId="2833893545" sldId="373"/>
             <ac:spMk id="105" creationId="{43C8943A-66D6-435A-8904-1BEFF40068DE}"/>
+          </ac:spMkLst>
+        </pc:spChg>
+        <pc:spChg chg="add del">
+          <ac:chgData name="Jackie N" userId="8b14f1697149b7ae" providerId="LiveId" clId="{07AE1321-E1B5-44BC-BC54-8923ADAC392F}" dt="2022-03-26T19:29:17.006" v="1147" actId="478"/>
+          <ac:spMkLst>
+            <pc:docMk/>
+            <pc:sldMk cId="2833893545" sldId="373"/>
+            <ac:spMk id="115" creationId="{685F49E4-53E7-41BA-ABAA-9153A7ED27D0}"/>
           </ac:spMkLst>
         </pc:spChg>
         <pc:spChg chg="del">
@@ -1409,12 +1497,76 @@
             <ac:spMk id="117" creationId="{35399D29-BBC9-4998-85F2-C7ED90600EF6}"/>
           </ac:spMkLst>
         </pc:spChg>
+        <pc:spChg chg="mod">
+          <ac:chgData name="Jackie N" userId="8b14f1697149b7ae" providerId="LiveId" clId="{07AE1321-E1B5-44BC-BC54-8923ADAC392F}" dt="2022-03-26T19:31:36.625" v="1233" actId="1076"/>
+          <ac:spMkLst>
+            <pc:docMk/>
+            <pc:sldMk cId="2833893545" sldId="373"/>
+            <ac:spMk id="118" creationId="{A86DC910-3D53-4415-B119-9F69C3CD6733}"/>
+          </ac:spMkLst>
+        </pc:spChg>
+        <pc:grpChg chg="add mod">
+          <ac:chgData name="Jackie N" userId="8b14f1697149b7ae" providerId="LiveId" clId="{07AE1321-E1B5-44BC-BC54-8923ADAC392F}" dt="2022-03-26T19:31:31.824" v="1232" actId="1038"/>
+          <ac:grpSpMkLst>
+            <pc:docMk/>
+            <pc:sldMk cId="2833893545" sldId="373"/>
+            <ac:grpSpMk id="8" creationId="{26276A59-1DA1-48D3-9E20-3521754ADF56}"/>
+          </ac:grpSpMkLst>
+        </pc:grpChg>
+        <pc:grpChg chg="add mod">
+          <ac:chgData name="Jackie N" userId="8b14f1697149b7ae" providerId="LiveId" clId="{07AE1321-E1B5-44BC-BC54-8923ADAC392F}" dt="2022-03-26T19:29:51.415" v="1151"/>
+          <ac:grpSpMkLst>
+            <pc:docMk/>
+            <pc:sldMk cId="2833893545" sldId="373"/>
+            <ac:grpSpMk id="42" creationId="{A814B973-FFD3-4979-8A2A-F360431F4157}"/>
+          </ac:grpSpMkLst>
+        </pc:grpChg>
+        <pc:grpChg chg="add mod">
+          <ac:chgData name="Jackie N" userId="8b14f1697149b7ae" providerId="LiveId" clId="{07AE1321-E1B5-44BC-BC54-8923ADAC392F}" dt="2022-03-26T19:29:51.415" v="1151"/>
+          <ac:grpSpMkLst>
+            <pc:docMk/>
+            <pc:sldMk cId="2833893545" sldId="373"/>
+            <ac:grpSpMk id="49" creationId="{F87FE32D-CD6B-4DCF-91E3-87014998FDC7}"/>
+          </ac:grpSpMkLst>
+        </pc:grpChg>
+        <pc:grpChg chg="add mod">
+          <ac:chgData name="Jackie N" userId="8b14f1697149b7ae" providerId="LiveId" clId="{07AE1321-E1B5-44BC-BC54-8923ADAC392F}" dt="2022-03-26T19:30:49.043" v="1165" actId="1076"/>
+          <ac:grpSpMkLst>
+            <pc:docMk/>
+            <pc:sldMk cId="2833893545" sldId="373"/>
+            <ac:grpSpMk id="54" creationId="{14CE3AE3-881B-45C6-AC49-62B48FEB640B}"/>
+          </ac:grpSpMkLst>
+        </pc:grpChg>
+        <pc:grpChg chg="del">
+          <ac:chgData name="Jackie N" userId="8b14f1697149b7ae" providerId="LiveId" clId="{07AE1321-E1B5-44BC-BC54-8923ADAC392F}" dt="2022-03-26T19:26:52.954" v="991" actId="478"/>
+          <ac:grpSpMkLst>
+            <pc:docMk/>
+            <pc:sldMk cId="2833893545" sldId="373"/>
+            <ac:grpSpMk id="94" creationId="{01C0FB8C-2F2B-4170-8394-77AC09698548}"/>
+          </ac:grpSpMkLst>
+        </pc:grpChg>
+        <pc:grpChg chg="del">
+          <ac:chgData name="Jackie N" userId="8b14f1697149b7ae" providerId="LiveId" clId="{07AE1321-E1B5-44BC-BC54-8923ADAC392F}" dt="2022-03-26T19:26:53.740" v="992" actId="478"/>
+          <ac:grpSpMkLst>
+            <pc:docMk/>
+            <pc:sldMk cId="2833893545" sldId="373"/>
+            <ac:grpSpMk id="100" creationId="{CF4BF398-DC29-4145-A44F-5929ABA01800}"/>
+          </ac:grpSpMkLst>
+        </pc:grpChg>
         <pc:picChg chg="add mod">
-          <ac:chgData name="Jackie N" userId="8b14f1697149b7ae" providerId="LiveId" clId="{07AE1321-E1B5-44BC-BC54-8923ADAC392F}" dt="2022-03-25T17:30:26.914" v="885" actId="1076"/>
+          <ac:chgData name="Jackie N" userId="8b14f1697149b7ae" providerId="LiveId" clId="{07AE1321-E1B5-44BC-BC54-8923ADAC392F}" dt="2022-03-26T19:31:31.824" v="1232" actId="1038"/>
           <ac:picMkLst>
             <pc:docMk/>
             <pc:sldMk cId="2833893545" sldId="373"/>
             <ac:picMk id="41" creationId="{69CCF810-B3C3-46FE-A7F2-F31790E5D22E}"/>
+          </ac:picMkLst>
+        </pc:picChg>
+        <pc:picChg chg="mod">
+          <ac:chgData name="Jackie N" userId="8b14f1697149b7ae" providerId="LiveId" clId="{07AE1321-E1B5-44BC-BC54-8923ADAC392F}" dt="2022-03-26T19:29:51.415" v="1151"/>
+          <ac:picMkLst>
+            <pc:docMk/>
+            <pc:sldMk cId="2833893545" sldId="373"/>
+            <ac:picMk id="43" creationId="{CB8E6C6A-0DF3-4DD8-A0EF-CDEC8949B5D3}"/>
           </ac:picMkLst>
         </pc:picChg>
         <pc:picChg chg="add del mod">
@@ -1425,8 +1577,40 @@
             <ac:picMk id="45" creationId="{C6B7FEA5-A641-4B19-8EF7-50A08B18D699}"/>
           </ac:picMkLst>
         </pc:picChg>
+        <pc:picChg chg="add del">
+          <ac:chgData name="Jackie N" userId="8b14f1697149b7ae" providerId="LiveId" clId="{07AE1321-E1B5-44BC-BC54-8923ADAC392F}" dt="2022-03-26T19:29:15.106" v="1146" actId="478"/>
+          <ac:picMkLst>
+            <pc:docMk/>
+            <pc:sldMk cId="2833893545" sldId="373"/>
+            <ac:picMk id="46" creationId="{AE548326-FB5F-4D36-B2A5-7BFF42ED2E7C}"/>
+          </ac:picMkLst>
+        </pc:picChg>
+        <pc:picChg chg="mod">
+          <ac:chgData name="Jackie N" userId="8b14f1697149b7ae" providerId="LiveId" clId="{07AE1321-E1B5-44BC-BC54-8923ADAC392F}" dt="2022-03-26T19:29:51.415" v="1151"/>
+          <ac:picMkLst>
+            <pc:docMk/>
+            <pc:sldMk cId="2833893545" sldId="373"/>
+            <ac:picMk id="50" creationId="{0FF2B951-7119-4020-BF50-723D10E6901B}"/>
+          </ac:picMkLst>
+        </pc:picChg>
+        <pc:picChg chg="mod">
+          <ac:chgData name="Jackie N" userId="8b14f1697149b7ae" providerId="LiveId" clId="{07AE1321-E1B5-44BC-BC54-8923ADAC392F}" dt="2022-03-26T19:30:49.043" v="1165" actId="1076"/>
+          <ac:picMkLst>
+            <pc:docMk/>
+            <pc:sldMk cId="2833893545" sldId="373"/>
+            <ac:picMk id="57" creationId="{D531644B-4CC7-41D7-A361-DC466375E61B}"/>
+          </ac:picMkLst>
+        </pc:picChg>
+        <pc:picChg chg="mod">
+          <ac:chgData name="Jackie N" userId="8b14f1697149b7ae" providerId="LiveId" clId="{07AE1321-E1B5-44BC-BC54-8923ADAC392F}" dt="2022-03-26T19:28:47.802" v="1132" actId="1035"/>
+          <ac:picMkLst>
+            <pc:docMk/>
+            <pc:sldMk cId="2833893545" sldId="373"/>
+            <ac:picMk id="97" creationId="{CFD5134D-7AE3-4851-984E-FC7483353F51}"/>
+          </ac:picMkLst>
+        </pc:picChg>
         <pc:picChg chg="add mod">
-          <ac:chgData name="Jackie N" userId="8b14f1697149b7ae" providerId="LiveId" clId="{07AE1321-E1B5-44BC-BC54-8923ADAC392F}" dt="2022-03-25T17:32:51.586" v="905" actId="1076"/>
+          <ac:chgData name="Jackie N" userId="8b14f1697149b7ae" providerId="LiveId" clId="{07AE1321-E1B5-44BC-BC54-8923ADAC392F}" dt="2022-03-26T19:31:31.824" v="1232" actId="1038"/>
           <ac:picMkLst>
             <pc:docMk/>
             <pc:sldMk cId="2833893545" sldId="373"/>
@@ -1434,15 +1618,23 @@
           </ac:picMkLst>
         </pc:picChg>
         <pc:cxnChg chg="add mod">
-          <ac:chgData name="Jackie N" userId="8b14f1697149b7ae" providerId="LiveId" clId="{07AE1321-E1B5-44BC-BC54-8923ADAC392F}" dt="2022-03-25T17:34:08.770" v="934" actId="14100"/>
+          <ac:chgData name="Jackie N" userId="8b14f1697149b7ae" providerId="LiveId" clId="{07AE1321-E1B5-44BC-BC54-8923ADAC392F}" dt="2022-03-26T19:31:31.824" v="1232" actId="1038"/>
           <ac:cxnSpMkLst>
             <pc:docMk/>
             <pc:sldMk cId="2833893545" sldId="373"/>
             <ac:cxnSpMk id="48" creationId="{BA077138-4AFC-4844-ABD3-B66C880900FA}"/>
           </ac:cxnSpMkLst>
         </pc:cxnChg>
-        <pc:cxnChg chg="mod">
-          <ac:chgData name="Jackie N" userId="8b14f1697149b7ae" providerId="LiveId" clId="{07AE1321-E1B5-44BC-BC54-8923ADAC392F}" dt="2022-03-25T17:29:41.973" v="881" actId="14100"/>
+        <pc:cxnChg chg="add del mod">
+          <ac:chgData name="Jackie N" userId="8b14f1697149b7ae" providerId="LiveId" clId="{07AE1321-E1B5-44BC-BC54-8923ADAC392F}" dt="2022-03-26T19:29:23.493" v="1148" actId="478"/>
+          <ac:cxnSpMkLst>
+            <pc:docMk/>
+            <pc:sldMk cId="2833893545" sldId="373"/>
+            <ac:cxnSpMk id="98" creationId="{9E1C9126-2517-4093-93EC-EEE17533B104}"/>
+          </ac:cxnSpMkLst>
+        </pc:cxnChg>
+        <pc:cxnChg chg="del mod">
+          <ac:chgData name="Jackie N" userId="8b14f1697149b7ae" providerId="LiveId" clId="{07AE1321-E1B5-44BC-BC54-8923ADAC392F}" dt="2022-03-26T19:29:33.025" v="1150" actId="478"/>
           <ac:cxnSpMkLst>
             <pc:docMk/>
             <pc:sldMk cId="2833893545" sldId="373"/>
@@ -1450,7 +1642,23 @@
           </ac:cxnSpMkLst>
         </pc:cxnChg>
         <pc:cxnChg chg="mod">
-          <ac:chgData name="Jackie N" userId="8b14f1697149b7ae" providerId="LiveId" clId="{07AE1321-E1B5-44BC-BC54-8923ADAC392F}" dt="2022-03-25T17:31:07.925" v="891" actId="14100"/>
+          <ac:chgData name="Jackie N" userId="8b14f1697149b7ae" providerId="LiveId" clId="{07AE1321-E1B5-44BC-BC54-8923ADAC392F}" dt="2022-03-26T19:31:50.059" v="1237" actId="14100"/>
+          <ac:cxnSpMkLst>
+            <pc:docMk/>
+            <pc:sldMk cId="2833893545" sldId="373"/>
+            <ac:cxnSpMk id="108" creationId="{7F16F149-EA8E-4A08-8FAF-1AF2BFA53F27}"/>
+          </ac:cxnSpMkLst>
+        </pc:cxnChg>
+        <pc:cxnChg chg="mod">
+          <ac:chgData name="Jackie N" userId="8b14f1697149b7ae" providerId="LiveId" clId="{07AE1321-E1B5-44BC-BC54-8923ADAC392F}" dt="2022-03-26T19:31:36.625" v="1233" actId="1076"/>
+          <ac:cxnSpMkLst>
+            <pc:docMk/>
+            <pc:sldMk cId="2833893545" sldId="373"/>
+            <ac:cxnSpMk id="110" creationId="{56003883-F777-4273-94A2-FC485286CB35}"/>
+          </ac:cxnSpMkLst>
+        </pc:cxnChg>
+        <pc:cxnChg chg="mod">
+          <ac:chgData name="Jackie N" userId="8b14f1697149b7ae" providerId="LiveId" clId="{07AE1321-E1B5-44BC-BC54-8923ADAC392F}" dt="2022-03-26T19:31:31.824" v="1232" actId="1038"/>
           <ac:cxnSpMkLst>
             <pc:docMk/>
             <pc:sldMk cId="2833893545" sldId="373"/>
@@ -1560,7 +1768,7 @@
           <a:p>
             <a:fld id="{69797AF1-868B-5A42-A764-B7DD04806930}" type="datetimeFigureOut">
               <a:rPr lang="en-US" smtClean="0"/>
-              <a:t>3/25/2022</a:t>
+              <a:t>3/26/2022</a:t>
             </a:fld>
             <a:endParaRPr lang="en-US"/>
           </a:p>
@@ -23486,7 +23694,7 @@
         <p:spPr>
           <a:xfrm>
             <a:off x="9024126" y="3837412"/>
-            <a:ext cx="2404742" cy="430887"/>
+            <a:ext cx="2404742" cy="769441"/>
           </a:xfrm>
           <a:prstGeom prst="rect">
             <a:avLst/>
@@ -23513,7 +23721,48 @@
                   <a:schemeClr val="accent5"/>
                 </a:solidFill>
               </a:rPr>
-              <a:t>: Age, Gender, Race, Crime Type, *Judge</a:t>
+              <a:t>: Age, Gender, Race</a:t>
+            </a:r>
+          </a:p>
+          <a:p>
+            <a:endParaRPr lang="en-US" sz="1100" b="1" dirty="0">
+              <a:solidFill>
+                <a:schemeClr val="accent5"/>
+              </a:solidFill>
+            </a:endParaRPr>
+          </a:p>
+          <a:p>
+            <a:r>
+              <a:rPr lang="en-US" sz="1100" b="1" dirty="0">
+                <a:solidFill>
+                  <a:schemeClr val="accent5"/>
+                </a:solidFill>
+              </a:rPr>
+              <a:t>Segmented by</a:t>
+            </a:r>
+            <a:r>
+              <a:rPr lang="en-US" sz="1100" dirty="0">
+                <a:solidFill>
+                  <a:schemeClr val="accent5"/>
+                </a:solidFill>
+              </a:rPr>
+              <a:t> Crime Type, geo-locations,</a:t>
+            </a:r>
+            <a:r>
+              <a:rPr lang="en-US" sz="1100" b="1" dirty="0">
+                <a:solidFill>
+                  <a:schemeClr val="accent5"/>
+                </a:solidFill>
+              </a:rPr>
+              <a:t> </a:t>
+            </a:r>
+            <a:r>
+              <a:rPr lang="en-US" sz="1100" dirty="0">
+                <a:solidFill>
+                  <a:schemeClr val="accent5"/>
+                </a:solidFill>
+              </a:rPr>
+              <a:t>*Judge</a:t>
             </a:r>
           </a:p>
         </p:txBody>
@@ -23621,8 +23870,8 @@
         </p:nvSpPr>
         <p:spPr bwMode="auto">
           <a:xfrm>
-            <a:off x="1895583" y="1198521"/>
-            <a:ext cx="6789404" cy="5579572"/>
+            <a:off x="2318660" y="1198521"/>
+            <a:ext cx="6366326" cy="5579572"/>
           </a:xfrm>
           <a:prstGeom prst="rect">
             <a:avLst/>
@@ -23667,83 +23916,6 @@
               <a:solidFill>
                 <a:srgbClr val="000000"/>
               </a:solidFill>
-              <a:latin typeface="Segoe UI"/>
-              <a:cs typeface="Arial"/>
-              <a:sym typeface="Arial"/>
-            </a:endParaRPr>
-          </a:p>
-        </p:txBody>
-      </p:sp>
-      <p:sp>
-        <p:nvSpPr>
-          <p:cNvPr id="47" name="Rounded Rectangle 9">
-            <a:extLst>
-              <a:ext uri="{FF2B5EF4-FFF2-40B4-BE49-F238E27FC236}">
-                <a16:creationId xmlns:a16="http://schemas.microsoft.com/office/drawing/2014/main" id="{4045D4C8-84DF-4CB6-B58A-E58C48BE8536}"/>
-              </a:ext>
-            </a:extLst>
-          </p:cNvPr>
-          <p:cNvSpPr/>
-          <p:nvPr/>
-        </p:nvSpPr>
-        <p:spPr bwMode="auto">
-          <a:xfrm>
-            <a:off x="2260731" y="5120669"/>
-            <a:ext cx="3372291" cy="1478461"/>
-          </a:xfrm>
-          <a:prstGeom prst="roundRect">
-            <a:avLst/>
-          </a:prstGeom>
-          <a:solidFill>
-            <a:srgbClr val="2396ED"/>
-          </a:solidFill>
-          <a:ln w="9525" cap="flat" cmpd="sng" algn="ctr">
-            <a:solidFill>
-              <a:srgbClr val="3A94D2">
-                <a:satMod val="150000"/>
-              </a:srgbClr>
-            </a:solidFill>
-            <a:prstDash val="solid"/>
-            <a:headEnd type="none" w="med" len="med"/>
-            <a:tailEnd type="none" w="med" len="med"/>
-          </a:ln>
-          <a:effectLst>
-            <a:outerShdw blurRad="65500" dist="38100" dir="5400000" rotWithShape="0">
-              <a:srgbClr val="000000">
-                <a:alpha val="40000"/>
-              </a:srgbClr>
-            </a:outerShdw>
-          </a:effectLst>
-        </p:spPr>
-        <p:txBody>
-          <a:bodyPr vert="horz" wrap="square" lIns="121915" tIns="60957" rIns="121915" bIns="60957" numCol="1" rtlCol="0" anchor="ctr" anchorCtr="0" compatLnSpc="1">
-            <a:prstTxWarp prst="textNoShape">
-              <a:avLst/>
-            </a:prstTxWarp>
-          </a:bodyPr>
-          <a:lstStyle/>
-          <a:p>
-            <a:pPr algn="ctr" defTabSz="1218768" fontAlgn="base">
-              <a:spcBef>
-                <a:spcPct val="0"/>
-              </a:spcBef>
-              <a:spcAft>
-                <a:spcPct val="0"/>
-              </a:spcAft>
-              <a:defRPr/>
-            </a:pPr>
-            <a:endParaRPr lang="en-US" sz="2667">
-              <a:gradFill>
-                <a:gsLst>
-                  <a:gs pos="0">
-                    <a:srgbClr val="FFFFFF"/>
-                  </a:gs>
-                  <a:gs pos="100000">
-                    <a:srgbClr val="FFFFFF"/>
-                  </a:gs>
-                </a:gsLst>
-                <a:lin ang="5400000" scaled="0"/>
-              </a:gradFill>
               <a:latin typeface="Segoe UI"/>
               <a:cs typeface="Arial"/>
               <a:sym typeface="Arial"/>
@@ -23844,331 +24016,6 @@
           </a:p>
         </p:txBody>
       </p:sp>
-      <p:sp>
-        <p:nvSpPr>
-          <p:cNvPr id="115" name="Rectangle 114">
-            <a:extLst>
-              <a:ext uri="{FF2B5EF4-FFF2-40B4-BE49-F238E27FC236}">
-                <a16:creationId xmlns:a16="http://schemas.microsoft.com/office/drawing/2014/main" id="{685F49E4-53E7-41BA-ABAA-9153A7ED27D0}"/>
-              </a:ext>
-            </a:extLst>
-          </p:cNvPr>
-          <p:cNvSpPr/>
-          <p:nvPr/>
-        </p:nvSpPr>
-        <p:spPr>
-          <a:xfrm>
-            <a:off x="61968" y="2949385"/>
-            <a:ext cx="1543120" cy="415498"/>
-          </a:xfrm>
-          <a:prstGeom prst="rect">
-            <a:avLst/>
-          </a:prstGeom>
-        </p:spPr>
-        <p:txBody>
-          <a:bodyPr wrap="square" lIns="121920" tIns="60960" rIns="121920" bIns="60960" anchor="t">
-            <a:spAutoFit/>
-          </a:bodyPr>
-          <a:lstStyle/>
-          <a:p>
-            <a:pPr defTabSz="913881">
-              <a:lnSpc>
-                <a:spcPct val="95000"/>
-              </a:lnSpc>
-              <a:spcBef>
-                <a:spcPct val="0"/>
-              </a:spcBef>
-              <a:spcAft>
-                <a:spcPct val="0"/>
-              </a:spcAft>
-              <a:defRPr/>
-            </a:pPr>
-            <a:r>
-              <a:rPr lang="en-US" sz="1000" b="1" spc="49" dirty="0">
-                <a:solidFill>
-                  <a:srgbClr val="F7F2E2"/>
-                </a:solidFill>
-                <a:latin typeface="Segoe UI Semibold"/>
-                <a:cs typeface="Segoe UI Semibold"/>
-              </a:rPr>
-              <a:t>Florida Department Of Corrections</a:t>
-            </a:r>
-            <a:endParaRPr lang="en-US" sz="2400" dirty="0">
-              <a:solidFill>
-                <a:srgbClr val="F7F2E2"/>
-              </a:solidFill>
-            </a:endParaRPr>
-          </a:p>
-        </p:txBody>
-      </p:sp>
-      <p:pic>
-        <p:nvPicPr>
-          <p:cNvPr id="46" name="Picture 45" descr="Logo&#10;&#10;Description automatically generated">
-            <a:extLst>
-              <a:ext uri="{FF2B5EF4-FFF2-40B4-BE49-F238E27FC236}">
-                <a16:creationId xmlns:a16="http://schemas.microsoft.com/office/drawing/2014/main" id="{AE548326-FB5F-4D36-B2A5-7BFF42ED2E7C}"/>
-              </a:ext>
-            </a:extLst>
-          </p:cNvPr>
-          <p:cNvPicPr>
-            <a:picLocks noChangeAspect="1"/>
-          </p:cNvPicPr>
-          <p:nvPr/>
-        </p:nvPicPr>
-        <p:blipFill>
-          <a:blip r:embed="rId3"/>
-          <a:stretch>
-            <a:fillRect/>
-          </a:stretch>
-        </p:blipFill>
-        <p:spPr>
-          <a:xfrm>
-            <a:off x="228470" y="1862288"/>
-            <a:ext cx="1014849" cy="1014849"/>
-          </a:xfrm>
-          <a:prstGeom prst="rect">
-            <a:avLst/>
-          </a:prstGeom>
-        </p:spPr>
-      </p:pic>
-      <p:sp>
-        <p:nvSpPr>
-          <p:cNvPr id="93" name="Rounded Rectangle 11">
-            <a:extLst>
-              <a:ext uri="{FF2B5EF4-FFF2-40B4-BE49-F238E27FC236}">
-                <a16:creationId xmlns:a16="http://schemas.microsoft.com/office/drawing/2014/main" id="{7999C9E9-E149-4E5F-907E-57BA989539A3}"/>
-              </a:ext>
-            </a:extLst>
-          </p:cNvPr>
-          <p:cNvSpPr/>
-          <p:nvPr/>
-        </p:nvSpPr>
-        <p:spPr bwMode="auto">
-          <a:xfrm>
-            <a:off x="4651222" y="1913650"/>
-            <a:ext cx="2497073" cy="912123"/>
-          </a:xfrm>
-          <a:prstGeom prst="roundRect">
-            <a:avLst/>
-          </a:prstGeom>
-          <a:gradFill rotWithShape="1">
-            <a:gsLst>
-              <a:gs pos="0">
-                <a:srgbClr val="3A94D2">
-                  <a:tint val="65000"/>
-                  <a:satMod val="270000"/>
-                </a:srgbClr>
-              </a:gs>
-              <a:gs pos="25000">
-                <a:srgbClr val="3A94D2">
-                  <a:tint val="60000"/>
-                  <a:satMod val="300000"/>
-                </a:srgbClr>
-              </a:gs>
-              <a:gs pos="100000">
-                <a:srgbClr val="3A94D2">
-                  <a:tint val="29000"/>
-                  <a:satMod val="400000"/>
-                </a:srgbClr>
-              </a:gs>
-            </a:gsLst>
-            <a:lin ang="16200000" scaled="1"/>
-          </a:gradFill>
-          <a:ln w="9525" cap="flat" cmpd="sng" algn="ctr">
-            <a:solidFill>
-              <a:srgbClr val="3A94D2">
-                <a:satMod val="150000"/>
-              </a:srgbClr>
-            </a:solidFill>
-            <a:prstDash val="solid"/>
-            <a:headEnd type="none" w="med" len="med"/>
-            <a:tailEnd type="none" w="med" len="med"/>
-          </a:ln>
-          <a:effectLst>
-            <a:outerShdw blurRad="65500" dist="38100" dir="5400000" rotWithShape="0">
-              <a:srgbClr val="000000">
-                <a:alpha val="40000"/>
-              </a:srgbClr>
-            </a:outerShdw>
-          </a:effectLst>
-        </p:spPr>
-        <p:txBody>
-          <a:bodyPr vert="horz" wrap="square" lIns="121915" tIns="60957" rIns="121915" bIns="60957" numCol="1" rtlCol="0" anchor="ctr" anchorCtr="0" compatLnSpc="1">
-            <a:prstTxWarp prst="textNoShape">
-              <a:avLst/>
-            </a:prstTxWarp>
-          </a:bodyPr>
-          <a:lstStyle/>
-          <a:p>
-            <a:pPr algn="ctr" defTabSz="1218768" fontAlgn="base">
-              <a:spcBef>
-                <a:spcPct val="0"/>
-              </a:spcBef>
-              <a:spcAft>
-                <a:spcPct val="0"/>
-              </a:spcAft>
-              <a:defRPr/>
-            </a:pPr>
-            <a:r>
-              <a:rPr lang="en-US" sz="1867" dirty="0">
-                <a:gradFill>
-                  <a:gsLst>
-                    <a:gs pos="0">
-                      <a:srgbClr val="FFFFFF"/>
-                    </a:gs>
-                    <a:gs pos="100000">
-                      <a:srgbClr val="FFFFFF"/>
-                    </a:gs>
-                  </a:gsLst>
-                  <a:lin ang="5400000" scaled="0"/>
-                </a:gradFill>
-                <a:latin typeface="Segoe UI"/>
-                <a:cs typeface="Arial"/>
-                <a:sym typeface="Arial"/>
-              </a:rPr>
-              <a:t>EDA, Cleansing etc.</a:t>
-            </a:r>
-          </a:p>
-        </p:txBody>
-      </p:sp>
-      <p:grpSp>
-        <p:nvGrpSpPr>
-          <p:cNvPr id="94" name="Group 116">
-            <a:extLst>
-              <a:ext uri="{FF2B5EF4-FFF2-40B4-BE49-F238E27FC236}">
-                <a16:creationId xmlns:a16="http://schemas.microsoft.com/office/drawing/2014/main" id="{01C0FB8C-2F2B-4170-8394-77AC09698548}"/>
-              </a:ext>
-            </a:extLst>
-          </p:cNvPr>
-          <p:cNvGrpSpPr/>
-          <p:nvPr/>
-        </p:nvGrpSpPr>
-        <p:grpSpPr>
-          <a:xfrm>
-            <a:off x="9554657" y="2758884"/>
-            <a:ext cx="986755" cy="1016000"/>
-            <a:chOff x="555334" y="4191000"/>
-            <a:chExt cx="587666" cy="609600"/>
-          </a:xfrm>
-        </p:grpSpPr>
-        <p:pic>
-          <p:nvPicPr>
-            <p:cNvPr id="95" name="Picture 3" descr="C:\Documents and Settings\antonk\Local Settings\Temporary Internet Files\Content.IE5\AV78XKCM\MCj04348450000[1].png">
-              <a:extLst>
-                <a:ext uri="{FF2B5EF4-FFF2-40B4-BE49-F238E27FC236}">
-                  <a16:creationId xmlns:a16="http://schemas.microsoft.com/office/drawing/2014/main" id="{720CBC3A-E74E-4FC7-B8E4-D26AE90673E2}"/>
-                </a:ext>
-              </a:extLst>
-            </p:cNvPr>
-            <p:cNvPicPr>
-              <a:picLocks noChangeAspect="1" noChangeArrowheads="1"/>
-            </p:cNvPicPr>
-            <p:nvPr/>
-          </p:nvPicPr>
-          <p:blipFill>
-            <a:blip r:embed="rId4" cstate="print"/>
-            <a:srcRect/>
-            <a:stretch>
-              <a:fillRect/>
-            </a:stretch>
-          </p:blipFill>
-          <p:spPr bwMode="auto">
-            <a:xfrm>
-              <a:off x="555334" y="4191000"/>
-              <a:ext cx="587666" cy="527538"/>
-            </a:xfrm>
-            <a:prstGeom prst="rect">
-              <a:avLst/>
-            </a:prstGeom>
-            <a:noFill/>
-          </p:spPr>
-        </p:pic>
-        <p:sp>
-          <p:nvSpPr>
-            <p:cNvPr id="96" name="Can 21">
-              <a:extLst>
-                <a:ext uri="{FF2B5EF4-FFF2-40B4-BE49-F238E27FC236}">
-                  <a16:creationId xmlns:a16="http://schemas.microsoft.com/office/drawing/2014/main" id="{34A24359-6A92-4311-B53B-0BE9DAB6053B}"/>
-                </a:ext>
-              </a:extLst>
-            </p:cNvPr>
-            <p:cNvSpPr/>
-            <p:nvPr/>
-          </p:nvSpPr>
-          <p:spPr>
-            <a:xfrm>
-              <a:off x="860133" y="4419600"/>
-              <a:ext cx="228600" cy="381000"/>
-            </a:xfrm>
-            <a:prstGeom prst="can">
-              <a:avLst/>
-            </a:prstGeom>
-            <a:gradFill rotWithShape="1">
-              <a:gsLst>
-                <a:gs pos="0">
-                  <a:srgbClr val="3A94D2">
-                    <a:shade val="45000"/>
-                    <a:satMod val="155000"/>
-                  </a:srgbClr>
-                </a:gs>
-                <a:gs pos="60000">
-                  <a:srgbClr val="3A94D2">
-                    <a:shade val="95000"/>
-                    <a:satMod val="150000"/>
-                  </a:srgbClr>
-                </a:gs>
-                <a:gs pos="100000">
-                  <a:srgbClr val="3A94D2">
-                    <a:tint val="87000"/>
-                    <a:satMod val="250000"/>
-                  </a:srgbClr>
-                </a:gs>
-              </a:gsLst>
-              <a:lin ang="16200000" scaled="0"/>
-            </a:gradFill>
-            <a:ln>
-              <a:noFill/>
-            </a:ln>
-            <a:effectLst>
-              <a:outerShdw blurRad="65500" dist="38100" dir="5400000" rotWithShape="0">
-                <a:srgbClr val="000000">
-                  <a:alpha val="40000"/>
-                </a:srgbClr>
-              </a:outerShdw>
-            </a:effectLst>
-            <a:scene3d>
-              <a:camera prst="orthographicFront" fov="0">
-                <a:rot lat="0" lon="0" rev="0"/>
-              </a:camera>
-              <a:lightRig rig="contrasting" dir="t">
-                <a:rot lat="0" lon="0" rev="12000000"/>
-              </a:lightRig>
-            </a:scene3d>
-            <a:sp3d prstMaterial="powder">
-              <a:bevelT h="50800"/>
-            </a:sp3d>
-          </p:spPr>
-          <p:txBody>
-            <a:bodyPr rtlCol="0" anchor="ctr"/>
-            <a:lstStyle/>
-            <a:p>
-              <a:pPr algn="ctr" defTabSz="1219120">
-                <a:defRPr/>
-              </a:pPr>
-              <a:endParaRPr lang="en-US" sz="1600">
-                <a:solidFill>
-                  <a:srgbClr val="8557C9">
-                    <a:lumMod val="25000"/>
-                  </a:srgbClr>
-                </a:solidFill>
-                <a:latin typeface="Segoe UI"/>
-                <a:cs typeface="Arial" pitchFamily="34" charset="0"/>
-                <a:sym typeface="Arial"/>
-              </a:endParaRPr>
-            </a:p>
-          </p:txBody>
-        </p:sp>
-      </p:grpSp>
       <p:pic>
         <p:nvPicPr>
           <p:cNvPr id="97" name="Picture 2" descr="Bloomberg Professional Service">
@@ -24184,7 +24031,7 @@
           <p:nvPr/>
         </p:nvPicPr>
         <p:blipFill>
-          <a:blip r:embed="rId5" cstate="print"/>
+          <a:blip r:embed="rId3" cstate="print"/>
           <a:srcRect l="2614" t="12749" r="3268" b="39442"/>
           <a:stretch>
             <a:fillRect/>
@@ -24212,8 +24059,6 @@
           </p:cNvPr>
           <p:cNvCxnSpPr>
             <a:cxnSpLocks/>
-            <a:stCxn id="93" idx="3"/>
-            <a:endCxn id="95" idx="1"/>
           </p:cNvCxnSpPr>
           <p:nvPr/>
         </p:nvCxnSpPr>
@@ -24246,208 +24091,6 @@
       </p:cxnSp>
       <p:sp>
         <p:nvSpPr>
-          <p:cNvPr id="99" name="Right Arrow 4">
-            <a:extLst>
-              <a:ext uri="{FF2B5EF4-FFF2-40B4-BE49-F238E27FC236}">
-                <a16:creationId xmlns:a16="http://schemas.microsoft.com/office/drawing/2014/main" id="{301F5C07-7FF1-4C90-8198-FC9C51216C7E}"/>
-              </a:ext>
-            </a:extLst>
-          </p:cNvPr>
-          <p:cNvSpPr/>
-          <p:nvPr/>
-        </p:nvSpPr>
-        <p:spPr bwMode="auto">
-          <a:xfrm>
-            <a:off x="1408238" y="1718424"/>
-            <a:ext cx="2837804" cy="1302579"/>
-          </a:xfrm>
-          <a:prstGeom prst="rightArrow">
-            <a:avLst/>
-          </a:prstGeom>
-          <a:gradFill rotWithShape="1">
-            <a:gsLst>
-              <a:gs pos="0">
-                <a:srgbClr val="F38C37">
-                  <a:shade val="45000"/>
-                  <a:satMod val="155000"/>
-                </a:srgbClr>
-              </a:gs>
-              <a:gs pos="60000">
-                <a:srgbClr val="F38C37">
-                  <a:shade val="95000"/>
-                  <a:satMod val="150000"/>
-                </a:srgbClr>
-              </a:gs>
-              <a:gs pos="100000">
-                <a:srgbClr val="F38C37">
-                  <a:tint val="87000"/>
-                  <a:satMod val="250000"/>
-                </a:srgbClr>
-              </a:gs>
-            </a:gsLst>
-            <a:lin ang="16200000" scaled="0"/>
-          </a:gradFill>
-          <a:ln w="9525" cap="flat" cmpd="sng" algn="ctr">
-            <a:solidFill>
-              <a:srgbClr val="F38C37">
-                <a:satMod val="150000"/>
-              </a:srgbClr>
-            </a:solidFill>
-            <a:prstDash val="solid"/>
-            <a:headEnd type="none" w="med" len="med"/>
-            <a:tailEnd type="none" w="med" len="med"/>
-          </a:ln>
-          <a:effectLst>
-            <a:outerShdw blurRad="65500" dist="38100" dir="5400000" rotWithShape="0">
-              <a:srgbClr val="000000">
-                <a:alpha val="40000"/>
-              </a:srgbClr>
-            </a:outerShdw>
-          </a:effectLst>
-        </p:spPr>
-        <p:txBody>
-          <a:bodyPr vert="horz" wrap="square" lIns="121915" tIns="60957" rIns="121915" bIns="60957" numCol="1" rtlCol="0" anchor="ctr" anchorCtr="0" compatLnSpc="1">
-            <a:prstTxWarp prst="textNoShape">
-              <a:avLst/>
-            </a:prstTxWarp>
-          </a:bodyPr>
-          <a:lstStyle/>
-          <a:p>
-            <a:pPr algn="ctr" defTabSz="1218768" fontAlgn="base">
-              <a:spcBef>
-                <a:spcPct val="0"/>
-              </a:spcBef>
-              <a:spcAft>
-                <a:spcPct val="0"/>
-              </a:spcAft>
-              <a:defRPr/>
-            </a:pPr>
-            <a:r>
-              <a:rPr lang="en-US" sz="2667" dirty="0">
-                <a:gradFill>
-                  <a:gsLst>
-                    <a:gs pos="0">
-                      <a:srgbClr val="FFFFFF"/>
-                    </a:gs>
-                    <a:gs pos="100000">
-                      <a:srgbClr val="FFFFFF"/>
-                    </a:gs>
-                  </a:gsLst>
-                  <a:lin ang="5400000" scaled="0"/>
-                </a:gradFill>
-                <a:latin typeface="Segoe UI"/>
-                <a:cs typeface="Arial"/>
-                <a:sym typeface="Arial"/>
-              </a:rPr>
-              <a:t>Data</a:t>
-            </a:r>
-          </a:p>
-        </p:txBody>
-      </p:sp>
-      <p:grpSp>
-        <p:nvGrpSpPr>
-          <p:cNvPr id="100" name="Group 99">
-            <a:extLst>
-              <a:ext uri="{FF2B5EF4-FFF2-40B4-BE49-F238E27FC236}">
-                <a16:creationId xmlns:a16="http://schemas.microsoft.com/office/drawing/2014/main" id="{CF4BF398-DC29-4145-A44F-5929ABA01800}"/>
-              </a:ext>
-            </a:extLst>
-          </p:cNvPr>
-          <p:cNvGrpSpPr/>
-          <p:nvPr/>
-        </p:nvGrpSpPr>
-        <p:grpSpPr>
-          <a:xfrm>
-            <a:off x="10682655" y="3102941"/>
-            <a:ext cx="712054" cy="626116"/>
-            <a:chOff x="3434328" y="3336433"/>
-            <a:chExt cx="1059543" cy="925108"/>
-          </a:xfrm>
-        </p:grpSpPr>
-        <p:pic>
-          <p:nvPicPr>
-            <p:cNvPr id="101" name="Picture 100">
-              <a:extLst>
-                <a:ext uri="{FF2B5EF4-FFF2-40B4-BE49-F238E27FC236}">
-                  <a16:creationId xmlns:a16="http://schemas.microsoft.com/office/drawing/2014/main" id="{7B733F0F-7616-470F-946A-7DDBCB30A8D2}"/>
-                </a:ext>
-              </a:extLst>
-            </p:cNvPr>
-            <p:cNvPicPr>
-              <a:picLocks noChangeAspect="1"/>
-            </p:cNvPicPr>
-            <p:nvPr/>
-          </p:nvPicPr>
-          <p:blipFill>
-            <a:blip r:embed="rId6" cstate="print">
-              <a:extLst>
-                <a:ext uri="{28A0092B-C50C-407E-A947-70E740481C1C}">
-                  <a14:useLocalDpi xmlns:a14="http://schemas.microsoft.com/office/drawing/2010/main"/>
-                </a:ext>
-              </a:extLst>
-            </a:blip>
-            <a:stretch>
-              <a:fillRect/>
-            </a:stretch>
-          </p:blipFill>
-          <p:spPr>
-            <a:xfrm>
-              <a:off x="3714959" y="3336433"/>
-              <a:ext cx="635521" cy="635521"/>
-            </a:xfrm>
-            <a:prstGeom prst="rect">
-              <a:avLst/>
-            </a:prstGeom>
-          </p:spPr>
-        </p:pic>
-        <p:sp>
-          <p:nvSpPr>
-            <p:cNvPr id="102" name="Rectangle 101">
-              <a:extLst>
-                <a:ext uri="{FF2B5EF4-FFF2-40B4-BE49-F238E27FC236}">
-                  <a16:creationId xmlns:a16="http://schemas.microsoft.com/office/drawing/2014/main" id="{1FD507AA-6950-4863-B20C-4A9044787D8B}"/>
-                </a:ext>
-              </a:extLst>
-            </p:cNvPr>
-            <p:cNvSpPr/>
-            <p:nvPr/>
-          </p:nvSpPr>
-          <p:spPr>
-            <a:xfrm>
-              <a:off x="3434328" y="3965953"/>
-              <a:ext cx="1059543" cy="295588"/>
-            </a:xfrm>
-            <a:prstGeom prst="rect">
-              <a:avLst/>
-            </a:prstGeom>
-          </p:spPr>
-          <p:txBody>
-            <a:bodyPr wrap="none">
-              <a:spAutoFit/>
-            </a:bodyPr>
-            <a:lstStyle/>
-            <a:p>
-              <a:pPr algn="ctr" defTabSz="932215"/>
-              <a:r>
-                <a:rPr lang="en-US" sz="700" kern="0">
-                  <a:solidFill>
-                    <a:prstClr val="white">
-                      <a:lumMod val="50000"/>
-                    </a:prstClr>
-                  </a:solidFill>
-                  <a:latin typeface="Segoe UI Semibold" panose="020B0702040204020203" pitchFamily="34" charset="0"/>
-                  <a:ea typeface="MS PGothic" panose="020B0600070205080204" pitchFamily="34" charset="-128"/>
-                  <a:cs typeface="Segoe UI Semibold" panose="020B0702040204020203" pitchFamily="34" charset="0"/>
-                  <a:sym typeface="Arial"/>
-                </a:rPr>
-                <a:t>AZURE SQL DB</a:t>
-              </a:r>
-            </a:p>
-          </p:txBody>
-        </p:sp>
-      </p:grpSp>
-      <p:sp>
-        <p:nvSpPr>
           <p:cNvPr id="103" name="Rounded Rectangle 9">
             <a:extLst>
               <a:ext uri="{FF2B5EF4-FFF2-40B4-BE49-F238E27FC236}">
@@ -24460,7 +24103,7 @@
         </p:nvSpPr>
         <p:spPr bwMode="auto">
           <a:xfrm>
-            <a:off x="2234722" y="3130115"/>
+            <a:off x="2769646" y="3130115"/>
             <a:ext cx="3372291" cy="1478461"/>
           </a:xfrm>
           <a:prstGeom prst="roundRect">
@@ -24537,7 +24180,7 @@
         </p:nvSpPr>
         <p:spPr bwMode="auto">
           <a:xfrm>
-            <a:off x="5976083" y="3130114"/>
+            <a:off x="4983517" y="1618994"/>
             <a:ext cx="2616669" cy="1332157"/>
           </a:xfrm>
           <a:prstGeom prst="roundRect">
@@ -24625,48 +24268,6 @@
       </p:sp>
       <p:cxnSp>
         <p:nvCxnSpPr>
-          <p:cNvPr id="107" name="Curved Connector 24">
-            <a:extLst>
-              <a:ext uri="{FF2B5EF4-FFF2-40B4-BE49-F238E27FC236}">
-                <a16:creationId xmlns:a16="http://schemas.microsoft.com/office/drawing/2014/main" id="{643464BB-3AC0-4A4D-A90E-DE71980EB5CA}"/>
-              </a:ext>
-            </a:extLst>
-          </p:cNvPr>
-          <p:cNvCxnSpPr>
-            <a:cxnSpLocks/>
-            <a:endCxn id="104" idx="3"/>
-          </p:cNvCxnSpPr>
-          <p:nvPr/>
-        </p:nvCxnSpPr>
-        <p:spPr>
-          <a:xfrm rot="10800000" flipV="1">
-            <a:off x="8592753" y="3491653"/>
-            <a:ext cx="961921" cy="304540"/>
-          </a:xfrm>
-          <a:prstGeom prst="curvedConnector3">
-            <a:avLst>
-              <a:gd name="adj1" fmla="val 50000"/>
-            </a:avLst>
-          </a:prstGeom>
-          <a:noFill/>
-          <a:ln w="38100" cap="flat" cmpd="sng" algn="ctr">
-            <a:solidFill>
-              <a:srgbClr val="F38C37"/>
-            </a:solidFill>
-            <a:prstDash val="solid"/>
-            <a:tailEnd type="arrow"/>
-          </a:ln>
-          <a:effectLst>
-            <a:outerShdw blurRad="65500" dist="38100" dir="5400000" rotWithShape="0">
-              <a:srgbClr val="000000">
-                <a:alpha val="40000"/>
-              </a:srgbClr>
-            </a:outerShdw>
-          </a:effectLst>
-        </p:spPr>
-      </p:cxnSp>
-      <p:cxnSp>
-        <p:nvCxnSpPr>
           <p:cNvPr id="108" name="Curved Connector 24">
             <a:extLst>
               <a:ext uri="{FF2B5EF4-FFF2-40B4-BE49-F238E27FC236}">
@@ -24676,13 +24277,14 @@
           </p:cNvPr>
           <p:cNvCxnSpPr>
             <a:cxnSpLocks/>
+            <a:endCxn id="118" idx="1"/>
           </p:cNvCxnSpPr>
           <p:nvPr/>
         </p:nvCxnSpPr>
         <p:spPr>
           <a:xfrm flipV="1">
-            <a:off x="5681462" y="5779967"/>
-            <a:ext cx="958085" cy="474408"/>
+            <a:off x="6092917" y="5746300"/>
+            <a:ext cx="636394" cy="370993"/>
           </a:xfrm>
           <a:prstGeom prst="curvedConnector3">
             <a:avLst>
@@ -24721,7 +24323,7 @@
           <p:nvPr/>
         </p:nvPicPr>
         <p:blipFill>
-          <a:blip r:embed="rId7" cstate="print"/>
+          <a:blip r:embed="rId4" cstate="print"/>
           <a:srcRect/>
           <a:stretch>
             <a:fillRect/>
@@ -24755,7 +24357,7 @@
         </p:nvCxnSpPr>
         <p:spPr>
           <a:xfrm flipV="1">
-            <a:off x="8456701" y="5659479"/>
+            <a:off x="8548932" y="5653519"/>
             <a:ext cx="1455337" cy="92781"/>
           </a:xfrm>
           <a:prstGeom prst="curvedConnector3">
@@ -24815,7 +24417,7 @@
             <p:nvPr/>
           </p:nvPicPr>
           <p:blipFill>
-            <a:blip r:embed="rId6" cstate="print">
+            <a:blip r:embed="rId5" cstate="print">
               <a:extLst>
                 <a:ext uri="{28A0092B-C50C-407E-A947-70E740481C1C}">
                   <a14:useLocalDpi xmlns:a14="http://schemas.microsoft.com/office/drawing/2010/main"/>
@@ -24893,15 +24495,14 @@
           </p:cNvPr>
           <p:cNvCxnSpPr>
             <a:cxnSpLocks/>
-            <a:stCxn id="104" idx="1"/>
             <a:endCxn id="103" idx="3"/>
           </p:cNvCxnSpPr>
           <p:nvPr/>
         </p:nvCxnSpPr>
         <p:spPr>
           <a:xfrm rot="10800000" flipV="1">
-            <a:off x="5607013" y="3796192"/>
-            <a:ext cx="369070" cy="73153"/>
+            <a:off x="6141937" y="3493008"/>
+            <a:ext cx="3806356" cy="376338"/>
           </a:xfrm>
           <a:prstGeom prst="curvedConnector3">
             <a:avLst>
@@ -24939,7 +24540,7 @@
         </p:nvSpPr>
         <p:spPr bwMode="auto">
           <a:xfrm>
-            <a:off x="6637080" y="5302642"/>
+            <a:off x="6729311" y="5296682"/>
             <a:ext cx="1819621" cy="899236"/>
           </a:xfrm>
           <a:prstGeom prst="roundRect">
@@ -25040,7 +24641,7 @@
         <p:spPr>
           <a:xfrm>
             <a:off x="9024126" y="3837412"/>
-            <a:ext cx="2404742" cy="430887"/>
+            <a:ext cx="2561322" cy="938719"/>
           </a:xfrm>
           <a:prstGeom prst="rect">
             <a:avLst/>
@@ -25067,8 +24668,40 @@
                   <a:schemeClr val="accent5"/>
                 </a:solidFill>
               </a:rPr>
-              <a:t>: Gender, Race, Crime Type, Amount</a:t>
+              <a:t>: Gender, Race, Amount</a:t>
             </a:r>
+          </a:p>
+          <a:p>
+            <a:endParaRPr lang="en-US" sz="1100" dirty="0">
+              <a:solidFill>
+                <a:schemeClr val="accent5"/>
+              </a:solidFill>
+            </a:endParaRPr>
+          </a:p>
+          <a:p>
+            <a:r>
+              <a:rPr lang="en-US" sz="1100" b="1" dirty="0">
+                <a:solidFill>
+                  <a:schemeClr val="accent5"/>
+                </a:solidFill>
+              </a:rPr>
+              <a:t>Segmented by</a:t>
+            </a:r>
+            <a:r>
+              <a:rPr lang="en-US" sz="1100" dirty="0">
+                <a:solidFill>
+                  <a:schemeClr val="accent5"/>
+                </a:solidFill>
+              </a:rPr>
+              <a:t> Crime Type, geo-location</a:t>
+            </a:r>
+          </a:p>
+          <a:p>
+            <a:endParaRPr lang="en-US" sz="1100" dirty="0">
+              <a:solidFill>
+                <a:schemeClr val="accent5"/>
+              </a:solidFill>
+            </a:endParaRPr>
           </a:p>
         </p:txBody>
       </p:sp>
@@ -25134,7 +24767,7 @@
           <p:nvPr/>
         </p:nvPicPr>
         <p:blipFill>
-          <a:blip r:embed="rId8">
+          <a:blip r:embed="rId6">
             <a:extLst>
               <a:ext uri="{28A0092B-C50C-407E-A947-70E740481C1C}">
                 <a14:useLocalDpi xmlns:a14="http://schemas.microsoft.com/office/drawing/2010/main" val="0"/>
@@ -25148,7 +24781,7 @@
         </p:blipFill>
         <p:spPr bwMode="auto">
           <a:xfrm>
-            <a:off x="3508518" y="3277272"/>
+            <a:off x="4043442" y="3277272"/>
             <a:ext cx="1037844" cy="1037844"/>
           </a:xfrm>
           <a:prstGeom prst="rect">
@@ -25166,108 +24799,206 @@
           </a:extLst>
         </p:spPr>
       </p:pic>
-      <p:sp>
-        <p:nvSpPr>
-          <p:cNvPr id="44" name="Rectangle 43">
+      <p:grpSp>
+        <p:nvGrpSpPr>
+          <p:cNvPr id="8" name="Group 7">
             <a:extLst>
               <a:ext uri="{FF2B5EF4-FFF2-40B4-BE49-F238E27FC236}">
-                <a16:creationId xmlns:a16="http://schemas.microsoft.com/office/drawing/2014/main" id="{8A9DAE27-EB4E-47C4-8474-1C8111F6545F}"/>
+                <a16:creationId xmlns:a16="http://schemas.microsoft.com/office/drawing/2014/main" id="{26276A59-1DA1-48D3-9E20-3521754ADF56}"/>
               </a:ext>
             </a:extLst>
           </p:cNvPr>
-          <p:cNvSpPr/>
+          <p:cNvGrpSpPr/>
           <p:nvPr/>
-        </p:nvSpPr>
-        <p:spPr>
+        </p:nvGrpSpPr>
+        <p:grpSpPr>
           <a:xfrm>
-            <a:off x="2458530" y="5193720"/>
-            <a:ext cx="3046158" cy="415498"/>
+            <a:off x="2795655" y="5120669"/>
+            <a:ext cx="3372291" cy="1478461"/>
+            <a:chOff x="2260731" y="5120669"/>
+            <a:chExt cx="3372291" cy="1478461"/>
           </a:xfrm>
-          <a:prstGeom prst="rect">
-            <a:avLst/>
-          </a:prstGeom>
-        </p:spPr>
-        <p:txBody>
-          <a:bodyPr wrap="square" lIns="121920" tIns="60960" rIns="121920" bIns="60960" anchor="t">
-            <a:spAutoFit/>
-          </a:bodyPr>
-          <a:lstStyle/>
-          <a:p>
-            <a:pPr defTabSz="913904">
-              <a:lnSpc>
-                <a:spcPct val="95000"/>
-              </a:lnSpc>
-              <a:spcBef>
-                <a:spcPct val="0"/>
-              </a:spcBef>
-              <a:spcAft>
-                <a:spcPct val="0"/>
-              </a:spcAft>
-              <a:defRPr/>
-            </a:pPr>
-            <a:r>
-              <a:rPr lang="en-US" sz="1000" b="1" kern="0" spc="49" dirty="0">
-                <a:latin typeface="Segoe UI Semibold"/>
-                <a:cs typeface="Segoe UI Semibold"/>
+        </p:grpSpPr>
+        <p:sp>
+          <p:nvSpPr>
+            <p:cNvPr id="47" name="Rounded Rectangle 9">
+              <a:extLst>
+                <a:ext uri="{FF2B5EF4-FFF2-40B4-BE49-F238E27FC236}">
+                  <a16:creationId xmlns:a16="http://schemas.microsoft.com/office/drawing/2014/main" id="{4045D4C8-84DF-4CB6-B58A-E58C48BE8536}"/>
+                </a:ext>
+              </a:extLst>
+            </p:cNvPr>
+            <p:cNvSpPr/>
+            <p:nvPr/>
+          </p:nvSpPr>
+          <p:spPr bwMode="auto">
+            <a:xfrm>
+              <a:off x="2260731" y="5120669"/>
+              <a:ext cx="3372291" cy="1478461"/>
+            </a:xfrm>
+            <a:prstGeom prst="roundRect">
+              <a:avLst/>
+            </a:prstGeom>
+            <a:solidFill>
+              <a:srgbClr val="2396ED"/>
+            </a:solidFill>
+            <a:ln w="9525" cap="flat" cmpd="sng" algn="ctr">
+              <a:solidFill>
+                <a:srgbClr val="3A94D2">
+                  <a:satMod val="150000"/>
+                </a:srgbClr>
+              </a:solidFill>
+              <a:prstDash val="solid"/>
+              <a:headEnd type="none" w="med" len="med"/>
+              <a:tailEnd type="none" w="med" len="med"/>
+            </a:ln>
+            <a:effectLst>
+              <a:outerShdw blurRad="65500" dist="38100" dir="5400000" rotWithShape="0">
+                <a:srgbClr val="000000">
+                  <a:alpha val="40000"/>
+                </a:srgbClr>
+              </a:outerShdw>
+            </a:effectLst>
+          </p:spPr>
+          <p:txBody>
+            <a:bodyPr vert="horz" wrap="square" lIns="121915" tIns="60957" rIns="121915" bIns="60957" numCol="1" rtlCol="0" anchor="ctr" anchorCtr="0" compatLnSpc="1">
+              <a:prstTxWarp prst="textNoShape">
+                <a:avLst/>
+              </a:prstTxWarp>
+            </a:bodyPr>
+            <a:lstStyle/>
+            <a:p>
+              <a:pPr algn="ctr" defTabSz="1218768" fontAlgn="base">
+                <a:spcBef>
+                  <a:spcPct val="0"/>
+                </a:spcBef>
+                <a:spcAft>
+                  <a:spcPct val="0"/>
+                </a:spcAft>
+                <a:defRPr/>
+              </a:pPr>
+              <a:endParaRPr lang="en-US" sz="2667">
+                <a:gradFill>
+                  <a:gsLst>
+                    <a:gs pos="0">
+                      <a:srgbClr val="FFFFFF"/>
+                    </a:gs>
+                    <a:gs pos="100000">
+                      <a:srgbClr val="FFFFFF"/>
+                    </a:gs>
+                  </a:gsLst>
+                  <a:lin ang="5400000" scaled="0"/>
+                </a:gradFill>
+                <a:latin typeface="Segoe UI"/>
+                <a:cs typeface="Arial"/>
                 <a:sym typeface="Arial"/>
-              </a:rPr>
-              <a:t>Bias &amp; Disparity Detection Engine (BDDE) Inference Container</a:t>
-            </a:r>
-            <a:endParaRPr lang="en-US" sz="2400" kern="0" dirty="0">
-              <a:latin typeface="Arial"/>
-              <a:cs typeface="Arial"/>
-              <a:sym typeface="Arial"/>
-            </a:endParaRPr>
-          </a:p>
-        </p:txBody>
-      </p:sp>
-      <p:pic>
-        <p:nvPicPr>
-          <p:cNvPr id="1026" name="Picture 2" descr="See the source image">
+              </a:endParaRPr>
+            </a:p>
+          </p:txBody>
+        </p:sp>
+        <p:sp>
+          <p:nvSpPr>
+            <p:cNvPr id="44" name="Rectangle 43">
+              <a:extLst>
+                <a:ext uri="{FF2B5EF4-FFF2-40B4-BE49-F238E27FC236}">
+                  <a16:creationId xmlns:a16="http://schemas.microsoft.com/office/drawing/2014/main" id="{8A9DAE27-EB4E-47C4-8474-1C8111F6545F}"/>
+                </a:ext>
+              </a:extLst>
+            </p:cNvPr>
+            <p:cNvSpPr/>
+            <p:nvPr/>
+          </p:nvSpPr>
+          <p:spPr>
+            <a:xfrm>
+              <a:off x="2458530" y="5193720"/>
+              <a:ext cx="3046158" cy="415498"/>
+            </a:xfrm>
+            <a:prstGeom prst="rect">
+              <a:avLst/>
+            </a:prstGeom>
+          </p:spPr>
+          <p:txBody>
+            <a:bodyPr wrap="square" lIns="121920" tIns="60960" rIns="121920" bIns="60960" anchor="t">
+              <a:spAutoFit/>
+            </a:bodyPr>
+            <a:lstStyle/>
+            <a:p>
+              <a:pPr defTabSz="913904">
+                <a:lnSpc>
+                  <a:spcPct val="95000"/>
+                </a:lnSpc>
+                <a:spcBef>
+                  <a:spcPct val="0"/>
+                </a:spcBef>
+                <a:spcAft>
+                  <a:spcPct val="0"/>
+                </a:spcAft>
+                <a:defRPr/>
+              </a:pPr>
+              <a:r>
+                <a:rPr lang="en-US" sz="1000" b="1" kern="0" spc="49" dirty="0">
+                  <a:latin typeface="Segoe UI Semibold"/>
+                  <a:cs typeface="Segoe UI Semibold"/>
+                  <a:sym typeface="Arial"/>
+                </a:rPr>
+                <a:t>Bias &amp; Disparity Detection Engine (BDDE) Inference Container</a:t>
+              </a:r>
+              <a:endParaRPr lang="en-US" sz="2400" kern="0" dirty="0">
+                <a:latin typeface="Arial"/>
+                <a:cs typeface="Arial"/>
+                <a:sym typeface="Arial"/>
+              </a:endParaRPr>
+            </a:p>
+          </p:txBody>
+        </p:sp>
+        <p:pic>
+          <p:nvPicPr>
+            <p:cNvPr id="1026" name="Picture 2" descr="See the source image">
+              <a:extLst>
+                <a:ext uri="{FF2B5EF4-FFF2-40B4-BE49-F238E27FC236}">
+                  <a16:creationId xmlns:a16="http://schemas.microsoft.com/office/drawing/2014/main" id="{9CC22851-B628-472B-92C4-4E36BB64BF16}"/>
+                </a:ext>
+              </a:extLst>
+            </p:cNvPr>
+            <p:cNvPicPr>
+              <a:picLocks noChangeAspect="1" noChangeArrowheads="1"/>
+            </p:cNvPicPr>
+            <p:nvPr/>
+          </p:nvPicPr>
+          <p:blipFill>
+            <a:blip r:embed="rId7">
+              <a:extLst>
+                <a:ext uri="{28A0092B-C50C-407E-A947-70E740481C1C}">
+                  <a14:useLocalDpi xmlns:a14="http://schemas.microsoft.com/office/drawing/2010/main" val="0"/>
+                </a:ext>
+              </a:extLst>
+            </a:blip>
+            <a:srcRect/>
+            <a:stretch>
+              <a:fillRect/>
+            </a:stretch>
+          </p:blipFill>
+          <p:spPr bwMode="auto">
+            <a:xfrm>
+              <a:off x="3081396" y="5659479"/>
+              <a:ext cx="1624477" cy="848789"/>
+            </a:xfrm>
+            <a:prstGeom prst="rect">
+              <a:avLst/>
+            </a:prstGeom>
+            <a:noFill/>
             <a:extLst>
-              <a:ext uri="{FF2B5EF4-FFF2-40B4-BE49-F238E27FC236}">
-                <a16:creationId xmlns:a16="http://schemas.microsoft.com/office/drawing/2014/main" id="{9CC22851-B628-472B-92C4-4E36BB64BF16}"/>
+              <a:ext uri="{909E8E84-426E-40DD-AFC4-6F175D3DCCD1}">
+                <a14:hiddenFill xmlns:a14="http://schemas.microsoft.com/office/drawing/2010/main">
+                  <a:solidFill>
+                    <a:srgbClr val="FFFFFF"/>
+                  </a:solidFill>
+                </a14:hiddenFill>
               </a:ext>
             </a:extLst>
-          </p:cNvPr>
-          <p:cNvPicPr>
-            <a:picLocks noChangeAspect="1" noChangeArrowheads="1"/>
-          </p:cNvPicPr>
-          <p:nvPr/>
-        </p:nvPicPr>
-        <p:blipFill>
-          <a:blip r:embed="rId9">
-            <a:extLst>
-              <a:ext uri="{28A0092B-C50C-407E-A947-70E740481C1C}">
-                <a14:useLocalDpi xmlns:a14="http://schemas.microsoft.com/office/drawing/2010/main" val="0"/>
-              </a:ext>
-            </a:extLst>
-          </a:blip>
-          <a:srcRect/>
-          <a:stretch>
-            <a:fillRect/>
-          </a:stretch>
-        </p:blipFill>
-        <p:spPr bwMode="auto">
-          <a:xfrm>
-            <a:off x="3081396" y="5659479"/>
-            <a:ext cx="1624477" cy="848789"/>
-          </a:xfrm>
-          <a:prstGeom prst="rect">
-            <a:avLst/>
-          </a:prstGeom>
-          <a:noFill/>
-          <a:extLst>
-            <a:ext uri="{909E8E84-426E-40DD-AFC4-6F175D3DCCD1}">
-              <a14:hiddenFill xmlns:a14="http://schemas.microsoft.com/office/drawing/2010/main">
-                <a:solidFill>
-                  <a:srgbClr val="FFFFFF"/>
-                </a:solidFill>
-              </a14:hiddenFill>
-            </a:ext>
-          </a:extLst>
-        </p:spPr>
-      </p:pic>
+          </p:spPr>
+        </p:pic>
+      </p:grpSp>
       <p:cxnSp>
         <p:nvCxnSpPr>
           <p:cNvPr id="48" name="Curved Connector 24">
@@ -25285,7 +25016,7 @@
         </p:nvCxnSpPr>
         <p:spPr>
           <a:xfrm rot="16200000" flipH="1">
-            <a:off x="3685106" y="4858898"/>
+            <a:off x="4220030" y="4858898"/>
             <a:ext cx="523540" cy="2"/>
           </a:xfrm>
           <a:prstGeom prst="curvedConnector3">
@@ -25310,6 +25041,546 @@
           </a:effectLst>
         </p:spPr>
       </p:cxnSp>
+      <p:grpSp>
+        <p:nvGrpSpPr>
+          <p:cNvPr id="42" name="Group 116">
+            <a:extLst>
+              <a:ext uri="{FF2B5EF4-FFF2-40B4-BE49-F238E27FC236}">
+                <a16:creationId xmlns:a16="http://schemas.microsoft.com/office/drawing/2014/main" id="{A814B973-FFD3-4979-8A2A-F360431F4157}"/>
+              </a:ext>
+            </a:extLst>
+          </p:cNvPr>
+          <p:cNvGrpSpPr/>
+          <p:nvPr/>
+        </p:nvGrpSpPr>
+        <p:grpSpPr>
+          <a:xfrm>
+            <a:off x="9554657" y="2758884"/>
+            <a:ext cx="986755" cy="1016000"/>
+            <a:chOff x="555334" y="4191000"/>
+            <a:chExt cx="587666" cy="609600"/>
+          </a:xfrm>
+        </p:grpSpPr>
+        <p:pic>
+          <p:nvPicPr>
+            <p:cNvPr id="43" name="Picture 3" descr="C:\Documents and Settings\antonk\Local Settings\Temporary Internet Files\Content.IE5\AV78XKCM\MCj04348450000[1].png">
+              <a:extLst>
+                <a:ext uri="{FF2B5EF4-FFF2-40B4-BE49-F238E27FC236}">
+                  <a16:creationId xmlns:a16="http://schemas.microsoft.com/office/drawing/2014/main" id="{CB8E6C6A-0DF3-4DD8-A0EF-CDEC8949B5D3}"/>
+                </a:ext>
+              </a:extLst>
+            </p:cNvPr>
+            <p:cNvPicPr>
+              <a:picLocks noChangeAspect="1" noChangeArrowheads="1"/>
+            </p:cNvPicPr>
+            <p:nvPr/>
+          </p:nvPicPr>
+          <p:blipFill>
+            <a:blip r:embed="rId8" cstate="print"/>
+            <a:srcRect/>
+            <a:stretch>
+              <a:fillRect/>
+            </a:stretch>
+          </p:blipFill>
+          <p:spPr bwMode="auto">
+            <a:xfrm>
+              <a:off x="555334" y="4191000"/>
+              <a:ext cx="587666" cy="527538"/>
+            </a:xfrm>
+            <a:prstGeom prst="rect">
+              <a:avLst/>
+            </a:prstGeom>
+            <a:noFill/>
+          </p:spPr>
+        </p:pic>
+        <p:sp>
+          <p:nvSpPr>
+            <p:cNvPr id="45" name="Can 21">
+              <a:extLst>
+                <a:ext uri="{FF2B5EF4-FFF2-40B4-BE49-F238E27FC236}">
+                  <a16:creationId xmlns:a16="http://schemas.microsoft.com/office/drawing/2014/main" id="{1D255DA1-DF4F-4986-BE6A-CA60D934E7A9}"/>
+                </a:ext>
+              </a:extLst>
+            </p:cNvPr>
+            <p:cNvSpPr/>
+            <p:nvPr/>
+          </p:nvSpPr>
+          <p:spPr>
+            <a:xfrm>
+              <a:off x="860133" y="4419600"/>
+              <a:ext cx="228600" cy="381000"/>
+            </a:xfrm>
+            <a:prstGeom prst="can">
+              <a:avLst/>
+            </a:prstGeom>
+            <a:gradFill rotWithShape="1">
+              <a:gsLst>
+                <a:gs pos="0">
+                  <a:srgbClr val="3A94D2">
+                    <a:shade val="45000"/>
+                    <a:satMod val="155000"/>
+                  </a:srgbClr>
+                </a:gs>
+                <a:gs pos="60000">
+                  <a:srgbClr val="3A94D2">
+                    <a:shade val="95000"/>
+                    <a:satMod val="150000"/>
+                  </a:srgbClr>
+                </a:gs>
+                <a:gs pos="100000">
+                  <a:srgbClr val="3A94D2">
+                    <a:tint val="87000"/>
+                    <a:satMod val="250000"/>
+                  </a:srgbClr>
+                </a:gs>
+              </a:gsLst>
+              <a:lin ang="16200000" scaled="0"/>
+            </a:gradFill>
+            <a:ln>
+              <a:noFill/>
+            </a:ln>
+            <a:effectLst>
+              <a:outerShdw blurRad="65500" dist="38100" dir="5400000" rotWithShape="0">
+                <a:srgbClr val="000000">
+                  <a:alpha val="40000"/>
+                </a:srgbClr>
+              </a:outerShdw>
+            </a:effectLst>
+            <a:scene3d>
+              <a:camera prst="orthographicFront" fov="0">
+                <a:rot lat="0" lon="0" rev="0"/>
+              </a:camera>
+              <a:lightRig rig="contrasting" dir="t">
+                <a:rot lat="0" lon="0" rev="12000000"/>
+              </a:lightRig>
+            </a:scene3d>
+            <a:sp3d prstMaterial="powder">
+              <a:bevelT h="50800"/>
+            </a:sp3d>
+          </p:spPr>
+          <p:txBody>
+            <a:bodyPr rtlCol="0" anchor="ctr"/>
+            <a:lstStyle/>
+            <a:p>
+              <a:pPr algn="ctr" defTabSz="1219120">
+                <a:defRPr/>
+              </a:pPr>
+              <a:endParaRPr lang="en-US" sz="1600">
+                <a:solidFill>
+                  <a:srgbClr val="8557C9">
+                    <a:lumMod val="25000"/>
+                  </a:srgbClr>
+                </a:solidFill>
+                <a:latin typeface="Segoe UI"/>
+                <a:cs typeface="Arial" pitchFamily="34" charset="0"/>
+                <a:sym typeface="Arial"/>
+              </a:endParaRPr>
+            </a:p>
+          </p:txBody>
+        </p:sp>
+      </p:grpSp>
+      <p:grpSp>
+        <p:nvGrpSpPr>
+          <p:cNvPr id="49" name="Group 48">
+            <a:extLst>
+              <a:ext uri="{FF2B5EF4-FFF2-40B4-BE49-F238E27FC236}">
+                <a16:creationId xmlns:a16="http://schemas.microsoft.com/office/drawing/2014/main" id="{F87FE32D-CD6B-4DCF-91E3-87014998FDC7}"/>
+              </a:ext>
+            </a:extLst>
+          </p:cNvPr>
+          <p:cNvGrpSpPr/>
+          <p:nvPr/>
+        </p:nvGrpSpPr>
+        <p:grpSpPr>
+          <a:xfrm>
+            <a:off x="10682655" y="3102941"/>
+            <a:ext cx="712054" cy="626116"/>
+            <a:chOff x="3434328" y="3336433"/>
+            <a:chExt cx="1059543" cy="925108"/>
+          </a:xfrm>
+        </p:grpSpPr>
+        <p:pic>
+          <p:nvPicPr>
+            <p:cNvPr id="50" name="Picture 49">
+              <a:extLst>
+                <a:ext uri="{FF2B5EF4-FFF2-40B4-BE49-F238E27FC236}">
+                  <a16:creationId xmlns:a16="http://schemas.microsoft.com/office/drawing/2014/main" id="{0FF2B951-7119-4020-BF50-723D10E6901B}"/>
+                </a:ext>
+              </a:extLst>
+            </p:cNvPr>
+            <p:cNvPicPr>
+              <a:picLocks noChangeAspect="1"/>
+            </p:cNvPicPr>
+            <p:nvPr/>
+          </p:nvPicPr>
+          <p:blipFill>
+            <a:blip r:embed="rId5" cstate="print">
+              <a:extLst>
+                <a:ext uri="{28A0092B-C50C-407E-A947-70E740481C1C}">
+                  <a14:useLocalDpi xmlns:a14="http://schemas.microsoft.com/office/drawing/2010/main"/>
+                </a:ext>
+              </a:extLst>
+            </a:blip>
+            <a:stretch>
+              <a:fillRect/>
+            </a:stretch>
+          </p:blipFill>
+          <p:spPr>
+            <a:xfrm>
+              <a:off x="3714959" y="3336433"/>
+              <a:ext cx="635521" cy="635521"/>
+            </a:xfrm>
+            <a:prstGeom prst="rect">
+              <a:avLst/>
+            </a:prstGeom>
+          </p:spPr>
+        </p:pic>
+        <p:sp>
+          <p:nvSpPr>
+            <p:cNvPr id="51" name="Rectangle 50">
+              <a:extLst>
+                <a:ext uri="{FF2B5EF4-FFF2-40B4-BE49-F238E27FC236}">
+                  <a16:creationId xmlns:a16="http://schemas.microsoft.com/office/drawing/2014/main" id="{77450C76-7458-473B-9B77-7D057EFD413B}"/>
+                </a:ext>
+              </a:extLst>
+            </p:cNvPr>
+            <p:cNvSpPr/>
+            <p:nvPr/>
+          </p:nvSpPr>
+          <p:spPr>
+            <a:xfrm>
+              <a:off x="3434328" y="3965953"/>
+              <a:ext cx="1059543" cy="295588"/>
+            </a:xfrm>
+            <a:prstGeom prst="rect">
+              <a:avLst/>
+            </a:prstGeom>
+          </p:spPr>
+          <p:txBody>
+            <a:bodyPr wrap="none">
+              <a:spAutoFit/>
+            </a:bodyPr>
+            <a:lstStyle/>
+            <a:p>
+              <a:pPr algn="ctr" defTabSz="932215"/>
+              <a:r>
+                <a:rPr lang="en-US" sz="700" kern="0">
+                  <a:solidFill>
+                    <a:prstClr val="white">
+                      <a:lumMod val="50000"/>
+                    </a:prstClr>
+                  </a:solidFill>
+                  <a:latin typeface="Segoe UI Semibold" panose="020B0702040204020203" pitchFamily="34" charset="0"/>
+                  <a:ea typeface="MS PGothic" panose="020B0600070205080204" pitchFamily="34" charset="-128"/>
+                  <a:cs typeface="Segoe UI Semibold" panose="020B0702040204020203" pitchFamily="34" charset="0"/>
+                  <a:sym typeface="Arial"/>
+                </a:rPr>
+                <a:t>AZURE SQL DB</a:t>
+              </a:r>
+            </a:p>
+          </p:txBody>
+        </p:sp>
+      </p:grpSp>
+      <p:grpSp>
+        <p:nvGrpSpPr>
+          <p:cNvPr id="54" name="Group 53">
+            <a:extLst>
+              <a:ext uri="{FF2B5EF4-FFF2-40B4-BE49-F238E27FC236}">
+                <a16:creationId xmlns:a16="http://schemas.microsoft.com/office/drawing/2014/main" id="{14CE3AE3-881B-45C6-AC49-62B48FEB640B}"/>
+              </a:ext>
+            </a:extLst>
+          </p:cNvPr>
+          <p:cNvGrpSpPr/>
+          <p:nvPr/>
+        </p:nvGrpSpPr>
+        <p:grpSpPr>
+          <a:xfrm>
+            <a:off x="71431" y="1615891"/>
+            <a:ext cx="2189300" cy="1507641"/>
+            <a:chOff x="2260731" y="5120669"/>
+            <a:chExt cx="3372291" cy="1478461"/>
+          </a:xfrm>
+        </p:grpSpPr>
+        <p:sp>
+          <p:nvSpPr>
+            <p:cNvPr id="55" name="Rounded Rectangle 9">
+              <a:extLst>
+                <a:ext uri="{FF2B5EF4-FFF2-40B4-BE49-F238E27FC236}">
+                  <a16:creationId xmlns:a16="http://schemas.microsoft.com/office/drawing/2014/main" id="{B8107BFB-DD79-4CD4-BDD9-253861459390}"/>
+                </a:ext>
+              </a:extLst>
+            </p:cNvPr>
+            <p:cNvSpPr/>
+            <p:nvPr/>
+          </p:nvSpPr>
+          <p:spPr bwMode="auto">
+            <a:xfrm>
+              <a:off x="2260731" y="5120669"/>
+              <a:ext cx="3372291" cy="1478461"/>
+            </a:xfrm>
+            <a:prstGeom prst="roundRect">
+              <a:avLst/>
+            </a:prstGeom>
+            <a:solidFill>
+              <a:srgbClr val="2396ED"/>
+            </a:solidFill>
+            <a:ln w="9525" cap="flat" cmpd="sng" algn="ctr">
+              <a:solidFill>
+                <a:srgbClr val="3A94D2">
+                  <a:satMod val="150000"/>
+                </a:srgbClr>
+              </a:solidFill>
+              <a:prstDash val="solid"/>
+              <a:headEnd type="none" w="med" len="med"/>
+              <a:tailEnd type="none" w="med" len="med"/>
+            </a:ln>
+            <a:effectLst>
+              <a:outerShdw blurRad="65500" dist="38100" dir="5400000" rotWithShape="0">
+                <a:srgbClr val="000000">
+                  <a:alpha val="40000"/>
+                </a:srgbClr>
+              </a:outerShdw>
+            </a:effectLst>
+          </p:spPr>
+          <p:txBody>
+            <a:bodyPr vert="horz" wrap="square" lIns="121915" tIns="60957" rIns="121915" bIns="60957" numCol="1" rtlCol="0" anchor="ctr" anchorCtr="0" compatLnSpc="1">
+              <a:prstTxWarp prst="textNoShape">
+                <a:avLst/>
+              </a:prstTxWarp>
+            </a:bodyPr>
+            <a:lstStyle/>
+            <a:p>
+              <a:pPr algn="ctr" defTabSz="1218768" fontAlgn="base">
+                <a:spcBef>
+                  <a:spcPct val="0"/>
+                </a:spcBef>
+                <a:spcAft>
+                  <a:spcPct val="0"/>
+                </a:spcAft>
+                <a:defRPr/>
+              </a:pPr>
+              <a:endParaRPr lang="en-US" sz="2667">
+                <a:gradFill>
+                  <a:gsLst>
+                    <a:gs pos="0">
+                      <a:srgbClr val="FFFFFF"/>
+                    </a:gs>
+                    <a:gs pos="100000">
+                      <a:srgbClr val="FFFFFF"/>
+                    </a:gs>
+                  </a:gsLst>
+                  <a:lin ang="5400000" scaled="0"/>
+                </a:gradFill>
+                <a:latin typeface="Segoe UI"/>
+                <a:cs typeface="Arial"/>
+                <a:sym typeface="Arial"/>
+              </a:endParaRPr>
+            </a:p>
+          </p:txBody>
+        </p:sp>
+        <p:sp>
+          <p:nvSpPr>
+            <p:cNvPr id="56" name="Rectangle 55">
+              <a:extLst>
+                <a:ext uri="{FF2B5EF4-FFF2-40B4-BE49-F238E27FC236}">
+                  <a16:creationId xmlns:a16="http://schemas.microsoft.com/office/drawing/2014/main" id="{C9FA9BAB-FC8A-43C0-B258-9E3DE15AD596}"/>
+                </a:ext>
+              </a:extLst>
+            </p:cNvPr>
+            <p:cNvSpPr/>
+            <p:nvPr/>
+          </p:nvSpPr>
+          <p:spPr>
+            <a:xfrm>
+              <a:off x="2458530" y="5193720"/>
+              <a:ext cx="3046158" cy="415498"/>
+            </a:xfrm>
+            <a:prstGeom prst="rect">
+              <a:avLst/>
+            </a:prstGeom>
+          </p:spPr>
+          <p:txBody>
+            <a:bodyPr wrap="square" lIns="121920" tIns="60960" rIns="121920" bIns="60960" anchor="t">
+              <a:spAutoFit/>
+            </a:bodyPr>
+            <a:lstStyle/>
+            <a:p>
+              <a:pPr defTabSz="913904">
+                <a:lnSpc>
+                  <a:spcPct val="95000"/>
+                </a:lnSpc>
+                <a:spcBef>
+                  <a:spcPct val="0"/>
+                </a:spcBef>
+                <a:spcAft>
+                  <a:spcPct val="0"/>
+                </a:spcAft>
+                <a:defRPr/>
+              </a:pPr>
+              <a:r>
+                <a:rPr lang="en-US" sz="1000" b="1" kern="0" spc="49" dirty="0">
+                  <a:latin typeface="Segoe UI Semibold"/>
+                  <a:cs typeface="Segoe UI Semibold"/>
+                  <a:sym typeface="Arial"/>
+                </a:rPr>
+                <a:t>Bias &amp; Disparity Detection Engine (BDDE) Inference Container</a:t>
+              </a:r>
+              <a:endParaRPr lang="en-US" sz="2400" kern="0" dirty="0">
+                <a:latin typeface="Arial"/>
+                <a:cs typeface="Arial"/>
+                <a:sym typeface="Arial"/>
+              </a:endParaRPr>
+            </a:p>
+          </p:txBody>
+        </p:sp>
+        <p:pic>
+          <p:nvPicPr>
+            <p:cNvPr id="57" name="Picture 2" descr="See the source image">
+              <a:extLst>
+                <a:ext uri="{FF2B5EF4-FFF2-40B4-BE49-F238E27FC236}">
+                  <a16:creationId xmlns:a16="http://schemas.microsoft.com/office/drawing/2014/main" id="{D531644B-4CC7-41D7-A361-DC466375E61B}"/>
+                </a:ext>
+              </a:extLst>
+            </p:cNvPr>
+            <p:cNvPicPr>
+              <a:picLocks noChangeAspect="1" noChangeArrowheads="1"/>
+            </p:cNvPicPr>
+            <p:nvPr/>
+          </p:nvPicPr>
+          <p:blipFill>
+            <a:blip r:embed="rId7">
+              <a:extLst>
+                <a:ext uri="{28A0092B-C50C-407E-A947-70E740481C1C}">
+                  <a14:useLocalDpi xmlns:a14="http://schemas.microsoft.com/office/drawing/2010/main" val="0"/>
+                </a:ext>
+              </a:extLst>
+            </a:blip>
+            <a:srcRect/>
+            <a:stretch>
+              <a:fillRect/>
+            </a:stretch>
+          </p:blipFill>
+          <p:spPr bwMode="auto">
+            <a:xfrm>
+              <a:off x="3081396" y="5659479"/>
+              <a:ext cx="1624477" cy="848789"/>
+            </a:xfrm>
+            <a:prstGeom prst="rect">
+              <a:avLst/>
+            </a:prstGeom>
+            <a:noFill/>
+            <a:extLst>
+              <a:ext uri="{909E8E84-426E-40DD-AFC4-6F175D3DCCD1}">
+                <a14:hiddenFill xmlns:a14="http://schemas.microsoft.com/office/drawing/2010/main">
+                  <a:solidFill>
+                    <a:srgbClr val="FFFFFF"/>
+                  </a:solidFill>
+                </a14:hiddenFill>
+              </a:ext>
+            </a:extLst>
+          </p:spPr>
+        </p:pic>
+      </p:grpSp>
+      <p:sp>
+        <p:nvSpPr>
+          <p:cNvPr id="99" name="Right Arrow 4">
+            <a:extLst>
+              <a:ext uri="{FF2B5EF4-FFF2-40B4-BE49-F238E27FC236}">
+                <a16:creationId xmlns:a16="http://schemas.microsoft.com/office/drawing/2014/main" id="{301F5C07-7FF1-4C90-8198-FC9C51216C7E}"/>
+              </a:ext>
+            </a:extLst>
+          </p:cNvPr>
+          <p:cNvSpPr/>
+          <p:nvPr/>
+        </p:nvSpPr>
+        <p:spPr bwMode="auto">
+          <a:xfrm>
+            <a:off x="2159112" y="1718424"/>
+            <a:ext cx="2804010" cy="1302579"/>
+          </a:xfrm>
+          <a:prstGeom prst="rightArrow">
+            <a:avLst/>
+          </a:prstGeom>
+          <a:gradFill rotWithShape="1">
+            <a:gsLst>
+              <a:gs pos="0">
+                <a:srgbClr val="F38C37">
+                  <a:shade val="45000"/>
+                  <a:satMod val="155000"/>
+                </a:srgbClr>
+              </a:gs>
+              <a:gs pos="60000">
+                <a:srgbClr val="F38C37">
+                  <a:shade val="95000"/>
+                  <a:satMod val="150000"/>
+                </a:srgbClr>
+              </a:gs>
+              <a:gs pos="100000">
+                <a:srgbClr val="F38C37">
+                  <a:tint val="87000"/>
+                  <a:satMod val="250000"/>
+                </a:srgbClr>
+              </a:gs>
+            </a:gsLst>
+            <a:lin ang="16200000" scaled="0"/>
+          </a:gradFill>
+          <a:ln w="9525" cap="flat" cmpd="sng" algn="ctr">
+            <a:solidFill>
+              <a:srgbClr val="F38C37">
+                <a:satMod val="150000"/>
+              </a:srgbClr>
+            </a:solidFill>
+            <a:prstDash val="solid"/>
+            <a:headEnd type="none" w="med" len="med"/>
+            <a:tailEnd type="none" w="med" len="med"/>
+          </a:ln>
+          <a:effectLst>
+            <a:outerShdw blurRad="65500" dist="38100" dir="5400000" rotWithShape="0">
+              <a:srgbClr val="000000">
+                <a:alpha val="40000"/>
+              </a:srgbClr>
+            </a:outerShdw>
+          </a:effectLst>
+        </p:spPr>
+        <p:txBody>
+          <a:bodyPr vert="horz" wrap="square" lIns="121915" tIns="60957" rIns="121915" bIns="60957" numCol="1" rtlCol="0" anchor="ctr" anchorCtr="0" compatLnSpc="1">
+            <a:prstTxWarp prst="textNoShape">
+              <a:avLst/>
+            </a:prstTxWarp>
+          </a:bodyPr>
+          <a:lstStyle/>
+          <a:p>
+            <a:pPr algn="ctr" defTabSz="1218768" fontAlgn="base">
+              <a:spcBef>
+                <a:spcPct val="0"/>
+              </a:spcBef>
+              <a:spcAft>
+                <a:spcPct val="0"/>
+              </a:spcAft>
+              <a:defRPr/>
+            </a:pPr>
+            <a:r>
+              <a:rPr lang="en-US" dirty="0">
+                <a:gradFill>
+                  <a:gsLst>
+                    <a:gs pos="0">
+                      <a:srgbClr val="FFFFFF"/>
+                    </a:gs>
+                    <a:gs pos="100000">
+                      <a:srgbClr val="FFFFFF"/>
+                    </a:gs>
+                  </a:gsLst>
+                  <a:lin ang="5400000" scaled="0"/>
+                </a:gradFill>
+                <a:latin typeface="Segoe UI"/>
+                <a:cs typeface="Arial"/>
+                <a:sym typeface="Arial"/>
+              </a:rPr>
+              <a:t>BDDE Data</a:t>
+            </a:r>
+          </a:p>
+        </p:txBody>
+      </p:sp>
     </p:spTree>
     <p:extLst>
       <p:ext uri="{BB962C8B-B14F-4D97-AF65-F5344CB8AC3E}">
@@ -27296,7 +27567,7 @@
           </a:p>
           <a:p>
             <a:r>
-              <a:rPr lang="en-US" sz="1100" b="1">
+              <a:rPr lang="en-US" sz="1100" b="1" dirty="0">
                 <a:solidFill>
                   <a:schemeClr val="accent5"/>
                 </a:solidFill>
@@ -27304,7 +27575,15 @@
               <a:t>Segmented by</a:t>
             </a:r>
             <a:r>
-              <a:rPr lang="en-US" sz="1100">
+              <a:rPr lang="en-US" sz="1100" dirty="0">
+                <a:solidFill>
+                  <a:schemeClr val="accent5"/>
+                </a:solidFill>
+              </a:rPr>
+              <a:t> Crime Type, geo-locations,</a:t>
+            </a:r>
+            <a:r>
+              <a:rPr lang="en-US" sz="1100" b="1" dirty="0">
                 <a:solidFill>
                   <a:schemeClr val="accent5"/>
                 </a:solidFill>
@@ -27317,37 +27596,8 @@
                   <a:schemeClr val="accent5"/>
                 </a:solidFill>
               </a:rPr>
-              <a:t>Crime Type</a:t>
-            </a:r>
-            <a:r>
-              <a:rPr lang="en-US" sz="1100">
-                <a:solidFill>
-                  <a:schemeClr val="accent5"/>
-                </a:solidFill>
-              </a:rPr>
-              <a:t>, geo-locations,</a:t>
-            </a:r>
-            <a:r>
-              <a:rPr lang="en-US" sz="1100" b="1">
-                <a:solidFill>
-                  <a:schemeClr val="accent5"/>
-                </a:solidFill>
-              </a:rPr>
-              <a:t> </a:t>
-            </a:r>
-            <a:r>
-              <a:rPr lang="en-US" sz="1100">
-                <a:solidFill>
-                  <a:schemeClr val="accent5"/>
-                </a:solidFill>
-              </a:rPr>
               <a:t>*Judge</a:t>
             </a:r>
-            <a:endParaRPr lang="en-US" sz="1100" dirty="0">
-              <a:solidFill>
-                <a:schemeClr val="accent5"/>
-              </a:solidFill>
-            </a:endParaRPr>
           </a:p>
         </p:txBody>
       </p:sp>

</xml_diff>